<commit_message>
clamp environment + input system on shooting setup
</commit_message>
<xml_diff>
--- a/190874H_IWP_DOCS/02_LeeXieLoong_190874H_IWP_P1.pptx
+++ b/190874H_IWP_DOCS/02_LeeXieLoong_190874H_IWP_P1.pptx
@@ -1,46 +1,46 @@
 
 <file path=ppt/presentation.xml><?xml version="1.0" encoding="utf-8"?>
-<p:presentation xmlns:a="http://schemas.openxmlformats.org/drawingml/2006/main" xmlns:r="http://schemas.openxmlformats.org/officeDocument/2006/relationships" xmlns:mc="http://schemas.openxmlformats.org/markup-compatibility/2006" xmlns:mv="urn:schemas-microsoft-com:mac:vml" xmlns:p="http://schemas.openxmlformats.org/presentationml/2006/main" xmlns:c="http://schemas.openxmlformats.org/drawingml/2006/chart" xmlns:dgm="http://schemas.openxmlformats.org/drawingml/2006/diagram" xmlns:o="urn:schemas-microsoft-com:office:office" xmlns:v="urn:schemas-microsoft-com:vml" xmlns:pvml="urn:schemas-microsoft-com:office:powerpoint" xmlns:com="http://schemas.openxmlformats.org/drawingml/2006/compatibility" xmlns:p14="http://schemas.microsoft.com/office/powerpoint/2010/main" xmlns:p15="http://schemas.microsoft.com/office/powerpoint/2012/main" xmlns:ahyp="http://schemas.microsoft.com/office/drawing/2018/hyperlinkcolor" autoCompressPictures="0" embedTrueTypeFonts="1" strictFirstAndLastChars="0" saveSubsetFonts="1">
+<p:presentation xmlns:a="http://schemas.openxmlformats.org/drawingml/2006/main" xmlns:r="http://schemas.openxmlformats.org/officeDocument/2006/relationships" xmlns:p="http://schemas.openxmlformats.org/presentationml/2006/main" strictFirstAndLastChars="0" embedTrueTypeFonts="1" saveSubsetFonts="1" autoCompressPictures="0">
   <p:sldMasterIdLst>
-    <p:sldMasterId id="2147483659" r:id="rId4"/>
+    <p:sldMasterId id="2147483659" r:id="rId1"/>
   </p:sldMasterIdLst>
   <p:notesMasterIdLst>
-    <p:notesMasterId r:id="rId5"/>
+    <p:notesMasterId r:id="rId10"/>
   </p:notesMasterIdLst>
   <p:sldIdLst>
-    <p:sldId id="256" r:id="rId6"/>
-    <p:sldId id="257" r:id="rId7"/>
-    <p:sldId id="258" r:id="rId8"/>
-    <p:sldId id="259" r:id="rId9"/>
-    <p:sldId id="260" r:id="rId10"/>
-    <p:sldId id="261" r:id="rId11"/>
-    <p:sldId id="262" r:id="rId12"/>
-    <p:sldId id="263" r:id="rId13"/>
+    <p:sldId id="256" r:id="rId2"/>
+    <p:sldId id="257" r:id="rId3"/>
+    <p:sldId id="258" r:id="rId4"/>
+    <p:sldId id="259" r:id="rId5"/>
+    <p:sldId id="260" r:id="rId6"/>
+    <p:sldId id="261" r:id="rId7"/>
+    <p:sldId id="262" r:id="rId8"/>
+    <p:sldId id="263" r:id="rId9"/>
   </p:sldIdLst>
-  <p:sldSz cy="5143500" cx="9144000"/>
+  <p:sldSz cx="9144000" cy="5143500" type="screen16x9"/>
   <p:notesSz cx="6858000" cy="9144000"/>
   <p:embeddedFontLst>
     <p:embeddedFont>
-      <p:font typeface="Economica"/>
-      <p:regular r:id="rId14"/>
-      <p:bold r:id="rId15"/>
-      <p:italic r:id="rId16"/>
-      <p:boldItalic r:id="rId17"/>
+      <p:font typeface="Economica" panose="020B0604020202020204" charset="0"/>
+      <p:regular r:id="rId11"/>
+      <p:bold r:id="rId12"/>
+      <p:italic r:id="rId13"/>
+      <p:boldItalic r:id="rId14"/>
     </p:embeddedFont>
     <p:embeddedFont>
-      <p:font typeface="VT323"/>
-      <p:regular r:id="rId18"/>
+      <p:font typeface="Open Sans" panose="020B0606030504020204" pitchFamily="34" charset="0"/>
+      <p:regular r:id="rId15"/>
+      <p:bold r:id="rId16"/>
+      <p:italic r:id="rId17"/>
+      <p:boldItalic r:id="rId18"/>
     </p:embeddedFont>
     <p:embeddedFont>
-      <p:font typeface="Open Sans"/>
+      <p:font typeface="VT323" panose="020B0604020202020204" charset="0"/>
       <p:regular r:id="rId19"/>
-      <p:bold r:id="rId20"/>
-      <p:italic r:id="rId21"/>
-      <p:boldItalic r:id="rId22"/>
     </p:embeddedFont>
   </p:embeddedFontLst>
   <p:defaultTextStyle>
-    <a:defPPr lvl="0" marR="0" rtl="0" algn="l">
+    <a:defPPr marR="0" lvl="0" algn="l" rtl="0">
       <a:lnSpc>
         <a:spcPct val="100000"/>
       </a:lnSpc>
@@ -51,7 +51,7 @@
         <a:spcPts val="0"/>
       </a:spcAft>
     </a:defPPr>
-    <a:lvl1pPr lvl="0" marR="0" rtl="0" algn="l">
+    <a:lvl1pPr marR="0" lvl="0" algn="l" rtl="0">
       <a:lnSpc>
         <a:spcPct val="100000"/>
       </a:lnSpc>
@@ -65,7 +65,7 @@
         <a:srgbClr val="000000"/>
       </a:buClr>
       <a:buFont typeface="Arial"/>
-      <a:defRPr b="0" i="0" sz="1400" u="none" cap="none" strike="noStrike">
+      <a:defRPr sz="1400" b="0" i="0" u="none" strike="noStrike" cap="none">
         <a:solidFill>
           <a:srgbClr val="000000"/>
         </a:solidFill>
@@ -75,7 +75,7 @@
         <a:sym typeface="Arial"/>
       </a:defRPr>
     </a:lvl1pPr>
-    <a:lvl2pPr lvl="1" marR="0" rtl="0" algn="l">
+    <a:lvl2pPr marR="0" lvl="1" algn="l" rtl="0">
       <a:lnSpc>
         <a:spcPct val="100000"/>
       </a:lnSpc>
@@ -89,7 +89,7 @@
         <a:srgbClr val="000000"/>
       </a:buClr>
       <a:buFont typeface="Arial"/>
-      <a:defRPr b="0" i="0" sz="1400" u="none" cap="none" strike="noStrike">
+      <a:defRPr sz="1400" b="0" i="0" u="none" strike="noStrike" cap="none">
         <a:solidFill>
           <a:srgbClr val="000000"/>
         </a:solidFill>
@@ -99,7 +99,7 @@
         <a:sym typeface="Arial"/>
       </a:defRPr>
     </a:lvl2pPr>
-    <a:lvl3pPr lvl="2" marR="0" rtl="0" algn="l">
+    <a:lvl3pPr marR="0" lvl="2" algn="l" rtl="0">
       <a:lnSpc>
         <a:spcPct val="100000"/>
       </a:lnSpc>
@@ -113,7 +113,7 @@
         <a:srgbClr val="000000"/>
       </a:buClr>
       <a:buFont typeface="Arial"/>
-      <a:defRPr b="0" i="0" sz="1400" u="none" cap="none" strike="noStrike">
+      <a:defRPr sz="1400" b="0" i="0" u="none" strike="noStrike" cap="none">
         <a:solidFill>
           <a:srgbClr val="000000"/>
         </a:solidFill>
@@ -123,7 +123,7 @@
         <a:sym typeface="Arial"/>
       </a:defRPr>
     </a:lvl3pPr>
-    <a:lvl4pPr lvl="3" marR="0" rtl="0" algn="l">
+    <a:lvl4pPr marR="0" lvl="3" algn="l" rtl="0">
       <a:lnSpc>
         <a:spcPct val="100000"/>
       </a:lnSpc>
@@ -137,7 +137,7 @@
         <a:srgbClr val="000000"/>
       </a:buClr>
       <a:buFont typeface="Arial"/>
-      <a:defRPr b="0" i="0" sz="1400" u="none" cap="none" strike="noStrike">
+      <a:defRPr sz="1400" b="0" i="0" u="none" strike="noStrike" cap="none">
         <a:solidFill>
           <a:srgbClr val="000000"/>
         </a:solidFill>
@@ -147,7 +147,7 @@
         <a:sym typeface="Arial"/>
       </a:defRPr>
     </a:lvl4pPr>
-    <a:lvl5pPr lvl="4" marR="0" rtl="0" algn="l">
+    <a:lvl5pPr marR="0" lvl="4" algn="l" rtl="0">
       <a:lnSpc>
         <a:spcPct val="100000"/>
       </a:lnSpc>
@@ -161,7 +161,7 @@
         <a:srgbClr val="000000"/>
       </a:buClr>
       <a:buFont typeface="Arial"/>
-      <a:defRPr b="0" i="0" sz="1400" u="none" cap="none" strike="noStrike">
+      <a:defRPr sz="1400" b="0" i="0" u="none" strike="noStrike" cap="none">
         <a:solidFill>
           <a:srgbClr val="000000"/>
         </a:solidFill>
@@ -171,7 +171,7 @@
         <a:sym typeface="Arial"/>
       </a:defRPr>
     </a:lvl5pPr>
-    <a:lvl6pPr lvl="5" marR="0" rtl="0" algn="l">
+    <a:lvl6pPr marR="0" lvl="5" algn="l" rtl="0">
       <a:lnSpc>
         <a:spcPct val="100000"/>
       </a:lnSpc>
@@ -185,7 +185,7 @@
         <a:srgbClr val="000000"/>
       </a:buClr>
       <a:buFont typeface="Arial"/>
-      <a:defRPr b="0" i="0" sz="1400" u="none" cap="none" strike="noStrike">
+      <a:defRPr sz="1400" b="0" i="0" u="none" strike="noStrike" cap="none">
         <a:solidFill>
           <a:srgbClr val="000000"/>
         </a:solidFill>
@@ -195,7 +195,7 @@
         <a:sym typeface="Arial"/>
       </a:defRPr>
     </a:lvl6pPr>
-    <a:lvl7pPr lvl="6" marR="0" rtl="0" algn="l">
+    <a:lvl7pPr marR="0" lvl="6" algn="l" rtl="0">
       <a:lnSpc>
         <a:spcPct val="100000"/>
       </a:lnSpc>
@@ -209,7 +209,7 @@
         <a:srgbClr val="000000"/>
       </a:buClr>
       <a:buFont typeface="Arial"/>
-      <a:defRPr b="0" i="0" sz="1400" u="none" cap="none" strike="noStrike">
+      <a:defRPr sz="1400" b="0" i="0" u="none" strike="noStrike" cap="none">
         <a:solidFill>
           <a:srgbClr val="000000"/>
         </a:solidFill>
@@ -219,7 +219,7 @@
         <a:sym typeface="Arial"/>
       </a:defRPr>
     </a:lvl7pPr>
-    <a:lvl8pPr lvl="7" marR="0" rtl="0" algn="l">
+    <a:lvl8pPr marR="0" lvl="7" algn="l" rtl="0">
       <a:lnSpc>
         <a:spcPct val="100000"/>
       </a:lnSpc>
@@ -233,7 +233,7 @@
         <a:srgbClr val="000000"/>
       </a:buClr>
       <a:buFont typeface="Arial"/>
-      <a:defRPr b="0" i="0" sz="1400" u="none" cap="none" strike="noStrike">
+      <a:defRPr sz="1400" b="0" i="0" u="none" strike="noStrike" cap="none">
         <a:solidFill>
           <a:srgbClr val="000000"/>
         </a:solidFill>
@@ -243,7 +243,7 @@
         <a:sym typeface="Arial"/>
       </a:defRPr>
     </a:lvl8pPr>
-    <a:lvl9pPr lvl="8" marR="0" rtl="0" algn="l">
+    <a:lvl9pPr marR="0" lvl="8" algn="l" rtl="0">
       <a:lnSpc>
         <a:spcPct val="100000"/>
       </a:lnSpc>
@@ -257,7 +257,7 @@
         <a:srgbClr val="000000"/>
       </a:buClr>
       <a:buFont typeface="Arial"/>
-      <a:defRPr b="0" i="0" sz="1400" u="none" cap="none" strike="noStrike">
+      <a:defRPr sz="1400" b="0" i="0" u="none" strike="noStrike" cap="none">
         <a:solidFill>
           <a:srgbClr val="000000"/>
         </a:solidFill>
@@ -270,7 +270,7 @@
   </p:defaultTextStyle>
   <p:extLst>
     <p:ext uri="{EFAFB233-063F-42B5-8137-9DF3F51BA10A}">
-      <p15:sldGuideLst>
+      <p15:sldGuideLst xmlns:p15="http://schemas.microsoft.com/office/powerpoint/2012/main">
         <p15:guide id="1" orient="horz" pos="1620">
           <p15:clr>
             <a:srgbClr val="A4A3A4"/>
@@ -288,11 +288,16 @@
 </file>
 
 <file path=ppt/notesMasters/notesMaster1.xml><?xml version="1.0" encoding="utf-8"?>
-<p:notesMaster xmlns:a="http://schemas.openxmlformats.org/drawingml/2006/main" xmlns:r="http://schemas.openxmlformats.org/officeDocument/2006/relationships" xmlns:mc="http://schemas.openxmlformats.org/markup-compatibility/2006" xmlns:mv="urn:schemas-microsoft-com:mac:vml" xmlns:p="http://schemas.openxmlformats.org/presentationml/2006/main" xmlns:c="http://schemas.openxmlformats.org/drawingml/2006/chart" xmlns:dgm="http://schemas.openxmlformats.org/drawingml/2006/diagram" xmlns:o="urn:schemas-microsoft-com:office:office" xmlns:v="urn:schemas-microsoft-com:vml" xmlns:pvml="urn:schemas-microsoft-com:office:powerpoint" xmlns:com="http://schemas.openxmlformats.org/drawingml/2006/compatibility" xmlns:p14="http://schemas.microsoft.com/office/powerpoint/2010/main" xmlns:p15="http://schemas.microsoft.com/office/powerpoint/2012/main" xmlns:ahyp="http://schemas.microsoft.com/office/drawing/2018/hyperlinkcolor">
+<p:notesMaster xmlns:a="http://schemas.openxmlformats.org/drawingml/2006/main" xmlns:r="http://schemas.openxmlformats.org/officeDocument/2006/relationships" xmlns:p="http://schemas.openxmlformats.org/presentationml/2006/main">
   <p:cSld>
+    <p:bg>
+      <p:bgRef idx="1001">
+        <a:schemeClr val="bg1"/>
+      </p:bgRef>
+    </p:bg>
     <p:spTree>
       <p:nvGrpSpPr>
-        <p:cNvPr id="2" name="Shape 2"/>
+        <p:cNvPr id="1" name="Shape 2"/>
         <p:cNvGrpSpPr/>
         <p:nvPr/>
       </p:nvGrpSpPr>
@@ -307,9 +312,11 @@
       <p:sp>
         <p:nvSpPr>
           <p:cNvPr id="3" name="Google Shape;3;n"/>
-          <p:cNvSpPr/>
+          <p:cNvSpPr>
+            <a:spLocks noGrp="1" noRot="1" noChangeAspect="1"/>
+          </p:cNvSpPr>
           <p:nvPr>
-            <p:ph idx="2" type="sldImg"/>
+            <p:ph type="sldImg" idx="2"/>
           </p:nvPr>
         </p:nvSpPr>
         <p:spPr>
@@ -318,9 +325,13 @@
             <a:ext cx="6096075" cy="3429000"/>
           </a:xfrm>
           <a:custGeom>
-            <a:rect b="b" l="l" r="r" t="t"/>
+            <a:avLst/>
+            <a:gdLst/>
+            <a:ahLst/>
+            <a:cxnLst/>
+            <a:rect l="l" t="t" r="r" b="b"/>
             <a:pathLst>
-              <a:path extrusionOk="0" h="120000" w="120000">
+              <a:path w="120000" h="120000" extrusionOk="0">
                 <a:moveTo>
                   <a:pt x="0" y="0"/>
                 </a:moveTo>
@@ -338,23 +349,25 @@
             </a:pathLst>
           </a:custGeom>
           <a:noFill/>
-          <a:ln cap="flat" cmpd="sng" w="9525">
+          <a:ln w="9525" cap="flat" cmpd="sng">
             <a:solidFill>
               <a:srgbClr val="000000"/>
             </a:solidFill>
             <a:prstDash val="solid"/>
             <a:round/>
-            <a:headEnd len="sm" w="sm" type="none"/>
-            <a:tailEnd len="sm" w="sm" type="none"/>
+            <a:headEnd type="none" w="sm" len="sm"/>
+            <a:tailEnd type="none" w="sm" len="sm"/>
           </a:ln>
         </p:spPr>
       </p:sp>
       <p:sp>
         <p:nvSpPr>
           <p:cNvPr id="4" name="Google Shape;4;n"/>
-          <p:cNvSpPr txBox="1"/>
+          <p:cNvSpPr txBox="1">
+            <a:spLocks noGrp="1"/>
+          </p:cNvSpPr>
           <p:nvPr>
-            <p:ph idx="1" type="body"/>
+            <p:ph type="body" idx="1"/>
           </p:nvPr>
         </p:nvSpPr>
         <p:spPr>
@@ -371,11 +384,11 @@
           </a:ln>
         </p:spPr>
         <p:txBody>
-          <a:bodyPr anchorCtr="0" anchor="t" bIns="91425" lIns="91425" spcFirstLastPara="1" rIns="91425" wrap="square" tIns="91425">
+          <a:bodyPr spcFirstLastPara="1" wrap="square" lIns="91425" tIns="91425" rIns="91425" bIns="91425" anchor="t" anchorCtr="0">
             <a:noAutofit/>
           </a:bodyPr>
           <a:lstStyle>
-            <a:lvl1pPr indent="-298450" lvl="0" marL="457200">
+            <a:lvl1pPr marL="457200" lvl="0" indent="-298450">
               <a:spcBef>
                 <a:spcPts val="0"/>
               </a:spcBef>
@@ -386,7 +399,7 @@
               <a:buChar char="●"/>
               <a:defRPr sz="1100"/>
             </a:lvl1pPr>
-            <a:lvl2pPr indent="-298450" lvl="1" marL="914400">
+            <a:lvl2pPr marL="914400" lvl="1" indent="-298450">
               <a:spcBef>
                 <a:spcPts val="0"/>
               </a:spcBef>
@@ -397,7 +410,7 @@
               <a:buChar char="○"/>
               <a:defRPr sz="1100"/>
             </a:lvl2pPr>
-            <a:lvl3pPr indent="-298450" lvl="2" marL="1371600">
+            <a:lvl3pPr marL="1371600" lvl="2" indent="-298450">
               <a:spcBef>
                 <a:spcPts val="0"/>
               </a:spcBef>
@@ -408,7 +421,7 @@
               <a:buChar char="■"/>
               <a:defRPr sz="1100"/>
             </a:lvl3pPr>
-            <a:lvl4pPr indent="-298450" lvl="3" marL="1828800">
+            <a:lvl4pPr marL="1828800" lvl="3" indent="-298450">
               <a:spcBef>
                 <a:spcPts val="0"/>
               </a:spcBef>
@@ -419,7 +432,7 @@
               <a:buChar char="●"/>
               <a:defRPr sz="1100"/>
             </a:lvl4pPr>
-            <a:lvl5pPr indent="-298450" lvl="4" marL="2286000">
+            <a:lvl5pPr marL="2286000" lvl="4" indent="-298450">
               <a:spcBef>
                 <a:spcPts val="0"/>
               </a:spcBef>
@@ -430,7 +443,7 @@
               <a:buChar char="○"/>
               <a:defRPr sz="1100"/>
             </a:lvl5pPr>
-            <a:lvl6pPr indent="-298450" lvl="5" marL="2743200">
+            <a:lvl6pPr marL="2743200" lvl="5" indent="-298450">
               <a:spcBef>
                 <a:spcPts val="0"/>
               </a:spcBef>
@@ -441,7 +454,7 @@
               <a:buChar char="■"/>
               <a:defRPr sz="1100"/>
             </a:lvl6pPr>
-            <a:lvl7pPr indent="-298450" lvl="6" marL="3200400">
+            <a:lvl7pPr marL="3200400" lvl="6" indent="-298450">
               <a:spcBef>
                 <a:spcPts val="0"/>
               </a:spcBef>
@@ -452,7 +465,7 @@
               <a:buChar char="●"/>
               <a:defRPr sz="1100"/>
             </a:lvl7pPr>
-            <a:lvl8pPr indent="-298450" lvl="7" marL="3657600">
+            <a:lvl8pPr marL="3657600" lvl="7" indent="-298450">
               <a:spcBef>
                 <a:spcPts val="0"/>
               </a:spcBef>
@@ -463,7 +476,7 @@
               <a:buChar char="○"/>
               <a:defRPr sz="1100"/>
             </a:lvl8pPr>
-            <a:lvl9pPr indent="-298450" lvl="8" marL="4114800">
+            <a:lvl9pPr marL="4114800" lvl="8" indent="-298450">
               <a:spcBef>
                 <a:spcPts val="0"/>
               </a:spcBef>
@@ -475,14 +488,16 @@
               <a:defRPr sz="1100"/>
             </a:lvl9pPr>
           </a:lstStyle>
-          <a:p/>
+          <a:p>
+            <a:endParaRPr/>
+          </a:p>
         </p:txBody>
       </p:sp>
     </p:spTree>
   </p:cSld>
-  <p:clrMap accent1="accent1" accent2="accent2" accent3="accent3" accent4="accent4" accent5="accent5" accent6="accent6" bg1="lt1" bg2="dk2" tx1="dk1" tx2="lt2" folHlink="folHlink" hlink="hlink"/>
+  <p:clrMap bg1="lt1" tx1="dk1" bg2="dk2" tx2="lt2" accent1="accent1" accent2="accent2" accent3="accent3" accent4="accent4" accent5="accent5" accent6="accent6" hlink="hlink" folHlink="folHlink"/>
   <p:notesStyle>
-    <a:defPPr lvl="0" marR="0" rtl="0" algn="l">
+    <a:defPPr marR="0" lvl="0" algn="l" rtl="0">
       <a:lnSpc>
         <a:spcPct val="100000"/>
       </a:lnSpc>
@@ -493,7 +508,7 @@
         <a:spcPts val="0"/>
       </a:spcAft>
     </a:defPPr>
-    <a:lvl1pPr lvl="0" marR="0" rtl="0" algn="l">
+    <a:lvl1pPr marR="0" lvl="0" algn="l" rtl="0">
       <a:lnSpc>
         <a:spcPct val="100000"/>
       </a:lnSpc>
@@ -507,7 +522,7 @@
         <a:srgbClr val="000000"/>
       </a:buClr>
       <a:buFont typeface="Arial"/>
-      <a:defRPr b="0" i="0" sz="1400" u="none" cap="none" strike="noStrike">
+      <a:defRPr sz="1400" b="0" i="0" u="none" strike="noStrike" cap="none">
         <a:solidFill>
           <a:srgbClr val="000000"/>
         </a:solidFill>
@@ -517,7 +532,7 @@
         <a:sym typeface="Arial"/>
       </a:defRPr>
     </a:lvl1pPr>
-    <a:lvl2pPr lvl="1" marR="0" rtl="0" algn="l">
+    <a:lvl2pPr marR="0" lvl="1" algn="l" rtl="0">
       <a:lnSpc>
         <a:spcPct val="100000"/>
       </a:lnSpc>
@@ -531,7 +546,7 @@
         <a:srgbClr val="000000"/>
       </a:buClr>
       <a:buFont typeface="Arial"/>
-      <a:defRPr b="0" i="0" sz="1400" u="none" cap="none" strike="noStrike">
+      <a:defRPr sz="1400" b="0" i="0" u="none" strike="noStrike" cap="none">
         <a:solidFill>
           <a:srgbClr val="000000"/>
         </a:solidFill>
@@ -541,7 +556,7 @@
         <a:sym typeface="Arial"/>
       </a:defRPr>
     </a:lvl2pPr>
-    <a:lvl3pPr lvl="2" marR="0" rtl="0" algn="l">
+    <a:lvl3pPr marR="0" lvl="2" algn="l" rtl="0">
       <a:lnSpc>
         <a:spcPct val="100000"/>
       </a:lnSpc>
@@ -555,7 +570,7 @@
         <a:srgbClr val="000000"/>
       </a:buClr>
       <a:buFont typeface="Arial"/>
-      <a:defRPr b="0" i="0" sz="1400" u="none" cap="none" strike="noStrike">
+      <a:defRPr sz="1400" b="0" i="0" u="none" strike="noStrike" cap="none">
         <a:solidFill>
           <a:srgbClr val="000000"/>
         </a:solidFill>
@@ -565,7 +580,7 @@
         <a:sym typeface="Arial"/>
       </a:defRPr>
     </a:lvl3pPr>
-    <a:lvl4pPr lvl="3" marR="0" rtl="0" algn="l">
+    <a:lvl4pPr marR="0" lvl="3" algn="l" rtl="0">
       <a:lnSpc>
         <a:spcPct val="100000"/>
       </a:lnSpc>
@@ -579,7 +594,7 @@
         <a:srgbClr val="000000"/>
       </a:buClr>
       <a:buFont typeface="Arial"/>
-      <a:defRPr b="0" i="0" sz="1400" u="none" cap="none" strike="noStrike">
+      <a:defRPr sz="1400" b="0" i="0" u="none" strike="noStrike" cap="none">
         <a:solidFill>
           <a:srgbClr val="000000"/>
         </a:solidFill>
@@ -589,7 +604,7 @@
         <a:sym typeface="Arial"/>
       </a:defRPr>
     </a:lvl4pPr>
-    <a:lvl5pPr lvl="4" marR="0" rtl="0" algn="l">
+    <a:lvl5pPr marR="0" lvl="4" algn="l" rtl="0">
       <a:lnSpc>
         <a:spcPct val="100000"/>
       </a:lnSpc>
@@ -603,7 +618,7 @@
         <a:srgbClr val="000000"/>
       </a:buClr>
       <a:buFont typeface="Arial"/>
-      <a:defRPr b="0" i="0" sz="1400" u="none" cap="none" strike="noStrike">
+      <a:defRPr sz="1400" b="0" i="0" u="none" strike="noStrike" cap="none">
         <a:solidFill>
           <a:srgbClr val="000000"/>
         </a:solidFill>
@@ -613,7 +628,7 @@
         <a:sym typeface="Arial"/>
       </a:defRPr>
     </a:lvl5pPr>
-    <a:lvl6pPr lvl="5" marR="0" rtl="0" algn="l">
+    <a:lvl6pPr marR="0" lvl="5" algn="l" rtl="0">
       <a:lnSpc>
         <a:spcPct val="100000"/>
       </a:lnSpc>
@@ -627,7 +642,7 @@
         <a:srgbClr val="000000"/>
       </a:buClr>
       <a:buFont typeface="Arial"/>
-      <a:defRPr b="0" i="0" sz="1400" u="none" cap="none" strike="noStrike">
+      <a:defRPr sz="1400" b="0" i="0" u="none" strike="noStrike" cap="none">
         <a:solidFill>
           <a:srgbClr val="000000"/>
         </a:solidFill>
@@ -637,7 +652,7 @@
         <a:sym typeface="Arial"/>
       </a:defRPr>
     </a:lvl6pPr>
-    <a:lvl7pPr lvl="6" marR="0" rtl="0" algn="l">
+    <a:lvl7pPr marR="0" lvl="6" algn="l" rtl="0">
       <a:lnSpc>
         <a:spcPct val="100000"/>
       </a:lnSpc>
@@ -651,7 +666,7 @@
         <a:srgbClr val="000000"/>
       </a:buClr>
       <a:buFont typeface="Arial"/>
-      <a:defRPr b="0" i="0" sz="1400" u="none" cap="none" strike="noStrike">
+      <a:defRPr sz="1400" b="0" i="0" u="none" strike="noStrike" cap="none">
         <a:solidFill>
           <a:srgbClr val="000000"/>
         </a:solidFill>
@@ -661,7 +676,7 @@
         <a:sym typeface="Arial"/>
       </a:defRPr>
     </a:lvl7pPr>
-    <a:lvl8pPr lvl="7" marR="0" rtl="0" algn="l">
+    <a:lvl8pPr marR="0" lvl="7" algn="l" rtl="0">
       <a:lnSpc>
         <a:spcPct val="100000"/>
       </a:lnSpc>
@@ -675,7 +690,7 @@
         <a:srgbClr val="000000"/>
       </a:buClr>
       <a:buFont typeface="Arial"/>
-      <a:defRPr b="0" i="0" sz="1400" u="none" cap="none" strike="noStrike">
+      <a:defRPr sz="1400" b="0" i="0" u="none" strike="noStrike" cap="none">
         <a:solidFill>
           <a:srgbClr val="000000"/>
         </a:solidFill>
@@ -685,7 +700,7 @@
         <a:sym typeface="Arial"/>
       </a:defRPr>
     </a:lvl8pPr>
-    <a:lvl9pPr lvl="8" marR="0" rtl="0" algn="l">
+    <a:lvl9pPr marR="0" lvl="8" algn="l" rtl="0">
       <a:lnSpc>
         <a:spcPct val="100000"/>
       </a:lnSpc>
@@ -699,7 +714,7 @@
         <a:srgbClr val="000000"/>
       </a:buClr>
       <a:buFont typeface="Arial"/>
-      <a:defRPr b="0" i="0" sz="1400" u="none" cap="none" strike="noStrike">
+      <a:defRPr sz="1400" b="0" i="0" u="none" strike="noStrike" cap="none">
         <a:solidFill>
           <a:srgbClr val="000000"/>
         </a:solidFill>
@@ -714,11 +729,11 @@
 </file>
 
 <file path=ppt/notesSlides/notesSlide1.xml><?xml version="1.0" encoding="utf-8"?>
-<p:notes xmlns:a="http://schemas.openxmlformats.org/drawingml/2006/main" xmlns:r="http://schemas.openxmlformats.org/officeDocument/2006/relationships" xmlns:mc="http://schemas.openxmlformats.org/markup-compatibility/2006" xmlns:mv="urn:schemas-microsoft-com:mac:vml" xmlns:p="http://schemas.openxmlformats.org/presentationml/2006/main" xmlns:c="http://schemas.openxmlformats.org/drawingml/2006/chart" xmlns:dgm="http://schemas.openxmlformats.org/drawingml/2006/diagram" xmlns:o="urn:schemas-microsoft-com:office:office" xmlns:v="urn:schemas-microsoft-com:vml" xmlns:pvml="urn:schemas-microsoft-com:office:powerpoint" xmlns:com="http://schemas.openxmlformats.org/drawingml/2006/compatibility" xmlns:p14="http://schemas.microsoft.com/office/powerpoint/2010/main" xmlns:p15="http://schemas.microsoft.com/office/powerpoint/2012/main" xmlns:ahyp="http://schemas.microsoft.com/office/drawing/2018/hyperlinkcolor" showMasterPhAnim="0" showMasterSp="0">
+<p:notes xmlns:a="http://schemas.openxmlformats.org/drawingml/2006/main" xmlns:r="http://schemas.openxmlformats.org/officeDocument/2006/relationships" xmlns:p="http://schemas.openxmlformats.org/presentationml/2006/main" showMasterSp="0" showMasterPhAnim="0">
   <p:cSld>
     <p:spTree>
       <p:nvGrpSpPr>
-        <p:cNvPr id="58" name="Shape 58"/>
+        <p:cNvPr id="1" name="Shape 58"/>
         <p:cNvGrpSpPr/>
         <p:nvPr/>
       </p:nvGrpSpPr>
@@ -733,9 +748,11 @@
       <p:sp>
         <p:nvSpPr>
           <p:cNvPr id="59" name="Google Shape;59;p:notes"/>
-          <p:cNvSpPr/>
+          <p:cNvSpPr>
+            <a:spLocks noGrp="1" noRot="1" noChangeAspect="1"/>
+          </p:cNvSpPr>
           <p:nvPr>
-            <p:ph idx="2" type="sldImg"/>
+            <p:ph type="sldImg" idx="2"/>
           </p:nvPr>
         </p:nvSpPr>
         <p:spPr>
@@ -744,9 +761,13 @@
             <a:ext cx="6096075" cy="3429000"/>
           </a:xfrm>
           <a:custGeom>
-            <a:rect b="b" l="l" r="r" t="t"/>
+            <a:avLst/>
+            <a:gdLst/>
+            <a:ahLst/>
+            <a:cxnLst/>
+            <a:rect l="l" t="t" r="r" b="b"/>
             <a:pathLst>
-              <a:path extrusionOk="0" h="120000" w="120000">
+              <a:path w="120000" h="120000" extrusionOk="0">
                 <a:moveTo>
                   <a:pt x="0" y="0"/>
                 </a:moveTo>
@@ -768,9 +789,11 @@
       <p:sp>
         <p:nvSpPr>
           <p:cNvPr id="60" name="Google Shape;60;p:notes"/>
-          <p:cNvSpPr txBox="1"/>
+          <p:cNvSpPr txBox="1">
+            <a:spLocks noGrp="1"/>
+          </p:cNvSpPr>
           <p:nvPr>
-            <p:ph idx="1" type="body"/>
+            <p:ph type="body" idx="1"/>
           </p:nvPr>
         </p:nvSpPr>
         <p:spPr>
@@ -783,12 +806,12 @@
           </a:prstGeom>
         </p:spPr>
         <p:txBody>
-          <a:bodyPr anchorCtr="0" anchor="t" bIns="91425" lIns="91425" spcFirstLastPara="1" rIns="91425" wrap="square" tIns="91425">
+          <a:bodyPr spcFirstLastPara="1" wrap="square" lIns="91425" tIns="91425" rIns="91425" bIns="91425" anchor="t" anchorCtr="0">
             <a:noAutofit/>
           </a:bodyPr>
           <a:lstStyle/>
           <a:p>
-            <a:pPr indent="0" lvl="0" marL="0" rtl="0" algn="l">
+            <a:pPr marL="0" lvl="0" indent="0" algn="l" rtl="0">
               <a:spcBef>
                 <a:spcPts val="0"/>
               </a:spcBef>
@@ -797,9 +820,6 @@
               </a:spcAft>
               <a:buNone/>
             </a:pPr>
-            <a:r>
-              <a:t/>
-            </a:r>
             <a:endParaRPr/>
           </a:p>
         </p:txBody>
@@ -813,11 +833,11 @@
 </file>
 
 <file path=ppt/notesSlides/notesSlide2.xml><?xml version="1.0" encoding="utf-8"?>
-<p:notes xmlns:a="http://schemas.openxmlformats.org/drawingml/2006/main" xmlns:r="http://schemas.openxmlformats.org/officeDocument/2006/relationships" xmlns:mc="http://schemas.openxmlformats.org/markup-compatibility/2006" xmlns:mv="urn:schemas-microsoft-com:mac:vml" xmlns:p="http://schemas.openxmlformats.org/presentationml/2006/main" xmlns:c="http://schemas.openxmlformats.org/drawingml/2006/chart" xmlns:dgm="http://schemas.openxmlformats.org/drawingml/2006/diagram" xmlns:o="urn:schemas-microsoft-com:office:office" xmlns:v="urn:schemas-microsoft-com:vml" xmlns:pvml="urn:schemas-microsoft-com:office:powerpoint" xmlns:com="http://schemas.openxmlformats.org/drawingml/2006/compatibility" xmlns:p14="http://schemas.microsoft.com/office/powerpoint/2010/main" xmlns:p15="http://schemas.microsoft.com/office/powerpoint/2012/main" xmlns:ahyp="http://schemas.microsoft.com/office/drawing/2018/hyperlinkcolor" showMasterPhAnim="0" showMasterSp="0">
+<p:notes xmlns:a="http://schemas.openxmlformats.org/drawingml/2006/main" xmlns:r="http://schemas.openxmlformats.org/officeDocument/2006/relationships" xmlns:p="http://schemas.openxmlformats.org/presentationml/2006/main" showMasterSp="0" showMasterPhAnim="0">
   <p:cSld>
     <p:spTree>
       <p:nvGrpSpPr>
-        <p:cNvPr id="64" name="Shape 64"/>
+        <p:cNvPr id="1" name="Shape 64"/>
         <p:cNvGrpSpPr/>
         <p:nvPr/>
       </p:nvGrpSpPr>
@@ -832,9 +852,11 @@
       <p:sp>
         <p:nvSpPr>
           <p:cNvPr id="65" name="Google Shape;65;g17746d812b7_0_77:notes"/>
-          <p:cNvSpPr/>
+          <p:cNvSpPr>
+            <a:spLocks noGrp="1" noRot="1" noChangeAspect="1"/>
+          </p:cNvSpPr>
           <p:nvPr>
-            <p:ph idx="2" type="sldImg"/>
+            <p:ph type="sldImg" idx="2"/>
           </p:nvPr>
         </p:nvSpPr>
         <p:spPr>
@@ -843,9 +865,13 @@
             <a:ext cx="6096000" cy="3429000"/>
           </a:xfrm>
           <a:custGeom>
-            <a:rect b="b" l="l" r="r" t="t"/>
+            <a:avLst/>
+            <a:gdLst/>
+            <a:ahLst/>
+            <a:cxnLst/>
+            <a:rect l="l" t="t" r="r" b="b"/>
             <a:pathLst>
-              <a:path extrusionOk="0" h="120000" w="120000">
+              <a:path w="120000" h="120000" extrusionOk="0">
                 <a:moveTo>
                   <a:pt x="0" y="0"/>
                 </a:moveTo>
@@ -867,9 +893,11 @@
       <p:sp>
         <p:nvSpPr>
           <p:cNvPr id="66" name="Google Shape;66;g17746d812b7_0_77:notes"/>
-          <p:cNvSpPr txBox="1"/>
+          <p:cNvSpPr txBox="1">
+            <a:spLocks noGrp="1"/>
+          </p:cNvSpPr>
           <p:nvPr>
-            <p:ph idx="1" type="body"/>
+            <p:ph type="body" idx="1"/>
           </p:nvPr>
         </p:nvSpPr>
         <p:spPr>
@@ -882,12 +910,12 @@
           </a:prstGeom>
         </p:spPr>
         <p:txBody>
-          <a:bodyPr anchorCtr="0" anchor="t" bIns="91425" lIns="91425" spcFirstLastPara="1" rIns="91425" wrap="square" tIns="91425">
+          <a:bodyPr spcFirstLastPara="1" wrap="square" lIns="91425" tIns="91425" rIns="91425" bIns="91425" anchor="t" anchorCtr="0">
             <a:noAutofit/>
           </a:bodyPr>
           <a:lstStyle/>
           <a:p>
-            <a:pPr indent="0" lvl="0" marL="0" rtl="0" algn="l">
+            <a:pPr marL="0" lvl="0" indent="0" algn="l" rtl="0">
               <a:spcBef>
                 <a:spcPts val="0"/>
               </a:spcBef>
@@ -896,9 +924,6 @@
               </a:spcAft>
               <a:buNone/>
             </a:pPr>
-            <a:r>
-              <a:t/>
-            </a:r>
             <a:endParaRPr/>
           </a:p>
         </p:txBody>
@@ -912,11 +937,11 @@
 </file>
 
 <file path=ppt/notesSlides/notesSlide3.xml><?xml version="1.0" encoding="utf-8"?>
-<p:notes xmlns:a="http://schemas.openxmlformats.org/drawingml/2006/main" xmlns:r="http://schemas.openxmlformats.org/officeDocument/2006/relationships" xmlns:mc="http://schemas.openxmlformats.org/markup-compatibility/2006" xmlns:mv="urn:schemas-microsoft-com:mac:vml" xmlns:p="http://schemas.openxmlformats.org/presentationml/2006/main" xmlns:c="http://schemas.openxmlformats.org/drawingml/2006/chart" xmlns:dgm="http://schemas.openxmlformats.org/drawingml/2006/diagram" xmlns:o="urn:schemas-microsoft-com:office:office" xmlns:v="urn:schemas-microsoft-com:vml" xmlns:pvml="urn:schemas-microsoft-com:office:powerpoint" xmlns:com="http://schemas.openxmlformats.org/drawingml/2006/compatibility" xmlns:p14="http://schemas.microsoft.com/office/powerpoint/2010/main" xmlns:p15="http://schemas.microsoft.com/office/powerpoint/2012/main" xmlns:ahyp="http://schemas.microsoft.com/office/drawing/2018/hyperlinkcolor" showMasterPhAnim="0" showMasterSp="0">
+<p:notes xmlns:a="http://schemas.openxmlformats.org/drawingml/2006/main" xmlns:r="http://schemas.openxmlformats.org/officeDocument/2006/relationships" xmlns:p="http://schemas.openxmlformats.org/presentationml/2006/main" showMasterSp="0" showMasterPhAnim="0">
   <p:cSld>
     <p:spTree>
       <p:nvGrpSpPr>
-        <p:cNvPr id="70" name="Shape 70"/>
+        <p:cNvPr id="1" name="Shape 70"/>
         <p:cNvGrpSpPr/>
         <p:nvPr/>
       </p:nvGrpSpPr>
@@ -931,9 +956,11 @@
       <p:sp>
         <p:nvSpPr>
           <p:cNvPr id="71" name="Google Shape;71;g17746d812b7_0_86:notes"/>
-          <p:cNvSpPr/>
+          <p:cNvSpPr>
+            <a:spLocks noGrp="1" noRot="1" noChangeAspect="1"/>
+          </p:cNvSpPr>
           <p:nvPr>
-            <p:ph idx="2" type="sldImg"/>
+            <p:ph type="sldImg" idx="2"/>
           </p:nvPr>
         </p:nvSpPr>
         <p:spPr>
@@ -942,9 +969,13 @@
             <a:ext cx="6096000" cy="3429000"/>
           </a:xfrm>
           <a:custGeom>
-            <a:rect b="b" l="l" r="r" t="t"/>
+            <a:avLst/>
+            <a:gdLst/>
+            <a:ahLst/>
+            <a:cxnLst/>
+            <a:rect l="l" t="t" r="r" b="b"/>
             <a:pathLst>
-              <a:path extrusionOk="0" h="120000" w="120000">
+              <a:path w="120000" h="120000" extrusionOk="0">
                 <a:moveTo>
                   <a:pt x="0" y="0"/>
                 </a:moveTo>
@@ -966,9 +997,11 @@
       <p:sp>
         <p:nvSpPr>
           <p:cNvPr id="72" name="Google Shape;72;g17746d812b7_0_86:notes"/>
-          <p:cNvSpPr txBox="1"/>
+          <p:cNvSpPr txBox="1">
+            <a:spLocks noGrp="1"/>
+          </p:cNvSpPr>
           <p:nvPr>
-            <p:ph idx="1" type="body"/>
+            <p:ph type="body" idx="1"/>
           </p:nvPr>
         </p:nvSpPr>
         <p:spPr>
@@ -981,12 +1014,12 @@
           </a:prstGeom>
         </p:spPr>
         <p:txBody>
-          <a:bodyPr anchorCtr="0" anchor="t" bIns="91425" lIns="91425" spcFirstLastPara="1" rIns="91425" wrap="square" tIns="91425">
+          <a:bodyPr spcFirstLastPara="1" wrap="square" lIns="91425" tIns="91425" rIns="91425" bIns="91425" anchor="t" anchorCtr="0">
             <a:noAutofit/>
           </a:bodyPr>
           <a:lstStyle/>
           <a:p>
-            <a:pPr indent="0" lvl="0" marL="0" rtl="0" algn="l">
+            <a:pPr marL="0" lvl="0" indent="0" algn="l" rtl="0">
               <a:spcBef>
                 <a:spcPts val="0"/>
               </a:spcBef>
@@ -995,9 +1028,6 @@
               </a:spcAft>
               <a:buNone/>
             </a:pPr>
-            <a:r>
-              <a:t/>
-            </a:r>
             <a:endParaRPr/>
           </a:p>
         </p:txBody>
@@ -1011,11 +1041,11 @@
 </file>
 
 <file path=ppt/notesSlides/notesSlide4.xml><?xml version="1.0" encoding="utf-8"?>
-<p:notes xmlns:a="http://schemas.openxmlformats.org/drawingml/2006/main" xmlns:r="http://schemas.openxmlformats.org/officeDocument/2006/relationships" xmlns:mc="http://schemas.openxmlformats.org/markup-compatibility/2006" xmlns:mv="urn:schemas-microsoft-com:mac:vml" xmlns:p="http://schemas.openxmlformats.org/presentationml/2006/main" xmlns:c="http://schemas.openxmlformats.org/drawingml/2006/chart" xmlns:dgm="http://schemas.openxmlformats.org/drawingml/2006/diagram" xmlns:o="urn:schemas-microsoft-com:office:office" xmlns:v="urn:schemas-microsoft-com:vml" xmlns:pvml="urn:schemas-microsoft-com:office:powerpoint" xmlns:com="http://schemas.openxmlformats.org/drawingml/2006/compatibility" xmlns:p14="http://schemas.microsoft.com/office/powerpoint/2010/main" xmlns:p15="http://schemas.microsoft.com/office/powerpoint/2012/main" xmlns:ahyp="http://schemas.microsoft.com/office/drawing/2018/hyperlinkcolor" showMasterPhAnim="0" showMasterSp="0">
+<p:notes xmlns:a="http://schemas.openxmlformats.org/drawingml/2006/main" xmlns:r="http://schemas.openxmlformats.org/officeDocument/2006/relationships" xmlns:p="http://schemas.openxmlformats.org/presentationml/2006/main" showMasterSp="0" showMasterPhAnim="0">
   <p:cSld>
     <p:spTree>
       <p:nvGrpSpPr>
-        <p:cNvPr id="77" name="Shape 77"/>
+        <p:cNvPr id="1" name="Shape 77"/>
         <p:cNvGrpSpPr/>
         <p:nvPr/>
       </p:nvGrpSpPr>
@@ -1030,9 +1060,11 @@
       <p:sp>
         <p:nvSpPr>
           <p:cNvPr id="78" name="Google Shape;78;g178c6e37247_0_0:notes"/>
-          <p:cNvSpPr/>
+          <p:cNvSpPr>
+            <a:spLocks noGrp="1" noRot="1" noChangeAspect="1"/>
+          </p:cNvSpPr>
           <p:nvPr>
-            <p:ph idx="2" type="sldImg"/>
+            <p:ph type="sldImg" idx="2"/>
           </p:nvPr>
         </p:nvSpPr>
         <p:spPr>
@@ -1041,9 +1073,13 @@
             <a:ext cx="6096000" cy="3429000"/>
           </a:xfrm>
           <a:custGeom>
-            <a:rect b="b" l="l" r="r" t="t"/>
+            <a:avLst/>
+            <a:gdLst/>
+            <a:ahLst/>
+            <a:cxnLst/>
+            <a:rect l="l" t="t" r="r" b="b"/>
             <a:pathLst>
-              <a:path extrusionOk="0" h="120000" w="120000">
+              <a:path w="120000" h="120000" extrusionOk="0">
                 <a:moveTo>
                   <a:pt x="0" y="0"/>
                 </a:moveTo>
@@ -1065,9 +1101,11 @@
       <p:sp>
         <p:nvSpPr>
           <p:cNvPr id="79" name="Google Shape;79;g178c6e37247_0_0:notes"/>
-          <p:cNvSpPr txBox="1"/>
+          <p:cNvSpPr txBox="1">
+            <a:spLocks noGrp="1"/>
+          </p:cNvSpPr>
           <p:nvPr>
-            <p:ph idx="1" type="body"/>
+            <p:ph type="body" idx="1"/>
           </p:nvPr>
         </p:nvSpPr>
         <p:spPr>
@@ -1080,12 +1118,12 @@
           </a:prstGeom>
         </p:spPr>
         <p:txBody>
-          <a:bodyPr anchorCtr="0" anchor="t" bIns="91425" lIns="91425" spcFirstLastPara="1" rIns="91425" wrap="square" tIns="91425">
+          <a:bodyPr spcFirstLastPara="1" wrap="square" lIns="91425" tIns="91425" rIns="91425" bIns="91425" anchor="t" anchorCtr="0">
             <a:noAutofit/>
           </a:bodyPr>
           <a:lstStyle/>
           <a:p>
-            <a:pPr indent="0" lvl="0" marL="0" rtl="0" algn="l">
+            <a:pPr marL="0" lvl="0" indent="0" algn="l" rtl="0">
               <a:spcBef>
                 <a:spcPts val="0"/>
               </a:spcBef>
@@ -1094,9 +1132,6 @@
               </a:spcAft>
               <a:buNone/>
             </a:pPr>
-            <a:r>
-              <a:t/>
-            </a:r>
             <a:endParaRPr/>
           </a:p>
         </p:txBody>
@@ -1110,11 +1145,11 @@
 </file>
 
 <file path=ppt/notesSlides/notesSlide5.xml><?xml version="1.0" encoding="utf-8"?>
-<p:notes xmlns:a="http://schemas.openxmlformats.org/drawingml/2006/main" xmlns:r="http://schemas.openxmlformats.org/officeDocument/2006/relationships" xmlns:mc="http://schemas.openxmlformats.org/markup-compatibility/2006" xmlns:mv="urn:schemas-microsoft-com:mac:vml" xmlns:p="http://schemas.openxmlformats.org/presentationml/2006/main" xmlns:c="http://schemas.openxmlformats.org/drawingml/2006/chart" xmlns:dgm="http://schemas.openxmlformats.org/drawingml/2006/diagram" xmlns:o="urn:schemas-microsoft-com:office:office" xmlns:v="urn:schemas-microsoft-com:vml" xmlns:pvml="urn:schemas-microsoft-com:office:powerpoint" xmlns:com="http://schemas.openxmlformats.org/drawingml/2006/compatibility" xmlns:p14="http://schemas.microsoft.com/office/powerpoint/2010/main" xmlns:p15="http://schemas.microsoft.com/office/powerpoint/2012/main" xmlns:ahyp="http://schemas.microsoft.com/office/drawing/2018/hyperlinkcolor" showMasterPhAnim="0" showMasterSp="0">
+<p:notes xmlns:a="http://schemas.openxmlformats.org/drawingml/2006/main" xmlns:r="http://schemas.openxmlformats.org/officeDocument/2006/relationships" xmlns:p="http://schemas.openxmlformats.org/presentationml/2006/main" showMasterSp="0" showMasterPhAnim="0">
   <p:cSld>
     <p:spTree>
       <p:nvGrpSpPr>
-        <p:cNvPr id="84" name="Shape 84"/>
+        <p:cNvPr id="1" name="Shape 84"/>
         <p:cNvGrpSpPr/>
         <p:nvPr/>
       </p:nvGrpSpPr>
@@ -1129,9 +1164,11 @@
       <p:sp>
         <p:nvSpPr>
           <p:cNvPr id="85" name="Google Shape;85;g178c6e37247_0_5:notes"/>
-          <p:cNvSpPr/>
+          <p:cNvSpPr>
+            <a:spLocks noGrp="1" noRot="1" noChangeAspect="1"/>
+          </p:cNvSpPr>
           <p:nvPr>
-            <p:ph idx="2" type="sldImg"/>
+            <p:ph type="sldImg" idx="2"/>
           </p:nvPr>
         </p:nvSpPr>
         <p:spPr>
@@ -1140,9 +1177,13 @@
             <a:ext cx="6096000" cy="3429000"/>
           </a:xfrm>
           <a:custGeom>
-            <a:rect b="b" l="l" r="r" t="t"/>
+            <a:avLst/>
+            <a:gdLst/>
+            <a:ahLst/>
+            <a:cxnLst/>
+            <a:rect l="l" t="t" r="r" b="b"/>
             <a:pathLst>
-              <a:path extrusionOk="0" h="120000" w="120000">
+              <a:path w="120000" h="120000" extrusionOk="0">
                 <a:moveTo>
                   <a:pt x="0" y="0"/>
                 </a:moveTo>
@@ -1164,9 +1205,11 @@
       <p:sp>
         <p:nvSpPr>
           <p:cNvPr id="86" name="Google Shape;86;g178c6e37247_0_5:notes"/>
-          <p:cNvSpPr txBox="1"/>
+          <p:cNvSpPr txBox="1">
+            <a:spLocks noGrp="1"/>
+          </p:cNvSpPr>
           <p:nvPr>
-            <p:ph idx="1" type="body"/>
+            <p:ph type="body" idx="1"/>
           </p:nvPr>
         </p:nvSpPr>
         <p:spPr>
@@ -1179,12 +1222,12 @@
           </a:prstGeom>
         </p:spPr>
         <p:txBody>
-          <a:bodyPr anchorCtr="0" anchor="t" bIns="91425" lIns="91425" spcFirstLastPara="1" rIns="91425" wrap="square" tIns="91425">
+          <a:bodyPr spcFirstLastPara="1" wrap="square" lIns="91425" tIns="91425" rIns="91425" bIns="91425" anchor="t" anchorCtr="0">
             <a:noAutofit/>
           </a:bodyPr>
           <a:lstStyle/>
           <a:p>
-            <a:pPr indent="0" lvl="0" marL="0" rtl="0" algn="l">
+            <a:pPr marL="0" lvl="0" indent="0" algn="l" rtl="0">
               <a:spcBef>
                 <a:spcPts val="0"/>
               </a:spcBef>
@@ -1193,9 +1236,6 @@
               </a:spcAft>
               <a:buNone/>
             </a:pPr>
-            <a:r>
-              <a:t/>
-            </a:r>
             <a:endParaRPr/>
           </a:p>
         </p:txBody>
@@ -1209,11 +1249,11 @@
 </file>
 
 <file path=ppt/notesSlides/notesSlide6.xml><?xml version="1.0" encoding="utf-8"?>
-<p:notes xmlns:a="http://schemas.openxmlformats.org/drawingml/2006/main" xmlns:r="http://schemas.openxmlformats.org/officeDocument/2006/relationships" xmlns:mc="http://schemas.openxmlformats.org/markup-compatibility/2006" xmlns:mv="urn:schemas-microsoft-com:mac:vml" xmlns:p="http://schemas.openxmlformats.org/presentationml/2006/main" xmlns:c="http://schemas.openxmlformats.org/drawingml/2006/chart" xmlns:dgm="http://schemas.openxmlformats.org/drawingml/2006/diagram" xmlns:o="urn:schemas-microsoft-com:office:office" xmlns:v="urn:schemas-microsoft-com:vml" xmlns:pvml="urn:schemas-microsoft-com:office:powerpoint" xmlns:com="http://schemas.openxmlformats.org/drawingml/2006/compatibility" xmlns:p14="http://schemas.microsoft.com/office/powerpoint/2010/main" xmlns:p15="http://schemas.microsoft.com/office/powerpoint/2012/main" xmlns:ahyp="http://schemas.microsoft.com/office/drawing/2018/hyperlinkcolor" showMasterPhAnim="0" showMasterSp="0">
+<p:notes xmlns:a="http://schemas.openxmlformats.org/drawingml/2006/main" xmlns:r="http://schemas.openxmlformats.org/officeDocument/2006/relationships" xmlns:p="http://schemas.openxmlformats.org/presentationml/2006/main" showMasterSp="0" showMasterPhAnim="0">
   <p:cSld>
     <p:spTree>
       <p:nvGrpSpPr>
-        <p:cNvPr id="90" name="Shape 90"/>
+        <p:cNvPr id="1" name="Shape 90"/>
         <p:cNvGrpSpPr/>
         <p:nvPr/>
       </p:nvGrpSpPr>
@@ -1228,9 +1268,11 @@
       <p:sp>
         <p:nvSpPr>
           <p:cNvPr id="91" name="Google Shape;91;g178c6e37247_0_15:notes"/>
-          <p:cNvSpPr/>
+          <p:cNvSpPr>
+            <a:spLocks noGrp="1" noRot="1" noChangeAspect="1"/>
+          </p:cNvSpPr>
           <p:nvPr>
-            <p:ph idx="2" type="sldImg"/>
+            <p:ph type="sldImg" idx="2"/>
           </p:nvPr>
         </p:nvSpPr>
         <p:spPr>
@@ -1239,9 +1281,13 @@
             <a:ext cx="6096000" cy="3429000"/>
           </a:xfrm>
           <a:custGeom>
-            <a:rect b="b" l="l" r="r" t="t"/>
+            <a:avLst/>
+            <a:gdLst/>
+            <a:ahLst/>
+            <a:cxnLst/>
+            <a:rect l="l" t="t" r="r" b="b"/>
             <a:pathLst>
-              <a:path extrusionOk="0" h="120000" w="120000">
+              <a:path w="120000" h="120000" extrusionOk="0">
                 <a:moveTo>
                   <a:pt x="0" y="0"/>
                 </a:moveTo>
@@ -1263,9 +1309,11 @@
       <p:sp>
         <p:nvSpPr>
           <p:cNvPr id="92" name="Google Shape;92;g178c6e37247_0_15:notes"/>
-          <p:cNvSpPr txBox="1"/>
+          <p:cNvSpPr txBox="1">
+            <a:spLocks noGrp="1"/>
+          </p:cNvSpPr>
           <p:nvPr>
-            <p:ph idx="1" type="body"/>
+            <p:ph type="body" idx="1"/>
           </p:nvPr>
         </p:nvSpPr>
         <p:spPr>
@@ -1278,12 +1326,12 @@
           </a:prstGeom>
         </p:spPr>
         <p:txBody>
-          <a:bodyPr anchorCtr="0" anchor="t" bIns="91425" lIns="91425" spcFirstLastPara="1" rIns="91425" wrap="square" tIns="91425">
+          <a:bodyPr spcFirstLastPara="1" wrap="square" lIns="91425" tIns="91425" rIns="91425" bIns="91425" anchor="t" anchorCtr="0">
             <a:noAutofit/>
           </a:bodyPr>
           <a:lstStyle/>
           <a:p>
-            <a:pPr indent="0" lvl="0" marL="0" rtl="0" algn="l">
+            <a:pPr marL="0" lvl="0" indent="0" algn="l" rtl="0">
               <a:spcBef>
                 <a:spcPts val="0"/>
               </a:spcBef>
@@ -1292,9 +1340,6 @@
               </a:spcAft>
               <a:buNone/>
             </a:pPr>
-            <a:r>
-              <a:t/>
-            </a:r>
             <a:endParaRPr/>
           </a:p>
         </p:txBody>
@@ -1308,11 +1353,11 @@
 </file>
 
 <file path=ppt/notesSlides/notesSlide7.xml><?xml version="1.0" encoding="utf-8"?>
-<p:notes xmlns:a="http://schemas.openxmlformats.org/drawingml/2006/main" xmlns:r="http://schemas.openxmlformats.org/officeDocument/2006/relationships" xmlns:mc="http://schemas.openxmlformats.org/markup-compatibility/2006" xmlns:mv="urn:schemas-microsoft-com:mac:vml" xmlns:p="http://schemas.openxmlformats.org/presentationml/2006/main" xmlns:c="http://schemas.openxmlformats.org/drawingml/2006/chart" xmlns:dgm="http://schemas.openxmlformats.org/drawingml/2006/diagram" xmlns:o="urn:schemas-microsoft-com:office:office" xmlns:v="urn:schemas-microsoft-com:vml" xmlns:pvml="urn:schemas-microsoft-com:office:powerpoint" xmlns:com="http://schemas.openxmlformats.org/drawingml/2006/compatibility" xmlns:p14="http://schemas.microsoft.com/office/powerpoint/2010/main" xmlns:p15="http://schemas.microsoft.com/office/powerpoint/2012/main" xmlns:ahyp="http://schemas.microsoft.com/office/drawing/2018/hyperlinkcolor" showMasterPhAnim="0" showMasterSp="0">
+<p:notes xmlns:a="http://schemas.openxmlformats.org/drawingml/2006/main" xmlns:r="http://schemas.openxmlformats.org/officeDocument/2006/relationships" xmlns:p="http://schemas.openxmlformats.org/presentationml/2006/main" showMasterSp="0" showMasterPhAnim="0">
   <p:cSld>
     <p:spTree>
       <p:nvGrpSpPr>
-        <p:cNvPr id="97" name="Shape 97"/>
+        <p:cNvPr id="1" name="Shape 97"/>
         <p:cNvGrpSpPr/>
         <p:nvPr/>
       </p:nvGrpSpPr>
@@ -1327,20 +1372,26 @@
       <p:sp>
         <p:nvSpPr>
           <p:cNvPr id="98" name="Google Shape;98;g178c6e37247_0_31:notes"/>
-          <p:cNvSpPr/>
+          <p:cNvSpPr>
+            <a:spLocks noGrp="1" noRot="1" noChangeAspect="1"/>
+          </p:cNvSpPr>
           <p:nvPr>
-            <p:ph idx="2" type="sldImg"/>
+            <p:ph type="sldImg" idx="2"/>
           </p:nvPr>
         </p:nvSpPr>
         <p:spPr>
           <a:xfrm>
-            <a:off x="381300" y="685800"/>
+            <a:off x="381000" y="685800"/>
             <a:ext cx="6096000" cy="3429000"/>
           </a:xfrm>
           <a:custGeom>
-            <a:rect b="b" l="l" r="r" t="t"/>
+            <a:avLst/>
+            <a:gdLst/>
+            <a:ahLst/>
+            <a:cxnLst/>
+            <a:rect l="l" t="t" r="r" b="b"/>
             <a:pathLst>
-              <a:path extrusionOk="0" h="120000" w="120000">
+              <a:path w="120000" h="120000" extrusionOk="0">
                 <a:moveTo>
                   <a:pt x="0" y="0"/>
                 </a:moveTo>
@@ -1362,9 +1413,11 @@
       <p:sp>
         <p:nvSpPr>
           <p:cNvPr id="99" name="Google Shape;99;g178c6e37247_0_31:notes"/>
-          <p:cNvSpPr txBox="1"/>
+          <p:cNvSpPr txBox="1">
+            <a:spLocks noGrp="1"/>
+          </p:cNvSpPr>
           <p:nvPr>
-            <p:ph idx="1" type="body"/>
+            <p:ph type="body" idx="1"/>
           </p:nvPr>
         </p:nvSpPr>
         <p:spPr>
@@ -1377,12 +1430,12 @@
           </a:prstGeom>
         </p:spPr>
         <p:txBody>
-          <a:bodyPr anchorCtr="0" anchor="t" bIns="91425" lIns="91425" spcFirstLastPara="1" rIns="91425" wrap="square" tIns="91425">
+          <a:bodyPr spcFirstLastPara="1" wrap="square" lIns="91425" tIns="91425" rIns="91425" bIns="91425" anchor="t" anchorCtr="0">
             <a:noAutofit/>
           </a:bodyPr>
           <a:lstStyle/>
           <a:p>
-            <a:pPr indent="0" lvl="0" marL="0" rtl="0" algn="l">
+            <a:pPr marL="0" lvl="0" indent="0" algn="l" rtl="0">
               <a:spcBef>
                 <a:spcPts val="0"/>
               </a:spcBef>
@@ -1391,9 +1444,6 @@
               </a:spcAft>
               <a:buNone/>
             </a:pPr>
-            <a:r>
-              <a:t/>
-            </a:r>
             <a:endParaRPr/>
           </a:p>
         </p:txBody>
@@ -1407,11 +1457,11 @@
 </file>
 
 <file path=ppt/notesSlides/notesSlide8.xml><?xml version="1.0" encoding="utf-8"?>
-<p:notes xmlns:a="http://schemas.openxmlformats.org/drawingml/2006/main" xmlns:r="http://schemas.openxmlformats.org/officeDocument/2006/relationships" xmlns:mc="http://schemas.openxmlformats.org/markup-compatibility/2006" xmlns:mv="urn:schemas-microsoft-com:mac:vml" xmlns:p="http://schemas.openxmlformats.org/presentationml/2006/main" xmlns:c="http://schemas.openxmlformats.org/drawingml/2006/chart" xmlns:dgm="http://schemas.openxmlformats.org/drawingml/2006/diagram" xmlns:o="urn:schemas-microsoft-com:office:office" xmlns:v="urn:schemas-microsoft-com:vml" xmlns:pvml="urn:schemas-microsoft-com:office:powerpoint" xmlns:com="http://schemas.openxmlformats.org/drawingml/2006/compatibility" xmlns:p14="http://schemas.microsoft.com/office/powerpoint/2010/main" xmlns:p15="http://schemas.microsoft.com/office/powerpoint/2012/main" xmlns:ahyp="http://schemas.microsoft.com/office/drawing/2018/hyperlinkcolor" showMasterPhAnim="0" showMasterSp="0">
+<p:notes xmlns:a="http://schemas.openxmlformats.org/drawingml/2006/main" xmlns:r="http://schemas.openxmlformats.org/officeDocument/2006/relationships" xmlns:p="http://schemas.openxmlformats.org/presentationml/2006/main" showMasterSp="0" showMasterPhAnim="0">
   <p:cSld>
     <p:spTree>
       <p:nvGrpSpPr>
-        <p:cNvPr id="104" name="Shape 104"/>
+        <p:cNvPr id="1" name="Shape 104"/>
         <p:cNvGrpSpPr/>
         <p:nvPr/>
       </p:nvGrpSpPr>
@@ -1426,9 +1476,11 @@
       <p:sp>
         <p:nvSpPr>
           <p:cNvPr id="105" name="Google Shape;105;g178f9655266_0_0:notes"/>
-          <p:cNvSpPr/>
+          <p:cNvSpPr>
+            <a:spLocks noGrp="1" noRot="1" noChangeAspect="1"/>
+          </p:cNvSpPr>
           <p:nvPr>
-            <p:ph idx="2" type="sldImg"/>
+            <p:ph type="sldImg" idx="2"/>
           </p:nvPr>
         </p:nvSpPr>
         <p:spPr>
@@ -1437,9 +1489,13 @@
             <a:ext cx="6096000" cy="3429000"/>
           </a:xfrm>
           <a:custGeom>
-            <a:rect b="b" l="l" r="r" t="t"/>
+            <a:avLst/>
+            <a:gdLst/>
+            <a:ahLst/>
+            <a:cxnLst/>
+            <a:rect l="l" t="t" r="r" b="b"/>
             <a:pathLst>
-              <a:path extrusionOk="0" h="120000" w="120000">
+              <a:path w="120000" h="120000" extrusionOk="0">
                 <a:moveTo>
                   <a:pt x="0" y="0"/>
                 </a:moveTo>
@@ -1461,9 +1517,11 @@
       <p:sp>
         <p:nvSpPr>
           <p:cNvPr id="106" name="Google Shape;106;g178f9655266_0_0:notes"/>
-          <p:cNvSpPr txBox="1"/>
+          <p:cNvSpPr txBox="1">
+            <a:spLocks noGrp="1"/>
+          </p:cNvSpPr>
           <p:nvPr>
-            <p:ph idx="1" type="body"/>
+            <p:ph type="body" idx="1"/>
           </p:nvPr>
         </p:nvSpPr>
         <p:spPr>
@@ -1476,12 +1534,12 @@
           </a:prstGeom>
         </p:spPr>
         <p:txBody>
-          <a:bodyPr anchorCtr="0" anchor="t" bIns="91425" lIns="91425" spcFirstLastPara="1" rIns="91425" wrap="square" tIns="91425">
+          <a:bodyPr spcFirstLastPara="1" wrap="square" lIns="91425" tIns="91425" rIns="91425" bIns="91425" anchor="t" anchorCtr="0">
             <a:noAutofit/>
           </a:bodyPr>
           <a:lstStyle/>
           <a:p>
-            <a:pPr indent="0" lvl="0" marL="0" rtl="0" algn="l">
+            <a:pPr marL="0" lvl="0" indent="0" algn="l" rtl="0">
               <a:spcBef>
                 <a:spcPts val="0"/>
               </a:spcBef>
@@ -1490,9 +1548,6 @@
               </a:spcAft>
               <a:buNone/>
             </a:pPr>
-            <a:r>
-              <a:t/>
-            </a:r>
             <a:endParaRPr/>
           </a:p>
         </p:txBody>
@@ -1506,11 +1561,11 @@
 </file>
 
 <file path=ppt/slideLayouts/slideLayout1.xml><?xml version="1.0" encoding="utf-8"?>
-<p:sldLayout xmlns:a="http://schemas.openxmlformats.org/drawingml/2006/main" xmlns:r="http://schemas.openxmlformats.org/officeDocument/2006/relationships" xmlns:mc="http://schemas.openxmlformats.org/markup-compatibility/2006" xmlns:mv="urn:schemas-microsoft-com:mac:vml" xmlns:p="http://schemas.openxmlformats.org/presentationml/2006/main" xmlns:c="http://schemas.openxmlformats.org/drawingml/2006/chart" xmlns:dgm="http://schemas.openxmlformats.org/drawingml/2006/diagram" xmlns:o="urn:schemas-microsoft-com:office:office" xmlns:v="urn:schemas-microsoft-com:vml" xmlns:pvml="urn:schemas-microsoft-com:office:powerpoint" xmlns:com="http://schemas.openxmlformats.org/drawingml/2006/compatibility" xmlns:p14="http://schemas.microsoft.com/office/powerpoint/2010/main" xmlns:p15="http://schemas.microsoft.com/office/powerpoint/2012/main" xmlns:ahyp="http://schemas.microsoft.com/office/drawing/2018/hyperlinkcolor" matchingName="Title slide" type="title">
+<p:sldLayout xmlns:a="http://schemas.openxmlformats.org/drawingml/2006/main" xmlns:r="http://schemas.openxmlformats.org/officeDocument/2006/relationships" xmlns:p="http://schemas.openxmlformats.org/presentationml/2006/main" matchingName="Title slide" type="title">
   <p:cSld name="TITLE">
     <p:spTree>
       <p:nvGrpSpPr>
-        <p:cNvPr id="9" name="Shape 9"/>
+        <p:cNvPr id="1" name="Shape 9"/>
         <p:cNvGrpSpPr/>
         <p:nvPr/>
       </p:nvGrpSpPr>
@@ -1534,9 +1589,13 @@
             <a:ext cx="1081625" cy="1124950"/>
           </a:xfrm>
           <a:custGeom>
-            <a:rect b="b" l="l" r="r" t="t"/>
+            <a:avLst/>
+            <a:gdLst/>
+            <a:ahLst/>
+            <a:cxnLst/>
+            <a:rect l="l" t="t" r="r" b="b"/>
             <a:pathLst>
-              <a:path extrusionOk="0" h="44998" w="43265">
+              <a:path w="43265" h="44998" extrusionOk="0">
                 <a:moveTo>
                   <a:pt x="0" y="44998"/>
                 </a:moveTo>
@@ -1550,14 +1609,14 @@
             </a:pathLst>
           </a:custGeom>
           <a:noFill/>
-          <a:ln cap="flat" cmpd="sng" w="28575">
+          <a:ln w="28575" cap="flat" cmpd="sng">
             <a:solidFill>
               <a:schemeClr val="lt2"/>
             </a:solidFill>
             <a:prstDash val="solid"/>
             <a:miter lim="8000"/>
-            <a:headEnd len="sm" w="sm" type="none"/>
-            <a:tailEnd len="sm" w="sm" type="none"/>
+            <a:headEnd type="none" w="sm" len="sm"/>
+            <a:tailEnd type="none" w="sm" len="sm"/>
           </a:ln>
         </p:spPr>
       </p:sp>
@@ -1573,9 +1632,13 @@
             <a:ext cx="1081625" cy="1124950"/>
           </a:xfrm>
           <a:custGeom>
-            <a:rect b="b" l="l" r="r" t="t"/>
+            <a:avLst/>
+            <a:gdLst/>
+            <a:ahLst/>
+            <a:cxnLst/>
+            <a:rect l="l" t="t" r="r" b="b"/>
             <a:pathLst>
-              <a:path extrusionOk="0" h="44998" w="43265">
+              <a:path w="43265" h="44998" extrusionOk="0">
                 <a:moveTo>
                   <a:pt x="0" y="44998"/>
                 </a:moveTo>
@@ -1589,21 +1652,23 @@
             </a:pathLst>
           </a:custGeom>
           <a:noFill/>
-          <a:ln cap="flat" cmpd="sng" w="28575">
+          <a:ln w="28575" cap="flat" cmpd="sng">
             <a:solidFill>
               <a:schemeClr val="lt2"/>
             </a:solidFill>
             <a:prstDash val="solid"/>
             <a:miter lim="8000"/>
-            <a:headEnd len="sm" w="sm" type="none"/>
-            <a:tailEnd len="sm" w="sm" type="none"/>
+            <a:headEnd type="none" w="sm" len="sm"/>
+            <a:tailEnd type="none" w="sm" len="sm"/>
           </a:ln>
         </p:spPr>
       </p:sp>
       <p:sp>
         <p:nvSpPr>
           <p:cNvPr id="12" name="Google Shape;12;p2"/>
-          <p:cNvSpPr txBox="1"/>
+          <p:cNvSpPr txBox="1">
+            <a:spLocks noGrp="1"/>
+          </p:cNvSpPr>
           <p:nvPr>
             <p:ph type="ctrTitle"/>
           </p:nvPr>
@@ -1618,7 +1683,7 @@
           </a:prstGeom>
         </p:spPr>
         <p:txBody>
-          <a:bodyPr anchorCtr="0" anchor="b" bIns="91425" lIns="91425" spcFirstLastPara="1" rIns="91425" wrap="square" tIns="91425">
+          <a:bodyPr spcFirstLastPara="1" wrap="square" lIns="91425" tIns="91425" rIns="91425" bIns="91425" anchor="b" anchorCtr="0">
             <a:normAutofit/>
           </a:bodyPr>
           <a:lstStyle>
@@ -1722,15 +1787,19 @@
               <a:defRPr/>
             </a:lvl9pPr>
           </a:lstStyle>
-          <a:p/>
+          <a:p>
+            <a:endParaRPr/>
+          </a:p>
         </p:txBody>
       </p:sp>
       <p:sp>
         <p:nvSpPr>
           <p:cNvPr id="13" name="Google Shape;13;p2"/>
-          <p:cNvSpPr txBox="1"/>
+          <p:cNvSpPr txBox="1">
+            <a:spLocks noGrp="1"/>
+          </p:cNvSpPr>
           <p:nvPr>
-            <p:ph idx="1" type="subTitle"/>
+            <p:ph type="subTitle" idx="1"/>
           </p:nvPr>
         </p:nvSpPr>
         <p:spPr>
@@ -1743,7 +1812,7 @@
           </a:prstGeom>
         </p:spPr>
         <p:txBody>
-          <a:bodyPr anchorCtr="0" anchor="t" bIns="91425" lIns="91425" spcFirstLastPara="1" rIns="91425" wrap="square" tIns="91425">
+          <a:bodyPr spcFirstLastPara="1" wrap="square" lIns="91425" tIns="91425" rIns="91425" bIns="91425" anchor="t" anchorCtr="0">
             <a:normAutofit/>
           </a:bodyPr>
           <a:lstStyle>
@@ -1928,15 +1997,19 @@
               </a:defRPr>
             </a:lvl9pPr>
           </a:lstStyle>
-          <a:p/>
+          <a:p>
+            <a:endParaRPr/>
+          </a:p>
         </p:txBody>
       </p:sp>
       <p:sp>
         <p:nvSpPr>
           <p:cNvPr id="14" name="Google Shape;14;p2"/>
-          <p:cNvSpPr txBox="1"/>
+          <p:cNvSpPr txBox="1">
+            <a:spLocks noGrp="1"/>
+          </p:cNvSpPr>
           <p:nvPr>
-            <p:ph idx="12" type="sldNum"/>
+            <p:ph type="sldNum" idx="12"/>
           </p:nvPr>
         </p:nvSpPr>
         <p:spPr>
@@ -1949,7 +2022,7 @@
           </a:prstGeom>
         </p:spPr>
         <p:txBody>
-          <a:bodyPr anchorCtr="0" anchor="ctr" bIns="91425" lIns="91425" spcFirstLastPara="1" rIns="91425" wrap="square" tIns="91425">
+          <a:bodyPr spcFirstLastPara="1" wrap="square" lIns="91425" tIns="91425" rIns="91425" bIns="91425" anchor="ctr" anchorCtr="0">
             <a:normAutofit/>
           </a:bodyPr>
           <a:lstStyle>
@@ -1991,7 +2064,7 @@
             </a:lvl9pPr>
           </a:lstStyle>
           <a:p>
-            <a:pPr indent="0" lvl="0" marL="0" rtl="0" algn="r">
+            <a:pPr marL="0" lvl="0" indent="0" algn="r" rtl="0">
               <a:spcBef>
                 <a:spcPts val="0"/>
               </a:spcBef>
@@ -2017,11 +2090,11 @@
 </file>
 
 <file path=ppt/slideLayouts/slideLayout10.xml><?xml version="1.0" encoding="utf-8"?>
-<p:sldLayout xmlns:a="http://schemas.openxmlformats.org/drawingml/2006/main" xmlns:r="http://schemas.openxmlformats.org/officeDocument/2006/relationships" xmlns:mc="http://schemas.openxmlformats.org/markup-compatibility/2006" xmlns:mv="urn:schemas-microsoft-com:mac:vml" xmlns:p="http://schemas.openxmlformats.org/presentationml/2006/main" xmlns:c="http://schemas.openxmlformats.org/drawingml/2006/chart" xmlns:dgm="http://schemas.openxmlformats.org/drawingml/2006/diagram" xmlns:o="urn:schemas-microsoft-com:office:office" xmlns:v="urn:schemas-microsoft-com:vml" xmlns:pvml="urn:schemas-microsoft-com:office:powerpoint" xmlns:com="http://schemas.openxmlformats.org/drawingml/2006/compatibility" xmlns:p14="http://schemas.microsoft.com/office/powerpoint/2010/main" xmlns:p15="http://schemas.microsoft.com/office/powerpoint/2012/main" xmlns:ahyp="http://schemas.microsoft.com/office/drawing/2018/hyperlinkcolor" matchingName="Big number">
+<p:sldLayout xmlns:a="http://schemas.openxmlformats.org/drawingml/2006/main" xmlns:r="http://schemas.openxmlformats.org/officeDocument/2006/relationships" xmlns:p="http://schemas.openxmlformats.org/presentationml/2006/main" matchingName="Big number">
   <p:cSld name="BIG_NUMBER">
     <p:spTree>
       <p:nvGrpSpPr>
-        <p:cNvPr id="51" name="Shape 51"/>
+        <p:cNvPr id="1" name="Shape 51"/>
         <p:cNvGrpSpPr/>
         <p:nvPr/>
       </p:nvGrpSpPr>
@@ -2055,12 +2128,12 @@
           </a:ln>
         </p:spPr>
         <p:txBody>
-          <a:bodyPr anchorCtr="0" anchor="ctr" bIns="91425" lIns="91425" spcFirstLastPara="1" rIns="91425" wrap="square" tIns="91425">
+          <a:bodyPr spcFirstLastPara="1" wrap="square" lIns="91425" tIns="91425" rIns="91425" bIns="91425" anchor="ctr" anchorCtr="0">
             <a:noAutofit/>
           </a:bodyPr>
           <a:lstStyle/>
           <a:p>
-            <a:pPr indent="0" lvl="0" marL="0" rtl="0" algn="l">
+            <a:pPr marL="0" lvl="0" indent="0" algn="l" rtl="0">
               <a:spcBef>
                 <a:spcPts val="0"/>
               </a:spcBef>
@@ -2069,9 +2142,6 @@
               </a:spcAft>
               <a:buNone/>
             </a:pPr>
-            <a:r>
-              <a:t/>
-            </a:r>
             <a:endParaRPr/>
           </a:p>
         </p:txBody>
@@ -2079,9 +2149,11 @@
       <p:sp>
         <p:nvSpPr>
           <p:cNvPr id="53" name="Google Shape;53;p11"/>
-          <p:cNvSpPr txBox="1"/>
+          <p:cNvSpPr txBox="1">
+            <a:spLocks noGrp="1"/>
+          </p:cNvSpPr>
           <p:nvPr>
-            <p:ph hasCustomPrompt="1" type="title"/>
+            <p:ph type="title" hasCustomPrompt="1"/>
           </p:nvPr>
         </p:nvSpPr>
         <p:spPr>
@@ -2094,7 +2166,7 @@
           </a:prstGeom>
         </p:spPr>
         <p:txBody>
-          <a:bodyPr anchorCtr="0" anchor="ctr" bIns="91425" lIns="91425" spcFirstLastPara="1" rIns="91425" wrap="square" tIns="91425">
+          <a:bodyPr spcFirstLastPara="1" wrap="square" lIns="91425" tIns="91425" rIns="91425" bIns="91425" anchor="ctr" anchorCtr="0">
             <a:normAutofit/>
           </a:bodyPr>
           <a:lstStyle>
@@ -2271,9 +2343,11 @@
       <p:sp>
         <p:nvSpPr>
           <p:cNvPr id="54" name="Google Shape;54;p11"/>
-          <p:cNvSpPr txBox="1"/>
+          <p:cNvSpPr txBox="1">
+            <a:spLocks noGrp="1"/>
+          </p:cNvSpPr>
           <p:nvPr>
-            <p:ph idx="1" type="body"/>
+            <p:ph type="body" idx="1"/>
           </p:nvPr>
         </p:nvSpPr>
         <p:spPr>
@@ -2286,11 +2360,11 @@
           </a:prstGeom>
         </p:spPr>
         <p:txBody>
-          <a:bodyPr anchorCtr="0" anchor="t" bIns="91425" lIns="91425" spcFirstLastPara="1" rIns="91425" wrap="square" tIns="91425">
+          <a:bodyPr spcFirstLastPara="1" wrap="square" lIns="91425" tIns="91425" rIns="91425" bIns="91425" anchor="t" anchorCtr="0">
             <a:normAutofit/>
           </a:bodyPr>
           <a:lstStyle>
-            <a:lvl1pPr indent="-342900" lvl="0" marL="457200" algn="ctr">
+            <a:lvl1pPr marL="457200" lvl="0" indent="-342900" algn="ctr">
               <a:spcBef>
                 <a:spcPts val="0"/>
               </a:spcBef>
@@ -2301,7 +2375,7 @@
               <a:buChar char="●"/>
               <a:defRPr/>
             </a:lvl1pPr>
-            <a:lvl2pPr indent="-317500" lvl="1" marL="914400" algn="ctr">
+            <a:lvl2pPr marL="914400" lvl="1" indent="-317500" algn="ctr">
               <a:spcBef>
                 <a:spcPts val="0"/>
               </a:spcBef>
@@ -2312,7 +2386,7 @@
               <a:buChar char="○"/>
               <a:defRPr/>
             </a:lvl2pPr>
-            <a:lvl3pPr indent="-317500" lvl="2" marL="1371600" algn="ctr">
+            <a:lvl3pPr marL="1371600" lvl="2" indent="-317500" algn="ctr">
               <a:spcBef>
                 <a:spcPts val="0"/>
               </a:spcBef>
@@ -2323,7 +2397,7 @@
               <a:buChar char="■"/>
               <a:defRPr/>
             </a:lvl3pPr>
-            <a:lvl4pPr indent="-317500" lvl="3" marL="1828800" algn="ctr">
+            <a:lvl4pPr marL="1828800" lvl="3" indent="-317500" algn="ctr">
               <a:spcBef>
                 <a:spcPts val="0"/>
               </a:spcBef>
@@ -2334,7 +2408,7 @@
               <a:buChar char="●"/>
               <a:defRPr/>
             </a:lvl4pPr>
-            <a:lvl5pPr indent="-317500" lvl="4" marL="2286000" algn="ctr">
+            <a:lvl5pPr marL="2286000" lvl="4" indent="-317500" algn="ctr">
               <a:spcBef>
                 <a:spcPts val="0"/>
               </a:spcBef>
@@ -2345,7 +2419,7 @@
               <a:buChar char="○"/>
               <a:defRPr/>
             </a:lvl5pPr>
-            <a:lvl6pPr indent="-317500" lvl="5" marL="2743200" algn="ctr">
+            <a:lvl6pPr marL="2743200" lvl="5" indent="-317500" algn="ctr">
               <a:spcBef>
                 <a:spcPts val="0"/>
               </a:spcBef>
@@ -2356,7 +2430,7 @@
               <a:buChar char="■"/>
               <a:defRPr/>
             </a:lvl6pPr>
-            <a:lvl7pPr indent="-317500" lvl="6" marL="3200400" algn="ctr">
+            <a:lvl7pPr marL="3200400" lvl="6" indent="-317500" algn="ctr">
               <a:spcBef>
                 <a:spcPts val="0"/>
               </a:spcBef>
@@ -2367,7 +2441,7 @@
               <a:buChar char="●"/>
               <a:defRPr/>
             </a:lvl7pPr>
-            <a:lvl8pPr indent="-317500" lvl="7" marL="3657600" algn="ctr">
+            <a:lvl8pPr marL="3657600" lvl="7" indent="-317500" algn="ctr">
               <a:spcBef>
                 <a:spcPts val="0"/>
               </a:spcBef>
@@ -2378,7 +2452,7 @@
               <a:buChar char="○"/>
               <a:defRPr/>
             </a:lvl8pPr>
-            <a:lvl9pPr indent="-317500" lvl="8" marL="4114800" algn="ctr">
+            <a:lvl9pPr marL="4114800" lvl="8" indent="-317500" algn="ctr">
               <a:spcBef>
                 <a:spcPts val="0"/>
               </a:spcBef>
@@ -2390,15 +2464,19 @@
               <a:defRPr/>
             </a:lvl9pPr>
           </a:lstStyle>
-          <a:p/>
+          <a:p>
+            <a:endParaRPr/>
+          </a:p>
         </p:txBody>
       </p:sp>
       <p:sp>
         <p:nvSpPr>
           <p:cNvPr id="55" name="Google Shape;55;p11"/>
-          <p:cNvSpPr txBox="1"/>
+          <p:cNvSpPr txBox="1">
+            <a:spLocks noGrp="1"/>
+          </p:cNvSpPr>
           <p:nvPr>
-            <p:ph idx="12" type="sldNum"/>
+            <p:ph type="sldNum" idx="12"/>
           </p:nvPr>
         </p:nvSpPr>
         <p:spPr>
@@ -2411,7 +2489,7 @@
           </a:prstGeom>
         </p:spPr>
         <p:txBody>
-          <a:bodyPr anchorCtr="0" anchor="ctr" bIns="91425" lIns="91425" spcFirstLastPara="1" rIns="91425" wrap="square" tIns="91425">
+          <a:bodyPr spcFirstLastPara="1" wrap="square" lIns="91425" tIns="91425" rIns="91425" bIns="91425" anchor="ctr" anchorCtr="0">
             <a:normAutofit/>
           </a:bodyPr>
           <a:lstStyle>
@@ -2453,7 +2531,7 @@
             </a:lvl9pPr>
           </a:lstStyle>
           <a:p>
-            <a:pPr indent="0" lvl="0" marL="0" rtl="0" algn="r">
+            <a:pPr marL="0" lvl="0" indent="0" algn="r" rtl="0">
               <a:spcBef>
                 <a:spcPts val="0"/>
               </a:spcBef>
@@ -2479,11 +2557,11 @@
 </file>
 
 <file path=ppt/slideLayouts/slideLayout11.xml><?xml version="1.0" encoding="utf-8"?>
-<p:sldLayout xmlns:a="http://schemas.openxmlformats.org/drawingml/2006/main" xmlns:r="http://schemas.openxmlformats.org/officeDocument/2006/relationships" xmlns:mc="http://schemas.openxmlformats.org/markup-compatibility/2006" xmlns:mv="urn:schemas-microsoft-com:mac:vml" xmlns:p="http://schemas.openxmlformats.org/presentationml/2006/main" xmlns:c="http://schemas.openxmlformats.org/drawingml/2006/chart" xmlns:dgm="http://schemas.openxmlformats.org/drawingml/2006/diagram" xmlns:o="urn:schemas-microsoft-com:office:office" xmlns:v="urn:schemas-microsoft-com:vml" xmlns:pvml="urn:schemas-microsoft-com:office:powerpoint" xmlns:com="http://schemas.openxmlformats.org/drawingml/2006/compatibility" xmlns:p14="http://schemas.microsoft.com/office/powerpoint/2010/main" xmlns:p15="http://schemas.microsoft.com/office/powerpoint/2012/main" xmlns:ahyp="http://schemas.microsoft.com/office/drawing/2018/hyperlinkcolor" matchingName="Blank" type="blank">
+<p:sldLayout xmlns:a="http://schemas.openxmlformats.org/drawingml/2006/main" xmlns:r="http://schemas.openxmlformats.org/officeDocument/2006/relationships" xmlns:p="http://schemas.openxmlformats.org/presentationml/2006/main" matchingName="Blank" type="blank">
   <p:cSld name="BLANK">
     <p:spTree>
       <p:nvGrpSpPr>
-        <p:cNvPr id="56" name="Shape 56"/>
+        <p:cNvPr id="1" name="Shape 56"/>
         <p:cNvGrpSpPr/>
         <p:nvPr/>
       </p:nvGrpSpPr>
@@ -2498,9 +2576,11 @@
       <p:sp>
         <p:nvSpPr>
           <p:cNvPr id="57" name="Google Shape;57;p12"/>
-          <p:cNvSpPr txBox="1"/>
+          <p:cNvSpPr txBox="1">
+            <a:spLocks noGrp="1"/>
+          </p:cNvSpPr>
           <p:nvPr>
-            <p:ph idx="12" type="sldNum"/>
+            <p:ph type="sldNum" idx="12"/>
           </p:nvPr>
         </p:nvSpPr>
         <p:spPr>
@@ -2513,7 +2593,7 @@
           </a:prstGeom>
         </p:spPr>
         <p:txBody>
-          <a:bodyPr anchorCtr="0" anchor="ctr" bIns="91425" lIns="91425" spcFirstLastPara="1" rIns="91425" wrap="square" tIns="91425">
+          <a:bodyPr spcFirstLastPara="1" wrap="square" lIns="91425" tIns="91425" rIns="91425" bIns="91425" anchor="ctr" anchorCtr="0">
             <a:normAutofit/>
           </a:bodyPr>
           <a:lstStyle>
@@ -2555,7 +2635,7 @@
             </a:lvl9pPr>
           </a:lstStyle>
           <a:p>
-            <a:pPr indent="0" lvl="0" marL="0" rtl="0" algn="r">
+            <a:pPr marL="0" lvl="0" indent="0" algn="r" rtl="0">
               <a:spcBef>
                 <a:spcPts val="0"/>
               </a:spcBef>
@@ -2581,11 +2661,11 @@
 </file>
 
 <file path=ppt/slideLayouts/slideLayout2.xml><?xml version="1.0" encoding="utf-8"?>
-<p:sldLayout xmlns:a="http://schemas.openxmlformats.org/drawingml/2006/main" xmlns:r="http://schemas.openxmlformats.org/officeDocument/2006/relationships" xmlns:mc="http://schemas.openxmlformats.org/markup-compatibility/2006" xmlns:mv="urn:schemas-microsoft-com:mac:vml" xmlns:p="http://schemas.openxmlformats.org/presentationml/2006/main" xmlns:c="http://schemas.openxmlformats.org/drawingml/2006/chart" xmlns:dgm="http://schemas.openxmlformats.org/drawingml/2006/diagram" xmlns:o="urn:schemas-microsoft-com:office:office" xmlns:v="urn:schemas-microsoft-com:vml" xmlns:pvml="urn:schemas-microsoft-com:office:powerpoint" xmlns:com="http://schemas.openxmlformats.org/drawingml/2006/compatibility" xmlns:p14="http://schemas.microsoft.com/office/powerpoint/2010/main" xmlns:p15="http://schemas.microsoft.com/office/powerpoint/2012/main" xmlns:ahyp="http://schemas.microsoft.com/office/drawing/2018/hyperlinkcolor" matchingName="Section header" type="secHead">
+<p:sldLayout xmlns:a="http://schemas.openxmlformats.org/drawingml/2006/main" xmlns:r="http://schemas.openxmlformats.org/officeDocument/2006/relationships" xmlns:p="http://schemas.openxmlformats.org/presentationml/2006/main" matchingName="Section header" type="secHead">
   <p:cSld name="SECTION_HEADER">
     <p:spTree>
       <p:nvGrpSpPr>
-        <p:cNvPr id="15" name="Shape 15"/>
+        <p:cNvPr id="1" name="Shape 15"/>
         <p:cNvGrpSpPr/>
         <p:nvPr/>
       </p:nvGrpSpPr>
@@ -2609,9 +2689,13 @@
             <a:ext cx="1081625" cy="1124950"/>
           </a:xfrm>
           <a:custGeom>
-            <a:rect b="b" l="l" r="r" t="t"/>
+            <a:avLst/>
+            <a:gdLst/>
+            <a:ahLst/>
+            <a:cxnLst/>
+            <a:rect l="l" t="t" r="r" b="b"/>
             <a:pathLst>
-              <a:path extrusionOk="0" h="44998" w="43265">
+              <a:path w="43265" h="44998" extrusionOk="0">
                 <a:moveTo>
                   <a:pt x="0" y="44998"/>
                 </a:moveTo>
@@ -2625,14 +2709,14 @@
             </a:pathLst>
           </a:custGeom>
           <a:noFill/>
-          <a:ln cap="flat" cmpd="sng" w="28575">
+          <a:ln w="28575" cap="flat" cmpd="sng">
             <a:solidFill>
               <a:schemeClr val="lt2"/>
             </a:solidFill>
             <a:prstDash val="solid"/>
             <a:miter lim="8000"/>
-            <a:headEnd len="sm" w="sm" type="none"/>
-            <a:tailEnd len="sm" w="sm" type="none"/>
+            <a:headEnd type="none" w="sm" len="sm"/>
+            <a:tailEnd type="none" w="sm" len="sm"/>
           </a:ln>
         </p:spPr>
       </p:sp>
@@ -2643,14 +2727,18 @@
           <p:nvPr/>
         </p:nvSpPr>
         <p:spPr>
-          <a:xfrm flipH="1" rot="10800000">
+          <a:xfrm rot="10800000" flipH="1">
             <a:off x="466425" y="3558325"/>
             <a:ext cx="1081625" cy="1124950"/>
           </a:xfrm>
           <a:custGeom>
-            <a:rect b="b" l="l" r="r" t="t"/>
+            <a:avLst/>
+            <a:gdLst/>
+            <a:ahLst/>
+            <a:cxnLst/>
+            <a:rect l="l" t="t" r="r" b="b"/>
             <a:pathLst>
-              <a:path extrusionOk="0" h="44998" w="43265">
+              <a:path w="43265" h="44998" extrusionOk="0">
                 <a:moveTo>
                   <a:pt x="0" y="44998"/>
                 </a:moveTo>
@@ -2664,21 +2752,23 @@
             </a:pathLst>
           </a:custGeom>
           <a:noFill/>
-          <a:ln cap="flat" cmpd="sng" w="28575">
+          <a:ln w="28575" cap="flat" cmpd="sng">
             <a:solidFill>
               <a:schemeClr val="lt2"/>
             </a:solidFill>
             <a:prstDash val="solid"/>
             <a:miter lim="8000"/>
-            <a:headEnd len="sm" w="sm" type="none"/>
-            <a:tailEnd len="sm" w="sm" type="none"/>
+            <a:headEnd type="none" w="sm" len="sm"/>
+            <a:tailEnd type="none" w="sm" len="sm"/>
           </a:ln>
         </p:spPr>
       </p:sp>
       <p:sp>
         <p:nvSpPr>
           <p:cNvPr id="18" name="Google Shape;18;p3"/>
-          <p:cNvSpPr txBox="1"/>
+          <p:cNvSpPr txBox="1">
+            <a:spLocks noGrp="1"/>
+          </p:cNvSpPr>
           <p:nvPr>
             <p:ph type="title"/>
           </p:nvPr>
@@ -2693,7 +2783,7 @@
           </a:prstGeom>
         </p:spPr>
         <p:txBody>
-          <a:bodyPr anchorCtr="0" anchor="ctr" bIns="91425" lIns="91425" spcFirstLastPara="1" rIns="91425" wrap="square" tIns="91425">
+          <a:bodyPr spcFirstLastPara="1" wrap="square" lIns="91425" tIns="91425" rIns="91425" bIns="91425" anchor="ctr" anchorCtr="0">
             <a:normAutofit/>
           </a:bodyPr>
           <a:lstStyle>
@@ -2797,15 +2887,19 @@
               <a:defRPr/>
             </a:lvl9pPr>
           </a:lstStyle>
-          <a:p/>
+          <a:p>
+            <a:endParaRPr/>
+          </a:p>
         </p:txBody>
       </p:sp>
       <p:sp>
         <p:nvSpPr>
           <p:cNvPr id="19" name="Google Shape;19;p3"/>
-          <p:cNvSpPr txBox="1"/>
+          <p:cNvSpPr txBox="1">
+            <a:spLocks noGrp="1"/>
+          </p:cNvSpPr>
           <p:nvPr>
-            <p:ph idx="12" type="sldNum"/>
+            <p:ph type="sldNum" idx="12"/>
           </p:nvPr>
         </p:nvSpPr>
         <p:spPr>
@@ -2818,7 +2912,7 @@
           </a:prstGeom>
         </p:spPr>
         <p:txBody>
-          <a:bodyPr anchorCtr="0" anchor="ctr" bIns="91425" lIns="91425" spcFirstLastPara="1" rIns="91425" wrap="square" tIns="91425">
+          <a:bodyPr spcFirstLastPara="1" wrap="square" lIns="91425" tIns="91425" rIns="91425" bIns="91425" anchor="ctr" anchorCtr="0">
             <a:normAutofit/>
           </a:bodyPr>
           <a:lstStyle>
@@ -2860,7 +2954,7 @@
             </a:lvl9pPr>
           </a:lstStyle>
           <a:p>
-            <a:pPr indent="0" lvl="0" marL="0" rtl="0" algn="r">
+            <a:pPr marL="0" lvl="0" indent="0" algn="r" rtl="0">
               <a:spcBef>
                 <a:spcPts val="0"/>
               </a:spcBef>
@@ -2886,11 +2980,11 @@
 </file>
 
 <file path=ppt/slideLayouts/slideLayout3.xml><?xml version="1.0" encoding="utf-8"?>
-<p:sldLayout xmlns:a="http://schemas.openxmlformats.org/drawingml/2006/main" xmlns:r="http://schemas.openxmlformats.org/officeDocument/2006/relationships" xmlns:mc="http://schemas.openxmlformats.org/markup-compatibility/2006" xmlns:mv="urn:schemas-microsoft-com:mac:vml" xmlns:p="http://schemas.openxmlformats.org/presentationml/2006/main" xmlns:c="http://schemas.openxmlformats.org/drawingml/2006/chart" xmlns:dgm="http://schemas.openxmlformats.org/drawingml/2006/diagram" xmlns:o="urn:schemas-microsoft-com:office:office" xmlns:v="urn:schemas-microsoft-com:vml" xmlns:pvml="urn:schemas-microsoft-com:office:powerpoint" xmlns:com="http://schemas.openxmlformats.org/drawingml/2006/compatibility" xmlns:p14="http://schemas.microsoft.com/office/powerpoint/2010/main" xmlns:p15="http://schemas.microsoft.com/office/powerpoint/2012/main" xmlns:ahyp="http://schemas.microsoft.com/office/drawing/2018/hyperlinkcolor" matchingName="Title and body" type="tx">
+<p:sldLayout xmlns:a="http://schemas.openxmlformats.org/drawingml/2006/main" xmlns:r="http://schemas.openxmlformats.org/officeDocument/2006/relationships" xmlns:p="http://schemas.openxmlformats.org/presentationml/2006/main" matchingName="Title and body" type="tx">
   <p:cSld name="TITLE_AND_BODY">
     <p:spTree>
       <p:nvGrpSpPr>
-        <p:cNvPr id="20" name="Shape 20"/>
+        <p:cNvPr id="1" name="Shape 20"/>
         <p:cNvGrpSpPr/>
         <p:nvPr/>
       </p:nvGrpSpPr>
@@ -2924,12 +3018,12 @@
           </a:ln>
         </p:spPr>
         <p:txBody>
-          <a:bodyPr anchorCtr="0" anchor="ctr" bIns="91425" lIns="91425" spcFirstLastPara="1" rIns="91425" wrap="square" tIns="91425">
+          <a:bodyPr spcFirstLastPara="1" wrap="square" lIns="91425" tIns="91425" rIns="91425" bIns="91425" anchor="ctr" anchorCtr="0">
             <a:noAutofit/>
           </a:bodyPr>
           <a:lstStyle/>
           <a:p>
-            <a:pPr indent="0" lvl="0" marL="0" rtl="0" algn="l">
+            <a:pPr marL="0" lvl="0" indent="0" algn="l" rtl="0">
               <a:spcBef>
                 <a:spcPts val="0"/>
               </a:spcBef>
@@ -2938,9 +3032,6 @@
               </a:spcAft>
               <a:buNone/>
             </a:pPr>
-            <a:r>
-              <a:t/>
-            </a:r>
             <a:endParaRPr/>
           </a:p>
         </p:txBody>
@@ -2948,7 +3039,9 @@
       <p:sp>
         <p:nvSpPr>
           <p:cNvPr id="22" name="Google Shape;22;p4"/>
-          <p:cNvSpPr txBox="1"/>
+          <p:cNvSpPr txBox="1">
+            <a:spLocks noGrp="1"/>
+          </p:cNvSpPr>
           <p:nvPr>
             <p:ph type="title"/>
           </p:nvPr>
@@ -2963,7 +3056,7 @@
           </a:prstGeom>
         </p:spPr>
         <p:txBody>
-          <a:bodyPr anchorCtr="0" anchor="b" bIns="91425" lIns="91425" spcFirstLastPara="1" rIns="91425" wrap="square" tIns="91425">
+          <a:bodyPr spcFirstLastPara="1" wrap="square" lIns="91425" tIns="91425" rIns="91425" bIns="91425" anchor="b" anchorCtr="0">
             <a:normAutofit/>
           </a:bodyPr>
           <a:lstStyle>
@@ -3067,15 +3160,19 @@
               <a:defRPr/>
             </a:lvl9pPr>
           </a:lstStyle>
-          <a:p/>
+          <a:p>
+            <a:endParaRPr/>
+          </a:p>
         </p:txBody>
       </p:sp>
       <p:sp>
         <p:nvSpPr>
           <p:cNvPr id="23" name="Google Shape;23;p4"/>
-          <p:cNvSpPr txBox="1"/>
+          <p:cNvSpPr txBox="1">
+            <a:spLocks noGrp="1"/>
+          </p:cNvSpPr>
           <p:nvPr>
-            <p:ph idx="1" type="body"/>
+            <p:ph type="body" idx="1"/>
           </p:nvPr>
         </p:nvSpPr>
         <p:spPr>
@@ -3088,11 +3185,11 @@
           </a:prstGeom>
         </p:spPr>
         <p:txBody>
-          <a:bodyPr anchorCtr="0" anchor="t" bIns="91425" lIns="91425" spcFirstLastPara="1" rIns="91425" wrap="square" tIns="91425">
+          <a:bodyPr spcFirstLastPara="1" wrap="square" lIns="91425" tIns="91425" rIns="91425" bIns="91425" anchor="t" anchorCtr="0">
             <a:normAutofit/>
           </a:bodyPr>
           <a:lstStyle>
-            <a:lvl1pPr indent="-342900" lvl="0" marL="457200">
+            <a:lvl1pPr marL="457200" lvl="0" indent="-342900">
               <a:spcBef>
                 <a:spcPts val="0"/>
               </a:spcBef>
@@ -3103,7 +3200,7 @@
               <a:buChar char="●"/>
               <a:defRPr/>
             </a:lvl1pPr>
-            <a:lvl2pPr indent="-317500" lvl="1" marL="914400">
+            <a:lvl2pPr marL="914400" lvl="1" indent="-317500">
               <a:spcBef>
                 <a:spcPts val="0"/>
               </a:spcBef>
@@ -3114,7 +3211,7 @@
               <a:buChar char="○"/>
               <a:defRPr/>
             </a:lvl2pPr>
-            <a:lvl3pPr indent="-317500" lvl="2" marL="1371600">
+            <a:lvl3pPr marL="1371600" lvl="2" indent="-317500">
               <a:spcBef>
                 <a:spcPts val="0"/>
               </a:spcBef>
@@ -3125,7 +3222,7 @@
               <a:buChar char="■"/>
               <a:defRPr/>
             </a:lvl3pPr>
-            <a:lvl4pPr indent="-317500" lvl="3" marL="1828800">
+            <a:lvl4pPr marL="1828800" lvl="3" indent="-317500">
               <a:spcBef>
                 <a:spcPts val="0"/>
               </a:spcBef>
@@ -3136,7 +3233,7 @@
               <a:buChar char="●"/>
               <a:defRPr/>
             </a:lvl4pPr>
-            <a:lvl5pPr indent="-317500" lvl="4" marL="2286000">
+            <a:lvl5pPr marL="2286000" lvl="4" indent="-317500">
               <a:spcBef>
                 <a:spcPts val="0"/>
               </a:spcBef>
@@ -3147,7 +3244,7 @@
               <a:buChar char="○"/>
               <a:defRPr/>
             </a:lvl5pPr>
-            <a:lvl6pPr indent="-317500" lvl="5" marL="2743200">
+            <a:lvl6pPr marL="2743200" lvl="5" indent="-317500">
               <a:spcBef>
                 <a:spcPts val="0"/>
               </a:spcBef>
@@ -3158,7 +3255,7 @@
               <a:buChar char="■"/>
               <a:defRPr/>
             </a:lvl6pPr>
-            <a:lvl7pPr indent="-317500" lvl="6" marL="3200400">
+            <a:lvl7pPr marL="3200400" lvl="6" indent="-317500">
               <a:spcBef>
                 <a:spcPts val="0"/>
               </a:spcBef>
@@ -3169,7 +3266,7 @@
               <a:buChar char="●"/>
               <a:defRPr/>
             </a:lvl7pPr>
-            <a:lvl8pPr indent="-317500" lvl="7" marL="3657600">
+            <a:lvl8pPr marL="3657600" lvl="7" indent="-317500">
               <a:spcBef>
                 <a:spcPts val="0"/>
               </a:spcBef>
@@ -3180,7 +3277,7 @@
               <a:buChar char="○"/>
               <a:defRPr/>
             </a:lvl8pPr>
-            <a:lvl9pPr indent="-317500" lvl="8" marL="4114800">
+            <a:lvl9pPr marL="4114800" lvl="8" indent="-317500">
               <a:spcBef>
                 <a:spcPts val="0"/>
               </a:spcBef>
@@ -3192,15 +3289,19 @@
               <a:defRPr/>
             </a:lvl9pPr>
           </a:lstStyle>
-          <a:p/>
+          <a:p>
+            <a:endParaRPr/>
+          </a:p>
         </p:txBody>
       </p:sp>
       <p:sp>
         <p:nvSpPr>
           <p:cNvPr id="24" name="Google Shape;24;p4"/>
-          <p:cNvSpPr txBox="1"/>
+          <p:cNvSpPr txBox="1">
+            <a:spLocks noGrp="1"/>
+          </p:cNvSpPr>
           <p:nvPr>
-            <p:ph idx="12" type="sldNum"/>
+            <p:ph type="sldNum" idx="12"/>
           </p:nvPr>
         </p:nvSpPr>
         <p:spPr>
@@ -3213,7 +3314,7 @@
           </a:prstGeom>
         </p:spPr>
         <p:txBody>
-          <a:bodyPr anchorCtr="0" anchor="ctr" bIns="91425" lIns="91425" spcFirstLastPara="1" rIns="91425" wrap="square" tIns="91425">
+          <a:bodyPr spcFirstLastPara="1" wrap="square" lIns="91425" tIns="91425" rIns="91425" bIns="91425" anchor="ctr" anchorCtr="0">
             <a:normAutofit/>
           </a:bodyPr>
           <a:lstStyle>
@@ -3255,7 +3356,7 @@
             </a:lvl9pPr>
           </a:lstStyle>
           <a:p>
-            <a:pPr indent="0" lvl="0" marL="0" rtl="0" algn="r">
+            <a:pPr marL="0" lvl="0" indent="0" algn="r" rtl="0">
               <a:spcBef>
                 <a:spcPts val="0"/>
               </a:spcBef>
@@ -3281,11 +3382,11 @@
 </file>
 
 <file path=ppt/slideLayouts/slideLayout4.xml><?xml version="1.0" encoding="utf-8"?>
-<p:sldLayout xmlns:a="http://schemas.openxmlformats.org/drawingml/2006/main" xmlns:r="http://schemas.openxmlformats.org/officeDocument/2006/relationships" xmlns:mc="http://schemas.openxmlformats.org/markup-compatibility/2006" xmlns:mv="urn:schemas-microsoft-com:mac:vml" xmlns:p="http://schemas.openxmlformats.org/presentationml/2006/main" xmlns:c="http://schemas.openxmlformats.org/drawingml/2006/chart" xmlns:dgm="http://schemas.openxmlformats.org/drawingml/2006/diagram" xmlns:o="urn:schemas-microsoft-com:office:office" xmlns:v="urn:schemas-microsoft-com:vml" xmlns:pvml="urn:schemas-microsoft-com:office:powerpoint" xmlns:com="http://schemas.openxmlformats.org/drawingml/2006/compatibility" xmlns:p14="http://schemas.microsoft.com/office/powerpoint/2010/main" xmlns:p15="http://schemas.microsoft.com/office/powerpoint/2012/main" xmlns:ahyp="http://schemas.microsoft.com/office/drawing/2018/hyperlinkcolor" matchingName="Title and two columns" type="twoColTx">
+<p:sldLayout xmlns:a="http://schemas.openxmlformats.org/drawingml/2006/main" xmlns:r="http://schemas.openxmlformats.org/officeDocument/2006/relationships" xmlns:p="http://schemas.openxmlformats.org/presentationml/2006/main" matchingName="Title and two columns" type="twoColTx">
   <p:cSld name="TITLE_AND_TWO_COLUMNS">
     <p:spTree>
       <p:nvGrpSpPr>
-        <p:cNvPr id="25" name="Shape 25"/>
+        <p:cNvPr id="1" name="Shape 25"/>
         <p:cNvGrpSpPr/>
         <p:nvPr/>
       </p:nvGrpSpPr>
@@ -3300,7 +3401,9 @@
       <p:sp>
         <p:nvSpPr>
           <p:cNvPr id="26" name="Google Shape;26;p5"/>
-          <p:cNvSpPr txBox="1"/>
+          <p:cNvSpPr txBox="1">
+            <a:spLocks noGrp="1"/>
+          </p:cNvSpPr>
           <p:nvPr>
             <p:ph type="title"/>
           </p:nvPr>
@@ -3315,7 +3418,7 @@
           </a:prstGeom>
         </p:spPr>
         <p:txBody>
-          <a:bodyPr anchorCtr="0" anchor="b" bIns="91425" lIns="91425" spcFirstLastPara="1" rIns="91425" wrap="square" tIns="91425">
+          <a:bodyPr spcFirstLastPara="1" wrap="square" lIns="91425" tIns="91425" rIns="91425" bIns="91425" anchor="b" anchorCtr="0">
             <a:normAutofit/>
           </a:bodyPr>
           <a:lstStyle>
@@ -3419,15 +3522,19 @@
               <a:defRPr/>
             </a:lvl9pPr>
           </a:lstStyle>
-          <a:p/>
+          <a:p>
+            <a:endParaRPr/>
+          </a:p>
         </p:txBody>
       </p:sp>
       <p:sp>
         <p:nvSpPr>
           <p:cNvPr id="27" name="Google Shape;27;p5"/>
-          <p:cNvSpPr txBox="1"/>
+          <p:cNvSpPr txBox="1">
+            <a:spLocks noGrp="1"/>
+          </p:cNvSpPr>
           <p:nvPr>
-            <p:ph idx="1" type="body"/>
+            <p:ph type="body" idx="1"/>
           </p:nvPr>
         </p:nvSpPr>
         <p:spPr>
@@ -3440,11 +3547,11 @@
           </a:prstGeom>
         </p:spPr>
         <p:txBody>
-          <a:bodyPr anchorCtr="0" anchor="t" bIns="91425" lIns="91425" spcFirstLastPara="1" rIns="91425" wrap="square" tIns="91425">
+          <a:bodyPr spcFirstLastPara="1" wrap="square" lIns="91425" tIns="91425" rIns="91425" bIns="91425" anchor="t" anchorCtr="0">
             <a:normAutofit/>
           </a:bodyPr>
           <a:lstStyle>
-            <a:lvl1pPr indent="-317500" lvl="0" marL="457200">
+            <a:lvl1pPr marL="457200" lvl="0" indent="-317500">
               <a:spcBef>
                 <a:spcPts val="0"/>
               </a:spcBef>
@@ -3455,7 +3562,7 @@
               <a:buChar char="●"/>
               <a:defRPr sz="1400"/>
             </a:lvl1pPr>
-            <a:lvl2pPr indent="-304800" lvl="1" marL="914400">
+            <a:lvl2pPr marL="914400" lvl="1" indent="-304800">
               <a:spcBef>
                 <a:spcPts val="0"/>
               </a:spcBef>
@@ -3466,7 +3573,7 @@
               <a:buChar char="○"/>
               <a:defRPr sz="1200"/>
             </a:lvl2pPr>
-            <a:lvl3pPr indent="-304800" lvl="2" marL="1371600">
+            <a:lvl3pPr marL="1371600" lvl="2" indent="-304800">
               <a:spcBef>
                 <a:spcPts val="0"/>
               </a:spcBef>
@@ -3477,7 +3584,7 @@
               <a:buChar char="■"/>
               <a:defRPr sz="1200"/>
             </a:lvl3pPr>
-            <a:lvl4pPr indent="-304800" lvl="3" marL="1828800">
+            <a:lvl4pPr marL="1828800" lvl="3" indent="-304800">
               <a:spcBef>
                 <a:spcPts val="0"/>
               </a:spcBef>
@@ -3488,7 +3595,7 @@
               <a:buChar char="●"/>
               <a:defRPr sz="1200"/>
             </a:lvl4pPr>
-            <a:lvl5pPr indent="-304800" lvl="4" marL="2286000">
+            <a:lvl5pPr marL="2286000" lvl="4" indent="-304800">
               <a:spcBef>
                 <a:spcPts val="0"/>
               </a:spcBef>
@@ -3499,7 +3606,7 @@
               <a:buChar char="○"/>
               <a:defRPr sz="1200"/>
             </a:lvl5pPr>
-            <a:lvl6pPr indent="-304800" lvl="5" marL="2743200">
+            <a:lvl6pPr marL="2743200" lvl="5" indent="-304800">
               <a:spcBef>
                 <a:spcPts val="0"/>
               </a:spcBef>
@@ -3510,7 +3617,7 @@
               <a:buChar char="■"/>
               <a:defRPr sz="1200"/>
             </a:lvl6pPr>
-            <a:lvl7pPr indent="-304800" lvl="6" marL="3200400">
+            <a:lvl7pPr marL="3200400" lvl="6" indent="-304800">
               <a:spcBef>
                 <a:spcPts val="0"/>
               </a:spcBef>
@@ -3521,7 +3628,7 @@
               <a:buChar char="●"/>
               <a:defRPr sz="1200"/>
             </a:lvl7pPr>
-            <a:lvl8pPr indent="-304800" lvl="7" marL="3657600">
+            <a:lvl8pPr marL="3657600" lvl="7" indent="-304800">
               <a:spcBef>
                 <a:spcPts val="0"/>
               </a:spcBef>
@@ -3532,7 +3639,7 @@
               <a:buChar char="○"/>
               <a:defRPr sz="1200"/>
             </a:lvl8pPr>
-            <a:lvl9pPr indent="-304800" lvl="8" marL="4114800">
+            <a:lvl9pPr marL="4114800" lvl="8" indent="-304800">
               <a:spcBef>
                 <a:spcPts val="0"/>
               </a:spcBef>
@@ -3544,15 +3651,19 @@
               <a:defRPr sz="1200"/>
             </a:lvl9pPr>
           </a:lstStyle>
-          <a:p/>
+          <a:p>
+            <a:endParaRPr/>
+          </a:p>
         </p:txBody>
       </p:sp>
       <p:sp>
         <p:nvSpPr>
           <p:cNvPr id="28" name="Google Shape;28;p5"/>
-          <p:cNvSpPr txBox="1"/>
+          <p:cNvSpPr txBox="1">
+            <a:spLocks noGrp="1"/>
+          </p:cNvSpPr>
           <p:nvPr>
-            <p:ph idx="2" type="body"/>
+            <p:ph type="body" idx="2"/>
           </p:nvPr>
         </p:nvSpPr>
         <p:spPr>
@@ -3565,11 +3676,11 @@
           </a:prstGeom>
         </p:spPr>
         <p:txBody>
-          <a:bodyPr anchorCtr="0" anchor="t" bIns="91425" lIns="91425" spcFirstLastPara="1" rIns="91425" wrap="square" tIns="91425">
+          <a:bodyPr spcFirstLastPara="1" wrap="square" lIns="91425" tIns="91425" rIns="91425" bIns="91425" anchor="t" anchorCtr="0">
             <a:normAutofit/>
           </a:bodyPr>
           <a:lstStyle>
-            <a:lvl1pPr indent="-317500" lvl="0" marL="457200">
+            <a:lvl1pPr marL="457200" lvl="0" indent="-317500">
               <a:spcBef>
                 <a:spcPts val="0"/>
               </a:spcBef>
@@ -3580,7 +3691,7 @@
               <a:buChar char="●"/>
               <a:defRPr sz="1400"/>
             </a:lvl1pPr>
-            <a:lvl2pPr indent="-304800" lvl="1" marL="914400">
+            <a:lvl2pPr marL="914400" lvl="1" indent="-304800">
               <a:spcBef>
                 <a:spcPts val="0"/>
               </a:spcBef>
@@ -3591,7 +3702,7 @@
               <a:buChar char="○"/>
               <a:defRPr sz="1200"/>
             </a:lvl2pPr>
-            <a:lvl3pPr indent="-304800" lvl="2" marL="1371600">
+            <a:lvl3pPr marL="1371600" lvl="2" indent="-304800">
               <a:spcBef>
                 <a:spcPts val="0"/>
               </a:spcBef>
@@ -3602,7 +3713,7 @@
               <a:buChar char="■"/>
               <a:defRPr sz="1200"/>
             </a:lvl3pPr>
-            <a:lvl4pPr indent="-304800" lvl="3" marL="1828800">
+            <a:lvl4pPr marL="1828800" lvl="3" indent="-304800">
               <a:spcBef>
                 <a:spcPts val="0"/>
               </a:spcBef>
@@ -3613,7 +3724,7 @@
               <a:buChar char="●"/>
               <a:defRPr sz="1200"/>
             </a:lvl4pPr>
-            <a:lvl5pPr indent="-304800" lvl="4" marL="2286000">
+            <a:lvl5pPr marL="2286000" lvl="4" indent="-304800">
               <a:spcBef>
                 <a:spcPts val="0"/>
               </a:spcBef>
@@ -3624,7 +3735,7 @@
               <a:buChar char="○"/>
               <a:defRPr sz="1200"/>
             </a:lvl5pPr>
-            <a:lvl6pPr indent="-304800" lvl="5" marL="2743200">
+            <a:lvl6pPr marL="2743200" lvl="5" indent="-304800">
               <a:spcBef>
                 <a:spcPts val="0"/>
               </a:spcBef>
@@ -3635,7 +3746,7 @@
               <a:buChar char="■"/>
               <a:defRPr sz="1200"/>
             </a:lvl6pPr>
-            <a:lvl7pPr indent="-304800" lvl="6" marL="3200400">
+            <a:lvl7pPr marL="3200400" lvl="6" indent="-304800">
               <a:spcBef>
                 <a:spcPts val="0"/>
               </a:spcBef>
@@ -3646,7 +3757,7 @@
               <a:buChar char="●"/>
               <a:defRPr sz="1200"/>
             </a:lvl7pPr>
-            <a:lvl8pPr indent="-304800" lvl="7" marL="3657600">
+            <a:lvl8pPr marL="3657600" lvl="7" indent="-304800">
               <a:spcBef>
                 <a:spcPts val="0"/>
               </a:spcBef>
@@ -3657,7 +3768,7 @@
               <a:buChar char="○"/>
               <a:defRPr sz="1200"/>
             </a:lvl8pPr>
-            <a:lvl9pPr indent="-304800" lvl="8" marL="4114800">
+            <a:lvl9pPr marL="4114800" lvl="8" indent="-304800">
               <a:spcBef>
                 <a:spcPts val="0"/>
               </a:spcBef>
@@ -3669,15 +3780,19 @@
               <a:defRPr sz="1200"/>
             </a:lvl9pPr>
           </a:lstStyle>
-          <a:p/>
+          <a:p>
+            <a:endParaRPr/>
+          </a:p>
         </p:txBody>
       </p:sp>
       <p:sp>
         <p:nvSpPr>
           <p:cNvPr id="29" name="Google Shape;29;p5"/>
-          <p:cNvSpPr txBox="1"/>
+          <p:cNvSpPr txBox="1">
+            <a:spLocks noGrp="1"/>
+          </p:cNvSpPr>
           <p:nvPr>
-            <p:ph idx="12" type="sldNum"/>
+            <p:ph type="sldNum" idx="12"/>
           </p:nvPr>
         </p:nvSpPr>
         <p:spPr>
@@ -3690,7 +3805,7 @@
           </a:prstGeom>
         </p:spPr>
         <p:txBody>
-          <a:bodyPr anchorCtr="0" anchor="ctr" bIns="91425" lIns="91425" spcFirstLastPara="1" rIns="91425" wrap="square" tIns="91425">
+          <a:bodyPr spcFirstLastPara="1" wrap="square" lIns="91425" tIns="91425" rIns="91425" bIns="91425" anchor="ctr" anchorCtr="0">
             <a:normAutofit/>
           </a:bodyPr>
           <a:lstStyle>
@@ -3732,7 +3847,7 @@
             </a:lvl9pPr>
           </a:lstStyle>
           <a:p>
-            <a:pPr indent="0" lvl="0" marL="0" rtl="0" algn="r">
+            <a:pPr marL="0" lvl="0" indent="0" algn="r" rtl="0">
               <a:spcBef>
                 <a:spcPts val="0"/>
               </a:spcBef>
@@ -3758,11 +3873,11 @@
 </file>
 
 <file path=ppt/slideLayouts/slideLayout5.xml><?xml version="1.0" encoding="utf-8"?>
-<p:sldLayout xmlns:a="http://schemas.openxmlformats.org/drawingml/2006/main" xmlns:r="http://schemas.openxmlformats.org/officeDocument/2006/relationships" xmlns:mc="http://schemas.openxmlformats.org/markup-compatibility/2006" xmlns:mv="urn:schemas-microsoft-com:mac:vml" xmlns:p="http://schemas.openxmlformats.org/presentationml/2006/main" xmlns:c="http://schemas.openxmlformats.org/drawingml/2006/chart" xmlns:dgm="http://schemas.openxmlformats.org/drawingml/2006/diagram" xmlns:o="urn:schemas-microsoft-com:office:office" xmlns:v="urn:schemas-microsoft-com:vml" xmlns:pvml="urn:schemas-microsoft-com:office:powerpoint" xmlns:com="http://schemas.openxmlformats.org/drawingml/2006/compatibility" xmlns:p14="http://schemas.microsoft.com/office/powerpoint/2010/main" xmlns:p15="http://schemas.microsoft.com/office/powerpoint/2012/main" xmlns:ahyp="http://schemas.microsoft.com/office/drawing/2018/hyperlinkcolor" matchingName="Title only" type="titleOnly">
+<p:sldLayout xmlns:a="http://schemas.openxmlformats.org/drawingml/2006/main" xmlns:r="http://schemas.openxmlformats.org/officeDocument/2006/relationships" xmlns:p="http://schemas.openxmlformats.org/presentationml/2006/main" matchingName="Title only" type="titleOnly">
   <p:cSld name="TITLE_ONLY">
     <p:spTree>
       <p:nvGrpSpPr>
-        <p:cNvPr id="30" name="Shape 30"/>
+        <p:cNvPr id="1" name="Shape 30"/>
         <p:cNvGrpSpPr/>
         <p:nvPr/>
       </p:nvGrpSpPr>
@@ -3777,7 +3892,9 @@
       <p:sp>
         <p:nvSpPr>
           <p:cNvPr id="31" name="Google Shape;31;p6"/>
-          <p:cNvSpPr txBox="1"/>
+          <p:cNvSpPr txBox="1">
+            <a:spLocks noGrp="1"/>
+          </p:cNvSpPr>
           <p:nvPr>
             <p:ph type="title"/>
           </p:nvPr>
@@ -3792,7 +3909,7 @@
           </a:prstGeom>
         </p:spPr>
         <p:txBody>
-          <a:bodyPr anchorCtr="0" anchor="b" bIns="91425" lIns="91425" spcFirstLastPara="1" rIns="91425" wrap="square" tIns="91425">
+          <a:bodyPr spcFirstLastPara="1" wrap="square" lIns="91425" tIns="91425" rIns="91425" bIns="91425" anchor="b" anchorCtr="0">
             <a:normAutofit/>
           </a:bodyPr>
           <a:lstStyle>
@@ -3896,15 +4013,19 @@
               <a:defRPr/>
             </a:lvl9pPr>
           </a:lstStyle>
-          <a:p/>
+          <a:p>
+            <a:endParaRPr/>
+          </a:p>
         </p:txBody>
       </p:sp>
       <p:sp>
         <p:nvSpPr>
           <p:cNvPr id="32" name="Google Shape;32;p6"/>
-          <p:cNvSpPr txBox="1"/>
+          <p:cNvSpPr txBox="1">
+            <a:spLocks noGrp="1"/>
+          </p:cNvSpPr>
           <p:nvPr>
-            <p:ph idx="12" type="sldNum"/>
+            <p:ph type="sldNum" idx="12"/>
           </p:nvPr>
         </p:nvSpPr>
         <p:spPr>
@@ -3917,7 +4038,7 @@
           </a:prstGeom>
         </p:spPr>
         <p:txBody>
-          <a:bodyPr anchorCtr="0" anchor="ctr" bIns="91425" lIns="91425" spcFirstLastPara="1" rIns="91425" wrap="square" tIns="91425">
+          <a:bodyPr spcFirstLastPara="1" wrap="square" lIns="91425" tIns="91425" rIns="91425" bIns="91425" anchor="ctr" anchorCtr="0">
             <a:normAutofit/>
           </a:bodyPr>
           <a:lstStyle>
@@ -3959,7 +4080,7 @@
             </a:lvl9pPr>
           </a:lstStyle>
           <a:p>
-            <a:pPr indent="0" lvl="0" marL="0" rtl="0" algn="r">
+            <a:pPr marL="0" lvl="0" indent="0" algn="r" rtl="0">
               <a:spcBef>
                 <a:spcPts val="0"/>
               </a:spcBef>
@@ -3985,11 +4106,11 @@
 </file>
 
 <file path=ppt/slideLayouts/slideLayout6.xml><?xml version="1.0" encoding="utf-8"?>
-<p:sldLayout xmlns:a="http://schemas.openxmlformats.org/drawingml/2006/main" xmlns:r="http://schemas.openxmlformats.org/officeDocument/2006/relationships" xmlns:mc="http://schemas.openxmlformats.org/markup-compatibility/2006" xmlns:mv="urn:schemas-microsoft-com:mac:vml" xmlns:p="http://schemas.openxmlformats.org/presentationml/2006/main" xmlns:c="http://schemas.openxmlformats.org/drawingml/2006/chart" xmlns:dgm="http://schemas.openxmlformats.org/drawingml/2006/diagram" xmlns:o="urn:schemas-microsoft-com:office:office" xmlns:v="urn:schemas-microsoft-com:vml" xmlns:pvml="urn:schemas-microsoft-com:office:powerpoint" xmlns:com="http://schemas.openxmlformats.org/drawingml/2006/compatibility" xmlns:p14="http://schemas.microsoft.com/office/powerpoint/2010/main" xmlns:p15="http://schemas.microsoft.com/office/powerpoint/2012/main" xmlns:ahyp="http://schemas.microsoft.com/office/drawing/2018/hyperlinkcolor" matchingName="One column text">
+<p:sldLayout xmlns:a="http://schemas.openxmlformats.org/drawingml/2006/main" xmlns:r="http://schemas.openxmlformats.org/officeDocument/2006/relationships" xmlns:p="http://schemas.openxmlformats.org/presentationml/2006/main" matchingName="One column text">
   <p:cSld name="ONE_COLUMN_TEXT">
     <p:spTree>
       <p:nvGrpSpPr>
-        <p:cNvPr id="33" name="Shape 33"/>
+        <p:cNvPr id="1" name="Shape 33"/>
         <p:cNvGrpSpPr/>
         <p:nvPr/>
       </p:nvGrpSpPr>
@@ -4004,7 +4125,9 @@
       <p:sp>
         <p:nvSpPr>
           <p:cNvPr id="34" name="Google Shape;34;p7"/>
-          <p:cNvSpPr txBox="1"/>
+          <p:cNvSpPr txBox="1">
+            <a:spLocks noGrp="1"/>
+          </p:cNvSpPr>
           <p:nvPr>
             <p:ph type="title"/>
           </p:nvPr>
@@ -4019,7 +4142,7 @@
           </a:prstGeom>
         </p:spPr>
         <p:txBody>
-          <a:bodyPr anchorCtr="0" anchor="b" bIns="91425" lIns="91425" spcFirstLastPara="1" rIns="91425" wrap="square" tIns="91425">
+          <a:bodyPr spcFirstLastPara="1" wrap="square" lIns="91425" tIns="91425" rIns="91425" bIns="91425" anchor="b" anchorCtr="0">
             <a:normAutofit/>
           </a:bodyPr>
           <a:lstStyle>
@@ -4123,15 +4246,19 @@
               <a:defRPr sz="3000"/>
             </a:lvl9pPr>
           </a:lstStyle>
-          <a:p/>
+          <a:p>
+            <a:endParaRPr/>
+          </a:p>
         </p:txBody>
       </p:sp>
       <p:sp>
         <p:nvSpPr>
           <p:cNvPr id="35" name="Google Shape;35;p7"/>
-          <p:cNvSpPr txBox="1"/>
+          <p:cNvSpPr txBox="1">
+            <a:spLocks noGrp="1"/>
+          </p:cNvSpPr>
           <p:nvPr>
-            <p:ph idx="1" type="body"/>
+            <p:ph type="body" idx="1"/>
           </p:nvPr>
         </p:nvSpPr>
         <p:spPr>
@@ -4144,11 +4271,11 @@
           </a:prstGeom>
         </p:spPr>
         <p:txBody>
-          <a:bodyPr anchorCtr="0" anchor="t" bIns="91425" lIns="91425" spcFirstLastPara="1" rIns="91425" wrap="square" tIns="91425">
+          <a:bodyPr spcFirstLastPara="1" wrap="square" lIns="91425" tIns="91425" rIns="91425" bIns="91425" anchor="t" anchorCtr="0">
             <a:normAutofit/>
           </a:bodyPr>
           <a:lstStyle>
-            <a:lvl1pPr indent="-304800" lvl="0" marL="457200">
+            <a:lvl1pPr marL="457200" lvl="0" indent="-304800">
               <a:spcBef>
                 <a:spcPts val="0"/>
               </a:spcBef>
@@ -4159,7 +4286,7 @@
               <a:buChar char="●"/>
               <a:defRPr sz="1200"/>
             </a:lvl1pPr>
-            <a:lvl2pPr indent="-304800" lvl="1" marL="914400">
+            <a:lvl2pPr marL="914400" lvl="1" indent="-304800">
               <a:spcBef>
                 <a:spcPts val="0"/>
               </a:spcBef>
@@ -4170,7 +4297,7 @@
               <a:buChar char="○"/>
               <a:defRPr sz="1200"/>
             </a:lvl2pPr>
-            <a:lvl3pPr indent="-304800" lvl="2" marL="1371600">
+            <a:lvl3pPr marL="1371600" lvl="2" indent="-304800">
               <a:spcBef>
                 <a:spcPts val="0"/>
               </a:spcBef>
@@ -4181,7 +4308,7 @@
               <a:buChar char="■"/>
               <a:defRPr sz="1200"/>
             </a:lvl3pPr>
-            <a:lvl4pPr indent="-304800" lvl="3" marL="1828800">
+            <a:lvl4pPr marL="1828800" lvl="3" indent="-304800">
               <a:spcBef>
                 <a:spcPts val="0"/>
               </a:spcBef>
@@ -4192,7 +4319,7 @@
               <a:buChar char="●"/>
               <a:defRPr sz="1200"/>
             </a:lvl4pPr>
-            <a:lvl5pPr indent="-304800" lvl="4" marL="2286000">
+            <a:lvl5pPr marL="2286000" lvl="4" indent="-304800">
               <a:spcBef>
                 <a:spcPts val="0"/>
               </a:spcBef>
@@ -4203,7 +4330,7 @@
               <a:buChar char="○"/>
               <a:defRPr sz="1200"/>
             </a:lvl5pPr>
-            <a:lvl6pPr indent="-304800" lvl="5" marL="2743200">
+            <a:lvl6pPr marL="2743200" lvl="5" indent="-304800">
               <a:spcBef>
                 <a:spcPts val="0"/>
               </a:spcBef>
@@ -4214,7 +4341,7 @@
               <a:buChar char="■"/>
               <a:defRPr sz="1200"/>
             </a:lvl6pPr>
-            <a:lvl7pPr indent="-304800" lvl="6" marL="3200400">
+            <a:lvl7pPr marL="3200400" lvl="6" indent="-304800">
               <a:spcBef>
                 <a:spcPts val="0"/>
               </a:spcBef>
@@ -4225,7 +4352,7 @@
               <a:buChar char="●"/>
               <a:defRPr sz="1200"/>
             </a:lvl7pPr>
-            <a:lvl8pPr indent="-304800" lvl="7" marL="3657600">
+            <a:lvl8pPr marL="3657600" lvl="7" indent="-304800">
               <a:spcBef>
                 <a:spcPts val="0"/>
               </a:spcBef>
@@ -4236,7 +4363,7 @@
               <a:buChar char="○"/>
               <a:defRPr sz="1200"/>
             </a:lvl8pPr>
-            <a:lvl9pPr indent="-304800" lvl="8" marL="4114800">
+            <a:lvl9pPr marL="4114800" lvl="8" indent="-304800">
               <a:spcBef>
                 <a:spcPts val="0"/>
               </a:spcBef>
@@ -4248,15 +4375,19 @@
               <a:defRPr sz="1200"/>
             </a:lvl9pPr>
           </a:lstStyle>
-          <a:p/>
+          <a:p>
+            <a:endParaRPr/>
+          </a:p>
         </p:txBody>
       </p:sp>
       <p:sp>
         <p:nvSpPr>
           <p:cNvPr id="36" name="Google Shape;36;p7"/>
-          <p:cNvSpPr txBox="1"/>
+          <p:cNvSpPr txBox="1">
+            <a:spLocks noGrp="1"/>
+          </p:cNvSpPr>
           <p:nvPr>
-            <p:ph idx="12" type="sldNum"/>
+            <p:ph type="sldNum" idx="12"/>
           </p:nvPr>
         </p:nvSpPr>
         <p:spPr>
@@ -4269,7 +4400,7 @@
           </a:prstGeom>
         </p:spPr>
         <p:txBody>
-          <a:bodyPr anchorCtr="0" anchor="ctr" bIns="91425" lIns="91425" spcFirstLastPara="1" rIns="91425" wrap="square" tIns="91425">
+          <a:bodyPr spcFirstLastPara="1" wrap="square" lIns="91425" tIns="91425" rIns="91425" bIns="91425" anchor="ctr" anchorCtr="0">
             <a:normAutofit/>
           </a:bodyPr>
           <a:lstStyle>
@@ -4311,7 +4442,7 @@
             </a:lvl9pPr>
           </a:lstStyle>
           <a:p>
-            <a:pPr indent="0" lvl="0" marL="0" rtl="0" algn="r">
+            <a:pPr marL="0" lvl="0" indent="0" algn="r" rtl="0">
               <a:spcBef>
                 <a:spcPts val="0"/>
               </a:spcBef>
@@ -4337,11 +4468,11 @@
 </file>
 
 <file path=ppt/slideLayouts/slideLayout7.xml><?xml version="1.0" encoding="utf-8"?>
-<p:sldLayout xmlns:a="http://schemas.openxmlformats.org/drawingml/2006/main" xmlns:r="http://schemas.openxmlformats.org/officeDocument/2006/relationships" xmlns:mc="http://schemas.openxmlformats.org/markup-compatibility/2006" xmlns:mv="urn:schemas-microsoft-com:mac:vml" xmlns:p="http://schemas.openxmlformats.org/presentationml/2006/main" xmlns:c="http://schemas.openxmlformats.org/drawingml/2006/chart" xmlns:dgm="http://schemas.openxmlformats.org/drawingml/2006/diagram" xmlns:o="urn:schemas-microsoft-com:office:office" xmlns:v="urn:schemas-microsoft-com:vml" xmlns:pvml="urn:schemas-microsoft-com:office:powerpoint" xmlns:com="http://schemas.openxmlformats.org/drawingml/2006/compatibility" xmlns:p14="http://schemas.microsoft.com/office/powerpoint/2010/main" xmlns:p15="http://schemas.microsoft.com/office/powerpoint/2012/main" xmlns:ahyp="http://schemas.microsoft.com/office/drawing/2018/hyperlinkcolor" matchingName="Main point">
+<p:sldLayout xmlns:a="http://schemas.openxmlformats.org/drawingml/2006/main" xmlns:r="http://schemas.openxmlformats.org/officeDocument/2006/relationships" xmlns:p="http://schemas.openxmlformats.org/presentationml/2006/main" matchingName="Main point">
   <p:cSld name="MAIN_POINT">
     <p:spTree>
       <p:nvGrpSpPr>
-        <p:cNvPr id="37" name="Shape 37"/>
+        <p:cNvPr id="1" name="Shape 37"/>
         <p:cNvGrpSpPr/>
         <p:nvPr/>
       </p:nvGrpSpPr>
@@ -4375,12 +4506,12 @@
           </a:ln>
         </p:spPr>
         <p:txBody>
-          <a:bodyPr anchorCtr="0" anchor="ctr" bIns="91425" lIns="91425" spcFirstLastPara="1" rIns="91425" wrap="square" tIns="91425">
+          <a:bodyPr spcFirstLastPara="1" wrap="square" lIns="91425" tIns="91425" rIns="91425" bIns="91425" anchor="ctr" anchorCtr="0">
             <a:noAutofit/>
           </a:bodyPr>
           <a:lstStyle/>
           <a:p>
-            <a:pPr indent="0" lvl="0" marL="0" rtl="0" algn="l">
+            <a:pPr marL="0" lvl="0" indent="0" algn="l" rtl="0">
               <a:spcBef>
                 <a:spcPts val="0"/>
               </a:spcBef>
@@ -4389,9 +4520,6 @@
               </a:spcAft>
               <a:buNone/>
             </a:pPr>
-            <a:r>
-              <a:t/>
-            </a:r>
             <a:endParaRPr/>
           </a:p>
         </p:txBody>
@@ -4399,7 +4527,9 @@
       <p:sp>
         <p:nvSpPr>
           <p:cNvPr id="39" name="Google Shape;39;p8"/>
-          <p:cNvSpPr txBox="1"/>
+          <p:cNvSpPr txBox="1">
+            <a:spLocks noGrp="1"/>
+          </p:cNvSpPr>
           <p:nvPr>
             <p:ph type="title"/>
           </p:nvPr>
@@ -4414,7 +4544,7 @@
           </a:prstGeom>
         </p:spPr>
         <p:txBody>
-          <a:bodyPr anchorCtr="0" anchor="ctr" bIns="91425" lIns="91425" spcFirstLastPara="1" rIns="91425" wrap="square" tIns="91425">
+          <a:bodyPr spcFirstLastPara="1" wrap="square" lIns="91425" tIns="91425" rIns="91425" bIns="91425" anchor="ctr" anchorCtr="0">
             <a:normAutofit/>
           </a:bodyPr>
           <a:lstStyle>
@@ -4518,15 +4648,19 @@
               <a:defRPr sz="4800"/>
             </a:lvl9pPr>
           </a:lstStyle>
-          <a:p/>
+          <a:p>
+            <a:endParaRPr/>
+          </a:p>
         </p:txBody>
       </p:sp>
       <p:sp>
         <p:nvSpPr>
           <p:cNvPr id="40" name="Google Shape;40;p8"/>
-          <p:cNvSpPr txBox="1"/>
+          <p:cNvSpPr txBox="1">
+            <a:spLocks noGrp="1"/>
+          </p:cNvSpPr>
           <p:nvPr>
-            <p:ph idx="12" type="sldNum"/>
+            <p:ph type="sldNum" idx="12"/>
           </p:nvPr>
         </p:nvSpPr>
         <p:spPr>
@@ -4539,7 +4673,7 @@
           </a:prstGeom>
         </p:spPr>
         <p:txBody>
-          <a:bodyPr anchorCtr="0" anchor="ctr" bIns="91425" lIns="91425" spcFirstLastPara="1" rIns="91425" wrap="square" tIns="91425">
+          <a:bodyPr spcFirstLastPara="1" wrap="square" lIns="91425" tIns="91425" rIns="91425" bIns="91425" anchor="ctr" anchorCtr="0">
             <a:normAutofit/>
           </a:bodyPr>
           <a:lstStyle>
@@ -4581,7 +4715,7 @@
             </a:lvl9pPr>
           </a:lstStyle>
           <a:p>
-            <a:pPr indent="0" lvl="0" marL="0" rtl="0" algn="r">
+            <a:pPr marL="0" lvl="0" indent="0" algn="r" rtl="0">
               <a:spcBef>
                 <a:spcPts val="0"/>
               </a:spcBef>
@@ -4607,11 +4741,11 @@
 </file>
 
 <file path=ppt/slideLayouts/slideLayout8.xml><?xml version="1.0" encoding="utf-8"?>
-<p:sldLayout xmlns:a="http://schemas.openxmlformats.org/drawingml/2006/main" xmlns:r="http://schemas.openxmlformats.org/officeDocument/2006/relationships" xmlns:mc="http://schemas.openxmlformats.org/markup-compatibility/2006" xmlns:mv="urn:schemas-microsoft-com:mac:vml" xmlns:p="http://schemas.openxmlformats.org/presentationml/2006/main" xmlns:c="http://schemas.openxmlformats.org/drawingml/2006/chart" xmlns:dgm="http://schemas.openxmlformats.org/drawingml/2006/diagram" xmlns:o="urn:schemas-microsoft-com:office:office" xmlns:v="urn:schemas-microsoft-com:vml" xmlns:pvml="urn:schemas-microsoft-com:office:powerpoint" xmlns:com="http://schemas.openxmlformats.org/drawingml/2006/compatibility" xmlns:p14="http://schemas.microsoft.com/office/powerpoint/2010/main" xmlns:p15="http://schemas.microsoft.com/office/powerpoint/2012/main" xmlns:ahyp="http://schemas.microsoft.com/office/drawing/2018/hyperlinkcolor" matchingName="Section title and description">
+<p:sldLayout xmlns:a="http://schemas.openxmlformats.org/drawingml/2006/main" xmlns:r="http://schemas.openxmlformats.org/officeDocument/2006/relationships" xmlns:p="http://schemas.openxmlformats.org/presentationml/2006/main" matchingName="Section title and description">
   <p:cSld name="SECTION_TITLE_AND_DESCRIPTION">
     <p:spTree>
       <p:nvGrpSpPr>
-        <p:cNvPr id="41" name="Shape 41"/>
+        <p:cNvPr id="1" name="Shape 41"/>
         <p:cNvGrpSpPr/>
         <p:nvPr/>
       </p:nvGrpSpPr>
@@ -4645,12 +4779,12 @@
           </a:ln>
         </p:spPr>
         <p:txBody>
-          <a:bodyPr anchorCtr="0" anchor="ctr" bIns="91425" lIns="91425" spcFirstLastPara="1" rIns="91425" wrap="square" tIns="91425">
+          <a:bodyPr spcFirstLastPara="1" wrap="square" lIns="91425" tIns="91425" rIns="91425" bIns="91425" anchor="ctr" anchorCtr="0">
             <a:noAutofit/>
           </a:bodyPr>
           <a:lstStyle/>
           <a:p>
-            <a:pPr indent="0" lvl="0" marL="0" rtl="0" algn="l">
+            <a:pPr marL="0" lvl="0" indent="0" algn="l" rtl="0">
               <a:spcBef>
                 <a:spcPts val="0"/>
               </a:spcBef>
@@ -4659,9 +4793,6 @@
               </a:spcAft>
               <a:buNone/>
             </a:pPr>
-            <a:r>
-              <a:t/>
-            </a:r>
             <a:endParaRPr/>
           </a:p>
         </p:txBody>
@@ -4681,21 +4812,23 @@
             <a:avLst/>
           </a:prstGeom>
           <a:noFill/>
-          <a:ln cap="flat" cmpd="sng" w="19050">
+          <a:ln w="19050" cap="flat" cmpd="sng">
             <a:solidFill>
               <a:schemeClr val="lt1"/>
             </a:solidFill>
             <a:prstDash val="solid"/>
             <a:round/>
-            <a:headEnd len="sm" w="sm" type="none"/>
-            <a:tailEnd len="sm" w="sm" type="none"/>
+            <a:headEnd type="none" w="sm" len="sm"/>
+            <a:tailEnd type="none" w="sm" len="sm"/>
           </a:ln>
         </p:spPr>
       </p:cxnSp>
       <p:sp>
         <p:nvSpPr>
           <p:cNvPr id="44" name="Google Shape;44;p9"/>
-          <p:cNvSpPr txBox="1"/>
+          <p:cNvSpPr txBox="1">
+            <a:spLocks noGrp="1"/>
+          </p:cNvSpPr>
           <p:nvPr>
             <p:ph type="title"/>
           </p:nvPr>
@@ -4710,7 +4843,7 @@
           </a:prstGeom>
         </p:spPr>
         <p:txBody>
-          <a:bodyPr anchorCtr="0" anchor="b" bIns="91425" lIns="91425" spcFirstLastPara="1" rIns="91425" wrap="square" tIns="91425">
+          <a:bodyPr spcFirstLastPara="1" wrap="square" lIns="91425" tIns="91425" rIns="91425" bIns="91425" anchor="b" anchorCtr="0">
             <a:normAutofit/>
           </a:bodyPr>
           <a:lstStyle>
@@ -4877,15 +5010,19 @@
               </a:defRPr>
             </a:lvl9pPr>
           </a:lstStyle>
-          <a:p/>
+          <a:p>
+            <a:endParaRPr/>
+          </a:p>
         </p:txBody>
       </p:sp>
       <p:sp>
         <p:nvSpPr>
           <p:cNvPr id="45" name="Google Shape;45;p9"/>
-          <p:cNvSpPr txBox="1"/>
+          <p:cNvSpPr txBox="1">
+            <a:spLocks noGrp="1"/>
+          </p:cNvSpPr>
           <p:nvPr>
-            <p:ph idx="1" type="subTitle"/>
+            <p:ph type="subTitle" idx="1"/>
           </p:nvPr>
         </p:nvSpPr>
         <p:spPr>
@@ -4898,7 +5035,7 @@
           </a:prstGeom>
         </p:spPr>
         <p:txBody>
-          <a:bodyPr anchorCtr="0" anchor="t" bIns="91425" lIns="91425" spcFirstLastPara="1" rIns="91425" wrap="square" tIns="91425">
+          <a:bodyPr spcFirstLastPara="1" wrap="square" lIns="91425" tIns="91425" rIns="91425" bIns="91425" anchor="t" anchorCtr="0">
             <a:normAutofit/>
           </a:bodyPr>
           <a:lstStyle>
@@ -5083,15 +5220,19 @@
               </a:defRPr>
             </a:lvl9pPr>
           </a:lstStyle>
-          <a:p/>
+          <a:p>
+            <a:endParaRPr/>
+          </a:p>
         </p:txBody>
       </p:sp>
       <p:sp>
         <p:nvSpPr>
           <p:cNvPr id="46" name="Google Shape;46;p9"/>
-          <p:cNvSpPr txBox="1"/>
+          <p:cNvSpPr txBox="1">
+            <a:spLocks noGrp="1"/>
+          </p:cNvSpPr>
           <p:nvPr>
-            <p:ph idx="2" type="body"/>
+            <p:ph type="body" idx="2"/>
           </p:nvPr>
         </p:nvSpPr>
         <p:spPr>
@@ -5104,11 +5245,11 @@
           </a:prstGeom>
         </p:spPr>
         <p:txBody>
-          <a:bodyPr anchorCtr="0" anchor="ctr" bIns="91425" lIns="91425" spcFirstLastPara="1" rIns="91425" wrap="square" tIns="91425">
+          <a:bodyPr spcFirstLastPara="1" wrap="square" lIns="91425" tIns="91425" rIns="91425" bIns="91425" anchor="ctr" anchorCtr="0">
             <a:normAutofit/>
           </a:bodyPr>
           <a:lstStyle>
-            <a:lvl1pPr indent="-342900" lvl="0" marL="457200">
+            <a:lvl1pPr marL="457200" lvl="0" indent="-342900">
               <a:spcBef>
                 <a:spcPts val="0"/>
               </a:spcBef>
@@ -5126,7 +5267,7 @@
                 </a:solidFill>
               </a:defRPr>
             </a:lvl1pPr>
-            <a:lvl2pPr indent="-317500" lvl="1" marL="914400">
+            <a:lvl2pPr marL="914400" lvl="1" indent="-317500">
               <a:spcBef>
                 <a:spcPts val="0"/>
               </a:spcBef>
@@ -5144,7 +5285,7 @@
                 </a:solidFill>
               </a:defRPr>
             </a:lvl2pPr>
-            <a:lvl3pPr indent="-317500" lvl="2" marL="1371600">
+            <a:lvl3pPr marL="1371600" lvl="2" indent="-317500">
               <a:spcBef>
                 <a:spcPts val="0"/>
               </a:spcBef>
@@ -5162,7 +5303,7 @@
                 </a:solidFill>
               </a:defRPr>
             </a:lvl3pPr>
-            <a:lvl4pPr indent="-317500" lvl="3" marL="1828800">
+            <a:lvl4pPr marL="1828800" lvl="3" indent="-317500">
               <a:spcBef>
                 <a:spcPts val="0"/>
               </a:spcBef>
@@ -5180,7 +5321,7 @@
                 </a:solidFill>
               </a:defRPr>
             </a:lvl4pPr>
-            <a:lvl5pPr indent="-317500" lvl="4" marL="2286000">
+            <a:lvl5pPr marL="2286000" lvl="4" indent="-317500">
               <a:spcBef>
                 <a:spcPts val="0"/>
               </a:spcBef>
@@ -5198,7 +5339,7 @@
                 </a:solidFill>
               </a:defRPr>
             </a:lvl5pPr>
-            <a:lvl6pPr indent="-317500" lvl="5" marL="2743200">
+            <a:lvl6pPr marL="2743200" lvl="5" indent="-317500">
               <a:spcBef>
                 <a:spcPts val="0"/>
               </a:spcBef>
@@ -5216,7 +5357,7 @@
                 </a:solidFill>
               </a:defRPr>
             </a:lvl6pPr>
-            <a:lvl7pPr indent="-317500" lvl="6" marL="3200400">
+            <a:lvl7pPr marL="3200400" lvl="6" indent="-317500">
               <a:spcBef>
                 <a:spcPts val="0"/>
               </a:spcBef>
@@ -5234,7 +5375,7 @@
                 </a:solidFill>
               </a:defRPr>
             </a:lvl7pPr>
-            <a:lvl8pPr indent="-317500" lvl="7" marL="3657600">
+            <a:lvl8pPr marL="3657600" lvl="7" indent="-317500">
               <a:spcBef>
                 <a:spcPts val="0"/>
               </a:spcBef>
@@ -5252,7 +5393,7 @@
                 </a:solidFill>
               </a:defRPr>
             </a:lvl8pPr>
-            <a:lvl9pPr indent="-317500" lvl="8" marL="4114800">
+            <a:lvl9pPr marL="4114800" lvl="8" indent="-317500">
               <a:spcBef>
                 <a:spcPts val="0"/>
               </a:spcBef>
@@ -5271,15 +5412,19 @@
               </a:defRPr>
             </a:lvl9pPr>
           </a:lstStyle>
-          <a:p/>
+          <a:p>
+            <a:endParaRPr/>
+          </a:p>
         </p:txBody>
       </p:sp>
       <p:sp>
         <p:nvSpPr>
           <p:cNvPr id="47" name="Google Shape;47;p9"/>
-          <p:cNvSpPr txBox="1"/>
+          <p:cNvSpPr txBox="1">
+            <a:spLocks noGrp="1"/>
+          </p:cNvSpPr>
           <p:nvPr>
-            <p:ph idx="12" type="sldNum"/>
+            <p:ph type="sldNum" idx="12"/>
           </p:nvPr>
         </p:nvSpPr>
         <p:spPr>
@@ -5292,7 +5437,7 @@
           </a:prstGeom>
         </p:spPr>
         <p:txBody>
-          <a:bodyPr anchorCtr="0" anchor="ctr" bIns="91425" lIns="91425" spcFirstLastPara="1" rIns="91425" wrap="square" tIns="91425">
+          <a:bodyPr spcFirstLastPara="1" wrap="square" lIns="91425" tIns="91425" rIns="91425" bIns="91425" anchor="ctr" anchorCtr="0">
             <a:normAutofit/>
           </a:bodyPr>
           <a:lstStyle>
@@ -5370,7 +5515,7 @@
             </a:lvl9pPr>
           </a:lstStyle>
           <a:p>
-            <a:pPr indent="0" lvl="0" marL="0" rtl="0" algn="r">
+            <a:pPr marL="0" lvl="0" indent="0" algn="r" rtl="0">
               <a:spcBef>
                 <a:spcPts val="0"/>
               </a:spcBef>
@@ -5396,11 +5541,11 @@
 </file>
 
 <file path=ppt/slideLayouts/slideLayout9.xml><?xml version="1.0" encoding="utf-8"?>
-<p:sldLayout xmlns:a="http://schemas.openxmlformats.org/drawingml/2006/main" xmlns:r="http://schemas.openxmlformats.org/officeDocument/2006/relationships" xmlns:mc="http://schemas.openxmlformats.org/markup-compatibility/2006" xmlns:mv="urn:schemas-microsoft-com:mac:vml" xmlns:p="http://schemas.openxmlformats.org/presentationml/2006/main" xmlns:c="http://schemas.openxmlformats.org/drawingml/2006/chart" xmlns:dgm="http://schemas.openxmlformats.org/drawingml/2006/diagram" xmlns:o="urn:schemas-microsoft-com:office:office" xmlns:v="urn:schemas-microsoft-com:vml" xmlns:pvml="urn:schemas-microsoft-com:office:powerpoint" xmlns:com="http://schemas.openxmlformats.org/drawingml/2006/compatibility" xmlns:p14="http://schemas.microsoft.com/office/powerpoint/2010/main" xmlns:p15="http://schemas.microsoft.com/office/powerpoint/2012/main" xmlns:ahyp="http://schemas.microsoft.com/office/drawing/2018/hyperlinkcolor" matchingName="Caption">
+<p:sldLayout xmlns:a="http://schemas.openxmlformats.org/drawingml/2006/main" xmlns:r="http://schemas.openxmlformats.org/officeDocument/2006/relationships" xmlns:p="http://schemas.openxmlformats.org/presentationml/2006/main" matchingName="Caption">
   <p:cSld name="CAPTION_ONLY">
     <p:spTree>
       <p:nvGrpSpPr>
-        <p:cNvPr id="48" name="Shape 48"/>
+        <p:cNvPr id="1" name="Shape 48"/>
         <p:cNvGrpSpPr/>
         <p:nvPr/>
       </p:nvGrpSpPr>
@@ -5415,9 +5560,11 @@
       <p:sp>
         <p:nvSpPr>
           <p:cNvPr id="49" name="Google Shape;49;p10"/>
-          <p:cNvSpPr txBox="1"/>
+          <p:cNvSpPr txBox="1">
+            <a:spLocks noGrp="1"/>
+          </p:cNvSpPr>
           <p:nvPr>
-            <p:ph idx="1" type="body"/>
+            <p:ph type="body" idx="1"/>
           </p:nvPr>
         </p:nvSpPr>
         <p:spPr>
@@ -5430,11 +5577,11 @@
           </a:prstGeom>
         </p:spPr>
         <p:txBody>
-          <a:bodyPr anchorCtr="0" anchor="ctr" bIns="91425" lIns="91425" spcFirstLastPara="1" rIns="91425" wrap="square" tIns="91425">
+          <a:bodyPr spcFirstLastPara="1" wrap="square" lIns="91425" tIns="91425" rIns="91425" bIns="91425" anchor="ctr" anchorCtr="0">
             <a:normAutofit/>
           </a:bodyPr>
           <a:lstStyle>
-            <a:lvl1pPr indent="-228600" lvl="0" marL="457200">
+            <a:lvl1pPr marL="457200" lvl="0" indent="-228600">
               <a:lnSpc>
                 <a:spcPct val="100000"/>
               </a:lnSpc>
@@ -5455,15 +5602,19 @@
               </a:defRPr>
             </a:lvl1pPr>
           </a:lstStyle>
-          <a:p/>
+          <a:p>
+            <a:endParaRPr/>
+          </a:p>
         </p:txBody>
       </p:sp>
       <p:sp>
         <p:nvSpPr>
           <p:cNvPr id="50" name="Google Shape;50;p10"/>
-          <p:cNvSpPr txBox="1"/>
+          <p:cNvSpPr txBox="1">
+            <a:spLocks noGrp="1"/>
+          </p:cNvSpPr>
           <p:nvPr>
-            <p:ph idx="12" type="sldNum"/>
+            <p:ph type="sldNum" idx="12"/>
           </p:nvPr>
         </p:nvSpPr>
         <p:spPr>
@@ -5476,7 +5627,7 @@
           </a:prstGeom>
         </p:spPr>
         <p:txBody>
-          <a:bodyPr anchorCtr="0" anchor="ctr" bIns="91425" lIns="91425" spcFirstLastPara="1" rIns="91425" wrap="square" tIns="91425">
+          <a:bodyPr spcFirstLastPara="1" wrap="square" lIns="91425" tIns="91425" rIns="91425" bIns="91425" anchor="ctr" anchorCtr="0">
             <a:normAutofit/>
           </a:bodyPr>
           <a:lstStyle>
@@ -5518,7 +5669,7 @@
             </a:lvl9pPr>
           </a:lstStyle>
           <a:p>
-            <a:pPr indent="0" lvl="0" marL="0" rtl="0" algn="r">
+            <a:pPr marL="0" lvl="0" indent="0" algn="r" rtl="0">
               <a:spcBef>
                 <a:spcPts val="0"/>
               </a:spcBef>
@@ -5544,18 +5695,19 @@
 </file>
 
 <file path=ppt/slideMasters/slideMaster1.xml><?xml version="1.0" encoding="utf-8"?>
-<p:sldMaster xmlns:a="http://schemas.openxmlformats.org/drawingml/2006/main" xmlns:r="http://schemas.openxmlformats.org/officeDocument/2006/relationships" xmlns:mc="http://schemas.openxmlformats.org/markup-compatibility/2006" xmlns:mv="urn:schemas-microsoft-com:mac:vml" xmlns:p="http://schemas.openxmlformats.org/presentationml/2006/main" xmlns:c="http://schemas.openxmlformats.org/drawingml/2006/chart" xmlns:dgm="http://schemas.openxmlformats.org/drawingml/2006/diagram" xmlns:o="urn:schemas-microsoft-com:office:office" xmlns:v="urn:schemas-microsoft-com:vml" xmlns:pvml="urn:schemas-microsoft-com:office:powerpoint" xmlns:com="http://schemas.openxmlformats.org/drawingml/2006/compatibility" xmlns:p14="http://schemas.microsoft.com/office/powerpoint/2010/main" xmlns:p15="http://schemas.microsoft.com/office/powerpoint/2012/main" xmlns:ahyp="http://schemas.microsoft.com/office/drawing/2018/hyperlinkcolor">
+<p:sldMaster xmlns:a="http://schemas.openxmlformats.org/drawingml/2006/main" xmlns:r="http://schemas.openxmlformats.org/officeDocument/2006/relationships" xmlns:p="http://schemas.openxmlformats.org/presentationml/2006/main">
   <p:cSld name="luxe">
     <p:bg>
       <p:bgPr>
         <a:solidFill>
           <a:schemeClr val="lt1"/>
         </a:solidFill>
+        <a:effectLst/>
       </p:bgPr>
     </p:bg>
     <p:spTree>
       <p:nvGrpSpPr>
-        <p:cNvPr id="5" name="Shape 5"/>
+        <p:cNvPr id="1" name="Shape 5"/>
         <p:cNvGrpSpPr/>
         <p:nvPr/>
       </p:nvGrpSpPr>
@@ -5570,7 +5722,9 @@
       <p:sp>
         <p:nvSpPr>
           <p:cNvPr id="6" name="Google Shape;6;p1"/>
-          <p:cNvSpPr txBox="1"/>
+          <p:cNvSpPr txBox="1">
+            <a:spLocks noGrp="1"/>
+          </p:cNvSpPr>
           <p:nvPr>
             <p:ph type="title"/>
           </p:nvPr>
@@ -5589,7 +5743,7 @@
           </a:ln>
         </p:spPr>
         <p:txBody>
-          <a:bodyPr anchorCtr="0" anchor="b" bIns="91425" lIns="91425" spcFirstLastPara="1" rIns="91425" wrap="square" tIns="91425">
+          <a:bodyPr spcFirstLastPara="1" wrap="square" lIns="91425" tIns="91425" rIns="91425" bIns="91425" anchor="b" anchorCtr="0">
             <a:normAutofit/>
           </a:bodyPr>
           <a:lstStyle>
@@ -5801,15 +5955,19 @@
               </a:defRPr>
             </a:lvl9pPr>
           </a:lstStyle>
-          <a:p/>
+          <a:p>
+            <a:endParaRPr/>
+          </a:p>
         </p:txBody>
       </p:sp>
       <p:sp>
         <p:nvSpPr>
           <p:cNvPr id="7" name="Google Shape;7;p1"/>
-          <p:cNvSpPr txBox="1"/>
+          <p:cNvSpPr txBox="1">
+            <a:spLocks noGrp="1"/>
+          </p:cNvSpPr>
           <p:nvPr>
-            <p:ph idx="1" type="body"/>
+            <p:ph type="body" idx="1"/>
           </p:nvPr>
         </p:nvSpPr>
         <p:spPr>
@@ -5826,11 +5984,11 @@
           </a:ln>
         </p:spPr>
         <p:txBody>
-          <a:bodyPr anchorCtr="0" anchor="t" bIns="91425" lIns="91425" spcFirstLastPara="1" rIns="91425" wrap="square" tIns="91425">
+          <a:bodyPr spcFirstLastPara="1" wrap="square" lIns="91425" tIns="91425" rIns="91425" bIns="91425" anchor="t" anchorCtr="0">
             <a:normAutofit/>
           </a:bodyPr>
           <a:lstStyle>
-            <a:lvl1pPr indent="-342900" lvl="0" marL="457200">
+            <a:lvl1pPr marL="457200" lvl="0" indent="-342900">
               <a:lnSpc>
                 <a:spcPct val="115000"/>
               </a:lnSpc>
@@ -5856,7 +6014,7 @@
                 <a:sym typeface="Open Sans"/>
               </a:defRPr>
             </a:lvl1pPr>
-            <a:lvl2pPr indent="-317500" lvl="1" marL="914400">
+            <a:lvl2pPr marL="914400" lvl="1" indent="-317500">
               <a:lnSpc>
                 <a:spcPct val="115000"/>
               </a:lnSpc>
@@ -5882,7 +6040,7 @@
                 <a:sym typeface="Open Sans"/>
               </a:defRPr>
             </a:lvl2pPr>
-            <a:lvl3pPr indent="-317500" lvl="2" marL="1371600">
+            <a:lvl3pPr marL="1371600" lvl="2" indent="-317500">
               <a:lnSpc>
                 <a:spcPct val="115000"/>
               </a:lnSpc>
@@ -5908,7 +6066,7 @@
                 <a:sym typeface="Open Sans"/>
               </a:defRPr>
             </a:lvl3pPr>
-            <a:lvl4pPr indent="-317500" lvl="3" marL="1828800">
+            <a:lvl4pPr marL="1828800" lvl="3" indent="-317500">
               <a:lnSpc>
                 <a:spcPct val="115000"/>
               </a:lnSpc>
@@ -5934,7 +6092,7 @@
                 <a:sym typeface="Open Sans"/>
               </a:defRPr>
             </a:lvl4pPr>
-            <a:lvl5pPr indent="-317500" lvl="4" marL="2286000">
+            <a:lvl5pPr marL="2286000" lvl="4" indent="-317500">
               <a:lnSpc>
                 <a:spcPct val="115000"/>
               </a:lnSpc>
@@ -5960,7 +6118,7 @@
                 <a:sym typeface="Open Sans"/>
               </a:defRPr>
             </a:lvl5pPr>
-            <a:lvl6pPr indent="-317500" lvl="5" marL="2743200">
+            <a:lvl6pPr marL="2743200" lvl="5" indent="-317500">
               <a:lnSpc>
                 <a:spcPct val="115000"/>
               </a:lnSpc>
@@ -5986,7 +6144,7 @@
                 <a:sym typeface="Open Sans"/>
               </a:defRPr>
             </a:lvl6pPr>
-            <a:lvl7pPr indent="-317500" lvl="6" marL="3200400">
+            <a:lvl7pPr marL="3200400" lvl="6" indent="-317500">
               <a:lnSpc>
                 <a:spcPct val="115000"/>
               </a:lnSpc>
@@ -6012,7 +6170,7 @@
                 <a:sym typeface="Open Sans"/>
               </a:defRPr>
             </a:lvl7pPr>
-            <a:lvl8pPr indent="-317500" lvl="7" marL="3657600">
+            <a:lvl8pPr marL="3657600" lvl="7" indent="-317500">
               <a:lnSpc>
                 <a:spcPct val="115000"/>
               </a:lnSpc>
@@ -6038,7 +6196,7 @@
                 <a:sym typeface="Open Sans"/>
               </a:defRPr>
             </a:lvl8pPr>
-            <a:lvl9pPr indent="-317500" lvl="8" marL="4114800">
+            <a:lvl9pPr marL="4114800" lvl="8" indent="-317500">
               <a:lnSpc>
                 <a:spcPct val="115000"/>
               </a:lnSpc>
@@ -6065,15 +6223,19 @@
               </a:defRPr>
             </a:lvl9pPr>
           </a:lstStyle>
-          <a:p/>
+          <a:p>
+            <a:endParaRPr/>
+          </a:p>
         </p:txBody>
       </p:sp>
       <p:sp>
         <p:nvSpPr>
           <p:cNvPr id="8" name="Google Shape;8;p1"/>
-          <p:cNvSpPr txBox="1"/>
+          <p:cNvSpPr txBox="1">
+            <a:spLocks noGrp="1"/>
+          </p:cNvSpPr>
           <p:nvPr>
-            <p:ph idx="12" type="sldNum"/>
+            <p:ph type="sldNum" idx="12"/>
           </p:nvPr>
         </p:nvSpPr>
         <p:spPr>
@@ -6090,7 +6252,7 @@
           </a:ln>
         </p:spPr>
         <p:txBody>
-          <a:bodyPr anchorCtr="0" anchor="ctr" bIns="91425" lIns="91425" spcFirstLastPara="1" rIns="91425" wrap="square" tIns="91425">
+          <a:bodyPr spcFirstLastPara="1" wrap="square" lIns="91425" tIns="91425" rIns="91425" bIns="91425" anchor="ctr" anchorCtr="0">
             <a:normAutofit/>
           </a:bodyPr>
           <a:lstStyle>
@@ -6204,7 +6366,7 @@
             </a:lvl9pPr>
           </a:lstStyle>
           <a:p>
-            <a:pPr indent="0" lvl="0" marL="0" rtl="0" algn="r">
+            <a:pPr marL="0" lvl="0" indent="0" algn="r" rtl="0">
               <a:spcBef>
                 <a:spcPts val="0"/>
               </a:spcBef>
@@ -6223,7 +6385,7 @@
       </p:sp>
     </p:spTree>
   </p:cSld>
-  <p:clrMap accent1="accent1" accent2="accent2" accent3="accent3" accent4="accent4" accent5="accent5" accent6="accent6" bg1="lt1" bg2="dk2" tx1="dk1" tx2="lt2" folHlink="folHlink" hlink="hlink"/>
+  <p:clrMap bg1="lt1" tx1="dk1" bg2="dk2" tx2="lt2" accent1="accent1" accent2="accent2" accent3="accent3" accent4="accent4" accent5="accent5" accent6="accent6" hlink="hlink" folHlink="folHlink"/>
   <p:sldLayoutIdLst>
     <p:sldLayoutId id="2147483648" r:id="rId1"/>
     <p:sldLayoutId id="2147483649" r:id="rId2"/>
@@ -6237,10 +6399,10 @@
     <p:sldLayoutId id="2147483657" r:id="rId10"/>
     <p:sldLayoutId id="2147483658" r:id="rId11"/>
   </p:sldLayoutIdLst>
-  <p:hf dt="0" ftr="0" hdr="0" sldNum="0"/>
+  <p:hf sldNum="0" hdr="0" ftr="0" dt="0"/>
   <p:txStyles>
     <p:titleStyle>
-      <a:defPPr lvl="0" marR="0" rtl="0" algn="l">
+      <a:defPPr marR="0" lvl="0" algn="l" rtl="0">
         <a:lnSpc>
           <a:spcPct val="100000"/>
         </a:lnSpc>
@@ -6251,7 +6413,7 @@
           <a:spcPts val="0"/>
         </a:spcAft>
       </a:defPPr>
-      <a:lvl1pPr lvl="0" marR="0" rtl="0" algn="l">
+      <a:lvl1pPr marR="0" lvl="0" algn="l" rtl="0">
         <a:lnSpc>
           <a:spcPct val="100000"/>
         </a:lnSpc>
@@ -6265,7 +6427,7 @@
           <a:srgbClr val="000000"/>
         </a:buClr>
         <a:buFont typeface="Arial"/>
-        <a:defRPr b="0" i="0" sz="1400" u="none" cap="none" strike="noStrike">
+        <a:defRPr sz="1400" b="0" i="0" u="none" strike="noStrike" cap="none">
           <a:solidFill>
             <a:srgbClr val="000000"/>
           </a:solidFill>
@@ -6275,7 +6437,7 @@
           <a:sym typeface="Arial"/>
         </a:defRPr>
       </a:lvl1pPr>
-      <a:lvl2pPr lvl="1" marR="0" rtl="0" algn="l">
+      <a:lvl2pPr marR="0" lvl="1" algn="l" rtl="0">
         <a:lnSpc>
           <a:spcPct val="100000"/>
         </a:lnSpc>
@@ -6289,7 +6451,7 @@
           <a:srgbClr val="000000"/>
         </a:buClr>
         <a:buFont typeface="Arial"/>
-        <a:defRPr b="0" i="0" sz="1400" u="none" cap="none" strike="noStrike">
+        <a:defRPr sz="1400" b="0" i="0" u="none" strike="noStrike" cap="none">
           <a:solidFill>
             <a:srgbClr val="000000"/>
           </a:solidFill>
@@ -6299,7 +6461,7 @@
           <a:sym typeface="Arial"/>
         </a:defRPr>
       </a:lvl2pPr>
-      <a:lvl3pPr lvl="2" marR="0" rtl="0" algn="l">
+      <a:lvl3pPr marR="0" lvl="2" algn="l" rtl="0">
         <a:lnSpc>
           <a:spcPct val="100000"/>
         </a:lnSpc>
@@ -6313,7 +6475,7 @@
           <a:srgbClr val="000000"/>
         </a:buClr>
         <a:buFont typeface="Arial"/>
-        <a:defRPr b="0" i="0" sz="1400" u="none" cap="none" strike="noStrike">
+        <a:defRPr sz="1400" b="0" i="0" u="none" strike="noStrike" cap="none">
           <a:solidFill>
             <a:srgbClr val="000000"/>
           </a:solidFill>
@@ -6323,7 +6485,7 @@
           <a:sym typeface="Arial"/>
         </a:defRPr>
       </a:lvl3pPr>
-      <a:lvl4pPr lvl="3" marR="0" rtl="0" algn="l">
+      <a:lvl4pPr marR="0" lvl="3" algn="l" rtl="0">
         <a:lnSpc>
           <a:spcPct val="100000"/>
         </a:lnSpc>
@@ -6337,7 +6499,7 @@
           <a:srgbClr val="000000"/>
         </a:buClr>
         <a:buFont typeface="Arial"/>
-        <a:defRPr b="0" i="0" sz="1400" u="none" cap="none" strike="noStrike">
+        <a:defRPr sz="1400" b="0" i="0" u="none" strike="noStrike" cap="none">
           <a:solidFill>
             <a:srgbClr val="000000"/>
           </a:solidFill>
@@ -6347,7 +6509,7 @@
           <a:sym typeface="Arial"/>
         </a:defRPr>
       </a:lvl4pPr>
-      <a:lvl5pPr lvl="4" marR="0" rtl="0" algn="l">
+      <a:lvl5pPr marR="0" lvl="4" algn="l" rtl="0">
         <a:lnSpc>
           <a:spcPct val="100000"/>
         </a:lnSpc>
@@ -6361,7 +6523,7 @@
           <a:srgbClr val="000000"/>
         </a:buClr>
         <a:buFont typeface="Arial"/>
-        <a:defRPr b="0" i="0" sz="1400" u="none" cap="none" strike="noStrike">
+        <a:defRPr sz="1400" b="0" i="0" u="none" strike="noStrike" cap="none">
           <a:solidFill>
             <a:srgbClr val="000000"/>
           </a:solidFill>
@@ -6371,7 +6533,7 @@
           <a:sym typeface="Arial"/>
         </a:defRPr>
       </a:lvl5pPr>
-      <a:lvl6pPr lvl="5" marR="0" rtl="0" algn="l">
+      <a:lvl6pPr marR="0" lvl="5" algn="l" rtl="0">
         <a:lnSpc>
           <a:spcPct val="100000"/>
         </a:lnSpc>
@@ -6385,7 +6547,7 @@
           <a:srgbClr val="000000"/>
         </a:buClr>
         <a:buFont typeface="Arial"/>
-        <a:defRPr b="0" i="0" sz="1400" u="none" cap="none" strike="noStrike">
+        <a:defRPr sz="1400" b="0" i="0" u="none" strike="noStrike" cap="none">
           <a:solidFill>
             <a:srgbClr val="000000"/>
           </a:solidFill>
@@ -6395,7 +6557,7 @@
           <a:sym typeface="Arial"/>
         </a:defRPr>
       </a:lvl6pPr>
-      <a:lvl7pPr lvl="6" marR="0" rtl="0" algn="l">
+      <a:lvl7pPr marR="0" lvl="6" algn="l" rtl="0">
         <a:lnSpc>
           <a:spcPct val="100000"/>
         </a:lnSpc>
@@ -6409,7 +6571,7 @@
           <a:srgbClr val="000000"/>
         </a:buClr>
         <a:buFont typeface="Arial"/>
-        <a:defRPr b="0" i="0" sz="1400" u="none" cap="none" strike="noStrike">
+        <a:defRPr sz="1400" b="0" i="0" u="none" strike="noStrike" cap="none">
           <a:solidFill>
             <a:srgbClr val="000000"/>
           </a:solidFill>
@@ -6419,7 +6581,7 @@
           <a:sym typeface="Arial"/>
         </a:defRPr>
       </a:lvl7pPr>
-      <a:lvl8pPr lvl="7" marR="0" rtl="0" algn="l">
+      <a:lvl8pPr marR="0" lvl="7" algn="l" rtl="0">
         <a:lnSpc>
           <a:spcPct val="100000"/>
         </a:lnSpc>
@@ -6433,7 +6595,7 @@
           <a:srgbClr val="000000"/>
         </a:buClr>
         <a:buFont typeface="Arial"/>
-        <a:defRPr b="0" i="0" sz="1400" u="none" cap="none" strike="noStrike">
+        <a:defRPr sz="1400" b="0" i="0" u="none" strike="noStrike" cap="none">
           <a:solidFill>
             <a:srgbClr val="000000"/>
           </a:solidFill>
@@ -6443,7 +6605,7 @@
           <a:sym typeface="Arial"/>
         </a:defRPr>
       </a:lvl8pPr>
-      <a:lvl9pPr lvl="8" marR="0" rtl="0" algn="l">
+      <a:lvl9pPr marR="0" lvl="8" algn="l" rtl="0">
         <a:lnSpc>
           <a:spcPct val="100000"/>
         </a:lnSpc>
@@ -6457,7 +6619,7 @@
           <a:srgbClr val="000000"/>
         </a:buClr>
         <a:buFont typeface="Arial"/>
-        <a:defRPr b="0" i="0" sz="1400" u="none" cap="none" strike="noStrike">
+        <a:defRPr sz="1400" b="0" i="0" u="none" strike="noStrike" cap="none">
           <a:solidFill>
             <a:srgbClr val="000000"/>
           </a:solidFill>
@@ -6469,7 +6631,7 @@
       </a:lvl9pPr>
     </p:titleStyle>
     <p:bodyStyle>
-      <a:defPPr lvl="0" marR="0" rtl="0" algn="l">
+      <a:defPPr marR="0" lvl="0" algn="l" rtl="0">
         <a:lnSpc>
           <a:spcPct val="100000"/>
         </a:lnSpc>
@@ -6480,7 +6642,7 @@
           <a:spcPts val="0"/>
         </a:spcAft>
       </a:defPPr>
-      <a:lvl1pPr lvl="0" marR="0" rtl="0" algn="l">
+      <a:lvl1pPr marR="0" lvl="0" algn="l" rtl="0">
         <a:lnSpc>
           <a:spcPct val="100000"/>
         </a:lnSpc>
@@ -6494,7 +6656,7 @@
           <a:srgbClr val="000000"/>
         </a:buClr>
         <a:buFont typeface="Arial"/>
-        <a:defRPr b="0" i="0" sz="1400" u="none" cap="none" strike="noStrike">
+        <a:defRPr sz="1400" b="0" i="0" u="none" strike="noStrike" cap="none">
           <a:solidFill>
             <a:srgbClr val="000000"/>
           </a:solidFill>
@@ -6504,7 +6666,7 @@
           <a:sym typeface="Arial"/>
         </a:defRPr>
       </a:lvl1pPr>
-      <a:lvl2pPr lvl="1" marR="0" rtl="0" algn="l">
+      <a:lvl2pPr marR="0" lvl="1" algn="l" rtl="0">
         <a:lnSpc>
           <a:spcPct val="100000"/>
         </a:lnSpc>
@@ -6518,7 +6680,7 @@
           <a:srgbClr val="000000"/>
         </a:buClr>
         <a:buFont typeface="Arial"/>
-        <a:defRPr b="0" i="0" sz="1400" u="none" cap="none" strike="noStrike">
+        <a:defRPr sz="1400" b="0" i="0" u="none" strike="noStrike" cap="none">
           <a:solidFill>
             <a:srgbClr val="000000"/>
           </a:solidFill>
@@ -6528,7 +6690,7 @@
           <a:sym typeface="Arial"/>
         </a:defRPr>
       </a:lvl2pPr>
-      <a:lvl3pPr lvl="2" marR="0" rtl="0" algn="l">
+      <a:lvl3pPr marR="0" lvl="2" algn="l" rtl="0">
         <a:lnSpc>
           <a:spcPct val="100000"/>
         </a:lnSpc>
@@ -6542,7 +6704,7 @@
           <a:srgbClr val="000000"/>
         </a:buClr>
         <a:buFont typeface="Arial"/>
-        <a:defRPr b="0" i="0" sz="1400" u="none" cap="none" strike="noStrike">
+        <a:defRPr sz="1400" b="0" i="0" u="none" strike="noStrike" cap="none">
           <a:solidFill>
             <a:srgbClr val="000000"/>
           </a:solidFill>
@@ -6552,7 +6714,7 @@
           <a:sym typeface="Arial"/>
         </a:defRPr>
       </a:lvl3pPr>
-      <a:lvl4pPr lvl="3" marR="0" rtl="0" algn="l">
+      <a:lvl4pPr marR="0" lvl="3" algn="l" rtl="0">
         <a:lnSpc>
           <a:spcPct val="100000"/>
         </a:lnSpc>
@@ -6566,7 +6728,7 @@
           <a:srgbClr val="000000"/>
         </a:buClr>
         <a:buFont typeface="Arial"/>
-        <a:defRPr b="0" i="0" sz="1400" u="none" cap="none" strike="noStrike">
+        <a:defRPr sz="1400" b="0" i="0" u="none" strike="noStrike" cap="none">
           <a:solidFill>
             <a:srgbClr val="000000"/>
           </a:solidFill>
@@ -6576,7 +6738,7 @@
           <a:sym typeface="Arial"/>
         </a:defRPr>
       </a:lvl4pPr>
-      <a:lvl5pPr lvl="4" marR="0" rtl="0" algn="l">
+      <a:lvl5pPr marR="0" lvl="4" algn="l" rtl="0">
         <a:lnSpc>
           <a:spcPct val="100000"/>
         </a:lnSpc>
@@ -6590,7 +6752,7 @@
           <a:srgbClr val="000000"/>
         </a:buClr>
         <a:buFont typeface="Arial"/>
-        <a:defRPr b="0" i="0" sz="1400" u="none" cap="none" strike="noStrike">
+        <a:defRPr sz="1400" b="0" i="0" u="none" strike="noStrike" cap="none">
           <a:solidFill>
             <a:srgbClr val="000000"/>
           </a:solidFill>
@@ -6600,7 +6762,7 @@
           <a:sym typeface="Arial"/>
         </a:defRPr>
       </a:lvl5pPr>
-      <a:lvl6pPr lvl="5" marR="0" rtl="0" algn="l">
+      <a:lvl6pPr marR="0" lvl="5" algn="l" rtl="0">
         <a:lnSpc>
           <a:spcPct val="100000"/>
         </a:lnSpc>
@@ -6614,7 +6776,7 @@
           <a:srgbClr val="000000"/>
         </a:buClr>
         <a:buFont typeface="Arial"/>
-        <a:defRPr b="0" i="0" sz="1400" u="none" cap="none" strike="noStrike">
+        <a:defRPr sz="1400" b="0" i="0" u="none" strike="noStrike" cap="none">
           <a:solidFill>
             <a:srgbClr val="000000"/>
           </a:solidFill>
@@ -6624,7 +6786,7 @@
           <a:sym typeface="Arial"/>
         </a:defRPr>
       </a:lvl6pPr>
-      <a:lvl7pPr lvl="6" marR="0" rtl="0" algn="l">
+      <a:lvl7pPr marR="0" lvl="6" algn="l" rtl="0">
         <a:lnSpc>
           <a:spcPct val="100000"/>
         </a:lnSpc>
@@ -6638,7 +6800,7 @@
           <a:srgbClr val="000000"/>
         </a:buClr>
         <a:buFont typeface="Arial"/>
-        <a:defRPr b="0" i="0" sz="1400" u="none" cap="none" strike="noStrike">
+        <a:defRPr sz="1400" b="0" i="0" u="none" strike="noStrike" cap="none">
           <a:solidFill>
             <a:srgbClr val="000000"/>
           </a:solidFill>
@@ -6648,7 +6810,7 @@
           <a:sym typeface="Arial"/>
         </a:defRPr>
       </a:lvl7pPr>
-      <a:lvl8pPr lvl="7" marR="0" rtl="0" algn="l">
+      <a:lvl8pPr marR="0" lvl="7" algn="l" rtl="0">
         <a:lnSpc>
           <a:spcPct val="100000"/>
         </a:lnSpc>
@@ -6662,7 +6824,7 @@
           <a:srgbClr val="000000"/>
         </a:buClr>
         <a:buFont typeface="Arial"/>
-        <a:defRPr b="0" i="0" sz="1400" u="none" cap="none" strike="noStrike">
+        <a:defRPr sz="1400" b="0" i="0" u="none" strike="noStrike" cap="none">
           <a:solidFill>
             <a:srgbClr val="000000"/>
           </a:solidFill>
@@ -6672,7 +6834,7 @@
           <a:sym typeface="Arial"/>
         </a:defRPr>
       </a:lvl8pPr>
-      <a:lvl9pPr lvl="8" marR="0" rtl="0" algn="l">
+      <a:lvl9pPr marR="0" lvl="8" algn="l" rtl="0">
         <a:lnSpc>
           <a:spcPct val="100000"/>
         </a:lnSpc>
@@ -6686,7 +6848,7 @@
           <a:srgbClr val="000000"/>
         </a:buClr>
         <a:buFont typeface="Arial"/>
-        <a:defRPr b="0" i="0" sz="1400" u="none" cap="none" strike="noStrike">
+        <a:defRPr sz="1400" b="0" i="0" u="none" strike="noStrike" cap="none">
           <a:solidFill>
             <a:srgbClr val="000000"/>
           </a:solidFill>
@@ -6698,7 +6860,7 @@
       </a:lvl9pPr>
     </p:bodyStyle>
     <p:otherStyle>
-      <a:defPPr lvl="0" marR="0" rtl="0" algn="l">
+      <a:defPPr marR="0" lvl="0" algn="l" rtl="0">
         <a:lnSpc>
           <a:spcPct val="100000"/>
         </a:lnSpc>
@@ -6709,7 +6871,7 @@
           <a:spcPts val="0"/>
         </a:spcAft>
       </a:defPPr>
-      <a:lvl1pPr lvl="0" marR="0" rtl="0" algn="l">
+      <a:lvl1pPr marR="0" lvl="0" algn="l" rtl="0">
         <a:lnSpc>
           <a:spcPct val="100000"/>
         </a:lnSpc>
@@ -6723,7 +6885,7 @@
           <a:srgbClr val="000000"/>
         </a:buClr>
         <a:buFont typeface="Arial"/>
-        <a:defRPr b="0" i="0" sz="1400" u="none" cap="none" strike="noStrike">
+        <a:defRPr sz="1400" b="0" i="0" u="none" strike="noStrike" cap="none">
           <a:solidFill>
             <a:srgbClr val="000000"/>
           </a:solidFill>
@@ -6733,7 +6895,7 @@
           <a:sym typeface="Arial"/>
         </a:defRPr>
       </a:lvl1pPr>
-      <a:lvl2pPr lvl="1" marR="0" rtl="0" algn="l">
+      <a:lvl2pPr marR="0" lvl="1" algn="l" rtl="0">
         <a:lnSpc>
           <a:spcPct val="100000"/>
         </a:lnSpc>
@@ -6747,7 +6909,7 @@
           <a:srgbClr val="000000"/>
         </a:buClr>
         <a:buFont typeface="Arial"/>
-        <a:defRPr b="0" i="0" sz="1400" u="none" cap="none" strike="noStrike">
+        <a:defRPr sz="1400" b="0" i="0" u="none" strike="noStrike" cap="none">
           <a:solidFill>
             <a:srgbClr val="000000"/>
           </a:solidFill>
@@ -6757,7 +6919,7 @@
           <a:sym typeface="Arial"/>
         </a:defRPr>
       </a:lvl2pPr>
-      <a:lvl3pPr lvl="2" marR="0" rtl="0" algn="l">
+      <a:lvl3pPr marR="0" lvl="2" algn="l" rtl="0">
         <a:lnSpc>
           <a:spcPct val="100000"/>
         </a:lnSpc>
@@ -6771,7 +6933,7 @@
           <a:srgbClr val="000000"/>
         </a:buClr>
         <a:buFont typeface="Arial"/>
-        <a:defRPr b="0" i="0" sz="1400" u="none" cap="none" strike="noStrike">
+        <a:defRPr sz="1400" b="0" i="0" u="none" strike="noStrike" cap="none">
           <a:solidFill>
             <a:srgbClr val="000000"/>
           </a:solidFill>
@@ -6781,7 +6943,7 @@
           <a:sym typeface="Arial"/>
         </a:defRPr>
       </a:lvl3pPr>
-      <a:lvl4pPr lvl="3" marR="0" rtl="0" algn="l">
+      <a:lvl4pPr marR="0" lvl="3" algn="l" rtl="0">
         <a:lnSpc>
           <a:spcPct val="100000"/>
         </a:lnSpc>
@@ -6795,7 +6957,7 @@
           <a:srgbClr val="000000"/>
         </a:buClr>
         <a:buFont typeface="Arial"/>
-        <a:defRPr b="0" i="0" sz="1400" u="none" cap="none" strike="noStrike">
+        <a:defRPr sz="1400" b="0" i="0" u="none" strike="noStrike" cap="none">
           <a:solidFill>
             <a:srgbClr val="000000"/>
           </a:solidFill>
@@ -6805,7 +6967,7 @@
           <a:sym typeface="Arial"/>
         </a:defRPr>
       </a:lvl4pPr>
-      <a:lvl5pPr lvl="4" marR="0" rtl="0" algn="l">
+      <a:lvl5pPr marR="0" lvl="4" algn="l" rtl="0">
         <a:lnSpc>
           <a:spcPct val="100000"/>
         </a:lnSpc>
@@ -6819,7 +6981,7 @@
           <a:srgbClr val="000000"/>
         </a:buClr>
         <a:buFont typeface="Arial"/>
-        <a:defRPr b="0" i="0" sz="1400" u="none" cap="none" strike="noStrike">
+        <a:defRPr sz="1400" b="0" i="0" u="none" strike="noStrike" cap="none">
           <a:solidFill>
             <a:srgbClr val="000000"/>
           </a:solidFill>
@@ -6829,7 +6991,7 @@
           <a:sym typeface="Arial"/>
         </a:defRPr>
       </a:lvl5pPr>
-      <a:lvl6pPr lvl="5" marR="0" rtl="0" algn="l">
+      <a:lvl6pPr marR="0" lvl="5" algn="l" rtl="0">
         <a:lnSpc>
           <a:spcPct val="100000"/>
         </a:lnSpc>
@@ -6843,7 +7005,7 @@
           <a:srgbClr val="000000"/>
         </a:buClr>
         <a:buFont typeface="Arial"/>
-        <a:defRPr b="0" i="0" sz="1400" u="none" cap="none" strike="noStrike">
+        <a:defRPr sz="1400" b="0" i="0" u="none" strike="noStrike" cap="none">
           <a:solidFill>
             <a:srgbClr val="000000"/>
           </a:solidFill>
@@ -6853,7 +7015,7 @@
           <a:sym typeface="Arial"/>
         </a:defRPr>
       </a:lvl6pPr>
-      <a:lvl7pPr lvl="6" marR="0" rtl="0" algn="l">
+      <a:lvl7pPr marR="0" lvl="6" algn="l" rtl="0">
         <a:lnSpc>
           <a:spcPct val="100000"/>
         </a:lnSpc>
@@ -6867,7 +7029,7 @@
           <a:srgbClr val="000000"/>
         </a:buClr>
         <a:buFont typeface="Arial"/>
-        <a:defRPr b="0" i="0" sz="1400" u="none" cap="none" strike="noStrike">
+        <a:defRPr sz="1400" b="0" i="0" u="none" strike="noStrike" cap="none">
           <a:solidFill>
             <a:srgbClr val="000000"/>
           </a:solidFill>
@@ -6877,7 +7039,7 @@
           <a:sym typeface="Arial"/>
         </a:defRPr>
       </a:lvl7pPr>
-      <a:lvl8pPr lvl="7" marR="0" rtl="0" algn="l">
+      <a:lvl8pPr marR="0" lvl="7" algn="l" rtl="0">
         <a:lnSpc>
           <a:spcPct val="100000"/>
         </a:lnSpc>
@@ -6891,7 +7053,7 @@
           <a:srgbClr val="000000"/>
         </a:buClr>
         <a:buFont typeface="Arial"/>
-        <a:defRPr b="0" i="0" sz="1400" u="none" cap="none" strike="noStrike">
+        <a:defRPr sz="1400" b="0" i="0" u="none" strike="noStrike" cap="none">
           <a:solidFill>
             <a:srgbClr val="000000"/>
           </a:solidFill>
@@ -6901,7 +7063,7 @@
           <a:sym typeface="Arial"/>
         </a:defRPr>
       </a:lvl8pPr>
-      <a:lvl9pPr lvl="8" marR="0" rtl="0" algn="l">
+      <a:lvl9pPr marR="0" lvl="8" algn="l" rtl="0">
         <a:lnSpc>
           <a:spcPct val="100000"/>
         </a:lnSpc>
@@ -6915,7 +7077,7 @@
           <a:srgbClr val="000000"/>
         </a:buClr>
         <a:buFont typeface="Arial"/>
-        <a:defRPr b="0" i="0" sz="1400" u="none" cap="none" strike="noStrike">
+        <a:defRPr sz="1400" b="0" i="0" u="none" strike="noStrike" cap="none">
           <a:solidFill>
             <a:srgbClr val="000000"/>
           </a:solidFill>
@@ -6931,11 +7093,11 @@
 </file>
 
 <file path=ppt/slides/slide1.xml><?xml version="1.0" encoding="utf-8"?>
-<p:sld xmlns:a="http://schemas.openxmlformats.org/drawingml/2006/main" xmlns:r="http://schemas.openxmlformats.org/officeDocument/2006/relationships" xmlns:mc="http://schemas.openxmlformats.org/markup-compatibility/2006" xmlns:mv="urn:schemas-microsoft-com:mac:vml" xmlns:p="http://schemas.openxmlformats.org/presentationml/2006/main" xmlns:c="http://schemas.openxmlformats.org/drawingml/2006/chart" xmlns:dgm="http://schemas.openxmlformats.org/drawingml/2006/diagram" xmlns:o="urn:schemas-microsoft-com:office:office" xmlns:v="urn:schemas-microsoft-com:vml" xmlns:pvml="urn:schemas-microsoft-com:office:powerpoint" xmlns:com="http://schemas.openxmlformats.org/drawingml/2006/compatibility" xmlns:p14="http://schemas.microsoft.com/office/powerpoint/2010/main" xmlns:p15="http://schemas.microsoft.com/office/powerpoint/2012/main" xmlns:ahyp="http://schemas.microsoft.com/office/drawing/2018/hyperlinkcolor">
+<p:sld xmlns:a="http://schemas.openxmlformats.org/drawingml/2006/main" xmlns:r="http://schemas.openxmlformats.org/officeDocument/2006/relationships" xmlns:p="http://schemas.openxmlformats.org/presentationml/2006/main">
   <p:cSld>
     <p:spTree>
       <p:nvGrpSpPr>
-        <p:cNvPr id="61" name="Shape 61"/>
+        <p:cNvPr id="1" name="Shape 61"/>
         <p:cNvGrpSpPr/>
         <p:nvPr/>
       </p:nvGrpSpPr>
@@ -6950,7 +7112,9 @@
       <p:sp>
         <p:nvSpPr>
           <p:cNvPr id="62" name="Google Shape;62;p13"/>
-          <p:cNvSpPr txBox="1"/>
+          <p:cNvSpPr txBox="1">
+            <a:spLocks noGrp="1"/>
+          </p:cNvSpPr>
           <p:nvPr>
             <p:ph type="ctrTitle"/>
           </p:nvPr>
@@ -6965,12 +7129,12 @@
           </a:prstGeom>
         </p:spPr>
         <p:txBody>
-          <a:bodyPr anchorCtr="0" anchor="b" bIns="91425" lIns="91425" spcFirstLastPara="1" rIns="91425" wrap="square" tIns="91425">
+          <a:bodyPr spcFirstLastPara="1" wrap="square" lIns="91425" tIns="91425" rIns="91425" bIns="91425" anchor="b" anchorCtr="0">
             <a:normAutofit/>
           </a:bodyPr>
           <a:lstStyle/>
           <a:p>
-            <a:pPr indent="0" lvl="0" marL="0" rtl="0" algn="ctr">
+            <a:pPr marL="0" lvl="0" indent="0" algn="ctr" rtl="0">
               <a:spcBef>
                 <a:spcPts val="0"/>
               </a:spcBef>
@@ -7000,9 +7164,11 @@
       <p:sp>
         <p:nvSpPr>
           <p:cNvPr id="63" name="Google Shape;63;p13"/>
-          <p:cNvSpPr txBox="1"/>
+          <p:cNvSpPr txBox="1">
+            <a:spLocks noGrp="1"/>
+          </p:cNvSpPr>
           <p:nvPr>
-            <p:ph idx="1" type="subTitle"/>
+            <p:ph type="subTitle" idx="1"/>
           </p:nvPr>
         </p:nvSpPr>
         <p:spPr>
@@ -7015,12 +7181,12 @@
           </a:prstGeom>
         </p:spPr>
         <p:txBody>
-          <a:bodyPr anchorCtr="0" anchor="t" bIns="91425" lIns="91425" spcFirstLastPara="1" rIns="91425" wrap="square" tIns="91425">
+          <a:bodyPr spcFirstLastPara="1" wrap="square" lIns="91425" tIns="91425" rIns="91425" bIns="91425" anchor="t" anchorCtr="0">
             <a:normAutofit/>
           </a:bodyPr>
           <a:lstStyle/>
           <a:p>
-            <a:pPr indent="0" lvl="0" marL="0" rtl="0" algn="ctr">
+            <a:pPr marL="0" lvl="0" indent="0" algn="ctr" rtl="0">
               <a:spcBef>
                 <a:spcPts val="0"/>
               </a:spcBef>
@@ -7056,11 +7222,11 @@
 </file>
 
 <file path=ppt/slides/slide2.xml><?xml version="1.0" encoding="utf-8"?>
-<p:sld xmlns:a="http://schemas.openxmlformats.org/drawingml/2006/main" xmlns:r="http://schemas.openxmlformats.org/officeDocument/2006/relationships" xmlns:mc="http://schemas.openxmlformats.org/markup-compatibility/2006" xmlns:mv="urn:schemas-microsoft-com:mac:vml" xmlns:p="http://schemas.openxmlformats.org/presentationml/2006/main" xmlns:c="http://schemas.openxmlformats.org/drawingml/2006/chart" xmlns:dgm="http://schemas.openxmlformats.org/drawingml/2006/diagram" xmlns:o="urn:schemas-microsoft-com:office:office" xmlns:v="urn:schemas-microsoft-com:vml" xmlns:pvml="urn:schemas-microsoft-com:office:powerpoint" xmlns:com="http://schemas.openxmlformats.org/drawingml/2006/compatibility" xmlns:p14="http://schemas.microsoft.com/office/powerpoint/2010/main" xmlns:p15="http://schemas.microsoft.com/office/powerpoint/2012/main" xmlns:ahyp="http://schemas.microsoft.com/office/drawing/2018/hyperlinkcolor">
+<p:sld xmlns:a="http://schemas.openxmlformats.org/drawingml/2006/main" xmlns:r="http://schemas.openxmlformats.org/officeDocument/2006/relationships" xmlns:p="http://schemas.openxmlformats.org/presentationml/2006/main">
   <p:cSld>
     <p:spTree>
       <p:nvGrpSpPr>
-        <p:cNvPr id="67" name="Shape 67"/>
+        <p:cNvPr id="1" name="Shape 67"/>
         <p:cNvGrpSpPr/>
         <p:nvPr/>
       </p:nvGrpSpPr>
@@ -7075,7 +7241,9 @@
       <p:sp>
         <p:nvSpPr>
           <p:cNvPr id="68" name="Google Shape;68;p14"/>
-          <p:cNvSpPr txBox="1"/>
+          <p:cNvSpPr txBox="1">
+            <a:spLocks noGrp="1"/>
+          </p:cNvSpPr>
           <p:nvPr>
             <p:ph type="title"/>
           </p:nvPr>
@@ -7090,12 +7258,12 @@
           </a:prstGeom>
         </p:spPr>
         <p:txBody>
-          <a:bodyPr anchorCtr="0" anchor="b" bIns="91425" lIns="91425" spcFirstLastPara="1" rIns="91425" wrap="square" tIns="91425">
+          <a:bodyPr spcFirstLastPara="1" wrap="square" lIns="91425" tIns="91425" rIns="91425" bIns="91425" anchor="b" anchorCtr="0">
             <a:normAutofit/>
           </a:bodyPr>
           <a:lstStyle/>
           <a:p>
-            <a:pPr indent="0" lvl="0" marL="0" rtl="0" algn="l">
+            <a:pPr marL="0" lvl="0" indent="0" algn="l" rtl="0">
               <a:spcBef>
                 <a:spcPts val="0"/>
               </a:spcBef>
@@ -7125,9 +7293,11 @@
       <p:sp>
         <p:nvSpPr>
           <p:cNvPr id="69" name="Google Shape;69;p14"/>
-          <p:cNvSpPr txBox="1"/>
+          <p:cNvSpPr txBox="1">
+            <a:spLocks noGrp="1"/>
+          </p:cNvSpPr>
           <p:nvPr>
-            <p:ph idx="1" type="body"/>
+            <p:ph type="body" idx="1"/>
           </p:nvPr>
         </p:nvSpPr>
         <p:spPr>
@@ -7140,12 +7310,12 @@
           </a:prstGeom>
         </p:spPr>
         <p:txBody>
-          <a:bodyPr anchorCtr="0" anchor="t" bIns="91425" lIns="91425" spcFirstLastPara="1" rIns="91425" wrap="square" tIns="91425">
+          <a:bodyPr spcFirstLastPara="1" wrap="square" lIns="91425" tIns="91425" rIns="91425" bIns="91425" anchor="t" anchorCtr="0">
             <a:normAutofit fontScale="25000" lnSpcReduction="20000"/>
           </a:bodyPr>
           <a:lstStyle/>
           <a:p>
-            <a:pPr indent="0" lvl="0" marL="0" rtl="0" algn="l">
+            <a:pPr marL="0" lvl="0" indent="0" algn="l" rtl="0">
               <a:spcBef>
                 <a:spcPts val="0"/>
               </a:spcBef>
@@ -7183,7 +7353,7 @@
             </a:endParaRPr>
           </a:p>
           <a:p>
-            <a:pPr indent="0" lvl="0" marL="0" rtl="0" algn="l">
+            <a:pPr marL="0" lvl="0" indent="0" algn="l" rtl="0">
               <a:spcBef>
                 <a:spcPts val="0"/>
               </a:spcBef>
@@ -7221,7 +7391,7 @@
             </a:endParaRPr>
           </a:p>
           <a:p>
-            <a:pPr indent="0" lvl="0" marL="0" rtl="0" algn="l">
+            <a:pPr marL="0" lvl="0" indent="0" algn="l" rtl="0">
               <a:spcBef>
                 <a:spcPts val="0"/>
               </a:spcBef>
@@ -7259,7 +7429,7 @@
             </a:endParaRPr>
           </a:p>
           <a:p>
-            <a:pPr indent="0" lvl="0" marL="0" rtl="0" algn="l">
+            <a:pPr marL="0" lvl="0" indent="0" algn="l" rtl="0">
               <a:spcBef>
                 <a:spcPts val="0"/>
               </a:spcBef>
@@ -7297,7 +7467,7 @@
             </a:endParaRPr>
           </a:p>
           <a:p>
-            <a:pPr indent="0" lvl="0" marL="0" rtl="0" algn="l">
+            <a:pPr marL="0" lvl="0" indent="0" algn="l" rtl="0">
               <a:spcBef>
                 <a:spcPts val="0"/>
               </a:spcBef>
@@ -7335,7 +7505,7 @@
             </a:endParaRPr>
           </a:p>
           <a:p>
-            <a:pPr indent="0" lvl="0" marL="0" rtl="0" algn="l">
+            <a:pPr marL="0" lvl="0" indent="0" algn="l" rtl="0">
               <a:spcBef>
                 <a:spcPts val="0"/>
               </a:spcBef>
@@ -7373,7 +7543,7 @@
             </a:endParaRPr>
           </a:p>
           <a:p>
-            <a:pPr indent="0" lvl="0" marL="0" rtl="0" algn="l">
+            <a:pPr marL="0" lvl="0" indent="0" algn="l" rtl="0">
               <a:spcBef>
                 <a:spcPts val="0"/>
               </a:spcBef>
@@ -7411,7 +7581,7 @@
             </a:endParaRPr>
           </a:p>
           <a:p>
-            <a:pPr indent="0" lvl="0" marL="0" rtl="0" algn="l">
+            <a:pPr marL="0" lvl="0" indent="0" algn="l" rtl="0">
               <a:spcBef>
                 <a:spcPts val="0"/>
               </a:spcBef>
@@ -7449,7 +7619,7 @@
             </a:endParaRPr>
           </a:p>
           <a:p>
-            <a:pPr indent="0" lvl="0" marL="0" rtl="0" algn="l">
+            <a:pPr marL="0" lvl="0" indent="0" algn="l" rtl="0">
               <a:spcBef>
                 <a:spcPts val="0"/>
               </a:spcBef>
@@ -7458,9 +7628,6 @@
               </a:spcAft>
               <a:buNone/>
             </a:pPr>
-            <a:r>
-              <a:t/>
-            </a:r>
             <a:endParaRPr sz="2750">
               <a:solidFill>
                 <a:srgbClr val="000000"/>
@@ -7485,11 +7652,11 @@
 </file>
 
 <file path=ppt/slides/slide3.xml><?xml version="1.0" encoding="utf-8"?>
-<p:sld xmlns:a="http://schemas.openxmlformats.org/drawingml/2006/main" xmlns:r="http://schemas.openxmlformats.org/officeDocument/2006/relationships" xmlns:mc="http://schemas.openxmlformats.org/markup-compatibility/2006" xmlns:mv="urn:schemas-microsoft-com:mac:vml" xmlns:p="http://schemas.openxmlformats.org/presentationml/2006/main" xmlns:c="http://schemas.openxmlformats.org/drawingml/2006/chart" xmlns:dgm="http://schemas.openxmlformats.org/drawingml/2006/diagram" xmlns:o="urn:schemas-microsoft-com:office:office" xmlns:v="urn:schemas-microsoft-com:vml" xmlns:pvml="urn:schemas-microsoft-com:office:powerpoint" xmlns:com="http://schemas.openxmlformats.org/drawingml/2006/compatibility" xmlns:p14="http://schemas.microsoft.com/office/powerpoint/2010/main" xmlns:p15="http://schemas.microsoft.com/office/powerpoint/2012/main" xmlns:ahyp="http://schemas.microsoft.com/office/drawing/2018/hyperlinkcolor">
+<p:sld xmlns:a="http://schemas.openxmlformats.org/drawingml/2006/main" xmlns:r="http://schemas.openxmlformats.org/officeDocument/2006/relationships" xmlns:p="http://schemas.openxmlformats.org/presentationml/2006/main">
   <p:cSld>
     <p:spTree>
       <p:nvGrpSpPr>
-        <p:cNvPr id="73" name="Shape 73"/>
+        <p:cNvPr id="1" name="Shape 73"/>
         <p:cNvGrpSpPr/>
         <p:nvPr/>
       </p:nvGrpSpPr>
@@ -7504,7 +7671,9 @@
       <p:sp>
         <p:nvSpPr>
           <p:cNvPr id="74" name="Google Shape;74;p15"/>
-          <p:cNvSpPr txBox="1"/>
+          <p:cNvSpPr txBox="1">
+            <a:spLocks noGrp="1"/>
+          </p:cNvSpPr>
           <p:nvPr>
             <p:ph type="title"/>
           </p:nvPr>
@@ -7519,12 +7688,12 @@
           </a:prstGeom>
         </p:spPr>
         <p:txBody>
-          <a:bodyPr anchorCtr="0" anchor="b" bIns="91425" lIns="91425" spcFirstLastPara="1" rIns="91425" wrap="square" tIns="91425">
+          <a:bodyPr spcFirstLastPara="1" wrap="square" lIns="91425" tIns="91425" rIns="91425" bIns="91425" anchor="b" anchorCtr="0">
             <a:normAutofit/>
           </a:bodyPr>
           <a:lstStyle/>
           <a:p>
-            <a:pPr indent="0" lvl="0" marL="0" rtl="0" algn="l">
+            <a:pPr marL="0" lvl="0" indent="0" algn="l" rtl="0">
               <a:spcBef>
                 <a:spcPts val="0"/>
               </a:spcBef>
@@ -7554,9 +7723,11 @@
       <p:sp>
         <p:nvSpPr>
           <p:cNvPr id="75" name="Google Shape;75;p15"/>
-          <p:cNvSpPr txBox="1"/>
+          <p:cNvSpPr txBox="1">
+            <a:spLocks noGrp="1"/>
+          </p:cNvSpPr>
           <p:nvPr>
-            <p:ph idx="1" type="body"/>
+            <p:ph type="body" idx="1"/>
           </p:nvPr>
         </p:nvSpPr>
         <p:spPr>
@@ -7569,12 +7740,12 @@
           </a:prstGeom>
         </p:spPr>
         <p:txBody>
-          <a:bodyPr anchorCtr="0" anchor="t" bIns="91425" lIns="91425" spcFirstLastPara="1" rIns="91425" wrap="square" tIns="91425">
+          <a:bodyPr spcFirstLastPara="1" wrap="square" lIns="91425" tIns="91425" rIns="91425" bIns="91425" anchor="t" anchorCtr="0">
             <a:normAutofit/>
           </a:bodyPr>
           <a:lstStyle/>
           <a:p>
-            <a:pPr indent="-355600" lvl="0" marL="457200" rtl="0" algn="l">
+            <a:pPr marL="457200" lvl="0" indent="-355600" algn="l" rtl="0">
               <a:spcBef>
                 <a:spcPts val="0"/>
               </a:spcBef>
@@ -7602,7 +7773,7 @@
             </a:endParaRPr>
           </a:p>
           <a:p>
-            <a:pPr indent="-355600" lvl="0" marL="457200" rtl="0" algn="l">
+            <a:pPr marL="457200" lvl="0" indent="-355600" algn="l" rtl="0">
               <a:spcBef>
                 <a:spcPts val="0"/>
               </a:spcBef>
@@ -7630,7 +7801,7 @@
             </a:endParaRPr>
           </a:p>
           <a:p>
-            <a:pPr indent="-355600" lvl="0" marL="457200" rtl="0" algn="l">
+            <a:pPr marL="457200" lvl="0" indent="-355600" algn="l" rtl="0">
               <a:spcBef>
                 <a:spcPts val="0"/>
               </a:spcBef>
@@ -7696,11 +7867,11 @@
 </file>
 
 <file path=ppt/slides/slide4.xml><?xml version="1.0" encoding="utf-8"?>
-<p:sld xmlns:a="http://schemas.openxmlformats.org/drawingml/2006/main" xmlns:r="http://schemas.openxmlformats.org/officeDocument/2006/relationships" xmlns:mc="http://schemas.openxmlformats.org/markup-compatibility/2006" xmlns:mv="urn:schemas-microsoft-com:mac:vml" xmlns:p="http://schemas.openxmlformats.org/presentationml/2006/main" xmlns:c="http://schemas.openxmlformats.org/drawingml/2006/chart" xmlns:dgm="http://schemas.openxmlformats.org/drawingml/2006/diagram" xmlns:o="urn:schemas-microsoft-com:office:office" xmlns:v="urn:schemas-microsoft-com:vml" xmlns:pvml="urn:schemas-microsoft-com:office:powerpoint" xmlns:com="http://schemas.openxmlformats.org/drawingml/2006/compatibility" xmlns:p14="http://schemas.microsoft.com/office/powerpoint/2010/main" xmlns:p15="http://schemas.microsoft.com/office/powerpoint/2012/main" xmlns:ahyp="http://schemas.microsoft.com/office/drawing/2018/hyperlinkcolor">
+<p:sld xmlns:a="http://schemas.openxmlformats.org/drawingml/2006/main" xmlns:r="http://schemas.openxmlformats.org/officeDocument/2006/relationships" xmlns:p="http://schemas.openxmlformats.org/presentationml/2006/main">
   <p:cSld>
     <p:spTree>
       <p:nvGrpSpPr>
-        <p:cNvPr id="80" name="Shape 80"/>
+        <p:cNvPr id="1" name="Shape 80"/>
         <p:cNvGrpSpPr/>
         <p:nvPr/>
       </p:nvGrpSpPr>
@@ -7715,7 +7886,9 @@
       <p:sp>
         <p:nvSpPr>
           <p:cNvPr id="81" name="Google Shape;81;p16"/>
-          <p:cNvSpPr txBox="1"/>
+          <p:cNvSpPr txBox="1">
+            <a:spLocks noGrp="1"/>
+          </p:cNvSpPr>
           <p:nvPr>
             <p:ph type="title"/>
           </p:nvPr>
@@ -7730,12 +7903,12 @@
           </a:prstGeom>
         </p:spPr>
         <p:txBody>
-          <a:bodyPr anchorCtr="0" anchor="b" bIns="91425" lIns="91425" spcFirstLastPara="1" rIns="91425" wrap="square" tIns="91425">
+          <a:bodyPr spcFirstLastPara="1" wrap="square" lIns="91425" tIns="91425" rIns="91425" bIns="91425" anchor="b" anchorCtr="0">
             <a:normAutofit/>
           </a:bodyPr>
           <a:lstStyle/>
           <a:p>
-            <a:pPr indent="0" lvl="0" marL="0" rtl="0" algn="l">
+            <a:pPr marL="0" lvl="0" indent="0" algn="l" rtl="0">
               <a:spcBef>
                 <a:spcPts val="0"/>
               </a:spcBef>
@@ -7765,9 +7938,11 @@
       <p:sp>
         <p:nvSpPr>
           <p:cNvPr id="82" name="Google Shape;82;p16"/>
-          <p:cNvSpPr txBox="1"/>
+          <p:cNvSpPr txBox="1">
+            <a:spLocks noGrp="1"/>
+          </p:cNvSpPr>
           <p:nvPr>
-            <p:ph idx="1" type="body"/>
+            <p:ph type="body" idx="1"/>
           </p:nvPr>
         </p:nvSpPr>
         <p:spPr>
@@ -7780,12 +7955,12 @@
           </a:prstGeom>
         </p:spPr>
         <p:txBody>
-          <a:bodyPr anchorCtr="0" anchor="t" bIns="91425" lIns="91425" spcFirstLastPara="1" rIns="91425" wrap="square" tIns="91425">
+          <a:bodyPr spcFirstLastPara="1" wrap="square" lIns="91425" tIns="91425" rIns="91425" bIns="91425" anchor="t" anchorCtr="0">
             <a:normAutofit/>
           </a:bodyPr>
           <a:lstStyle/>
           <a:p>
-            <a:pPr indent="-355600" lvl="0" marL="457200" rtl="0" algn="l">
+            <a:pPr marL="457200" lvl="0" indent="-355600" algn="l" rtl="0">
               <a:spcBef>
                 <a:spcPts val="0"/>
               </a:spcBef>
@@ -7813,7 +7988,7 @@
             </a:endParaRPr>
           </a:p>
           <a:p>
-            <a:pPr indent="-355600" lvl="0" marL="457200" rtl="0" algn="l">
+            <a:pPr marL="457200" lvl="0" indent="-355600" algn="l" rtl="0">
               <a:spcBef>
                 <a:spcPts val="0"/>
               </a:spcBef>
@@ -7841,7 +8016,7 @@
             </a:endParaRPr>
           </a:p>
           <a:p>
-            <a:pPr indent="-355600" lvl="0" marL="457200" rtl="0" algn="l">
+            <a:pPr marL="457200" lvl="0" indent="-355600" algn="l" rtl="0">
               <a:spcBef>
                 <a:spcPts val="0"/>
               </a:spcBef>
@@ -7869,7 +8044,7 @@
             </a:endParaRPr>
           </a:p>
           <a:p>
-            <a:pPr indent="-355600" lvl="0" marL="457200" rtl="0" algn="l">
+            <a:pPr marL="457200" lvl="0" indent="-355600" algn="l" rtl="0">
               <a:spcBef>
                 <a:spcPts val="0"/>
               </a:spcBef>
@@ -7935,11 +8110,11 @@
 </file>
 
 <file path=ppt/slides/slide5.xml><?xml version="1.0" encoding="utf-8"?>
-<p:sld xmlns:a="http://schemas.openxmlformats.org/drawingml/2006/main" xmlns:r="http://schemas.openxmlformats.org/officeDocument/2006/relationships" xmlns:mc="http://schemas.openxmlformats.org/markup-compatibility/2006" xmlns:mv="urn:schemas-microsoft-com:mac:vml" xmlns:p="http://schemas.openxmlformats.org/presentationml/2006/main" xmlns:c="http://schemas.openxmlformats.org/drawingml/2006/chart" xmlns:dgm="http://schemas.openxmlformats.org/drawingml/2006/diagram" xmlns:o="urn:schemas-microsoft-com:office:office" xmlns:v="urn:schemas-microsoft-com:vml" xmlns:pvml="urn:schemas-microsoft-com:office:powerpoint" xmlns:com="http://schemas.openxmlformats.org/drawingml/2006/compatibility" xmlns:p14="http://schemas.microsoft.com/office/powerpoint/2010/main" xmlns:p15="http://schemas.microsoft.com/office/powerpoint/2012/main" xmlns:ahyp="http://schemas.microsoft.com/office/drawing/2018/hyperlinkcolor">
+<p:sld xmlns:a="http://schemas.openxmlformats.org/drawingml/2006/main" xmlns:r="http://schemas.openxmlformats.org/officeDocument/2006/relationships" xmlns:p="http://schemas.openxmlformats.org/presentationml/2006/main">
   <p:cSld>
     <p:spTree>
       <p:nvGrpSpPr>
-        <p:cNvPr id="87" name="Shape 87"/>
+        <p:cNvPr id="1" name="Shape 87"/>
         <p:cNvGrpSpPr/>
         <p:nvPr/>
       </p:nvGrpSpPr>
@@ -7954,7 +8129,9 @@
       <p:sp>
         <p:nvSpPr>
           <p:cNvPr id="88" name="Google Shape;88;p17"/>
-          <p:cNvSpPr txBox="1"/>
+          <p:cNvSpPr txBox="1">
+            <a:spLocks noGrp="1"/>
+          </p:cNvSpPr>
           <p:nvPr>
             <p:ph type="title"/>
           </p:nvPr>
@@ -7969,12 +8146,12 @@
           </a:prstGeom>
         </p:spPr>
         <p:txBody>
-          <a:bodyPr anchorCtr="0" anchor="b" bIns="91425" lIns="91425" spcFirstLastPara="1" rIns="91425" wrap="square" tIns="91425">
+          <a:bodyPr spcFirstLastPara="1" wrap="square" lIns="91425" tIns="91425" rIns="91425" bIns="91425" anchor="b" anchorCtr="0">
             <a:normAutofit/>
           </a:bodyPr>
           <a:lstStyle/>
           <a:p>
-            <a:pPr indent="0" lvl="0" marL="0" rtl="0" algn="l">
+            <a:pPr marL="0" lvl="0" indent="0" algn="l" rtl="0">
               <a:spcBef>
                 <a:spcPts val="0"/>
               </a:spcBef>
@@ -8004,9 +8181,11 @@
       <p:sp>
         <p:nvSpPr>
           <p:cNvPr id="89" name="Google Shape;89;p17"/>
-          <p:cNvSpPr txBox="1"/>
+          <p:cNvSpPr txBox="1">
+            <a:spLocks noGrp="1"/>
+          </p:cNvSpPr>
           <p:nvPr>
-            <p:ph idx="1" type="body"/>
+            <p:ph type="body" idx="1"/>
           </p:nvPr>
         </p:nvSpPr>
         <p:spPr>
@@ -8019,12 +8198,12 @@
           </a:prstGeom>
         </p:spPr>
         <p:txBody>
-          <a:bodyPr anchorCtr="0" anchor="t" bIns="91425" lIns="91425" spcFirstLastPara="1" rIns="91425" wrap="square" tIns="91425">
+          <a:bodyPr spcFirstLastPara="1" wrap="square" lIns="91425" tIns="91425" rIns="91425" bIns="91425" anchor="t" anchorCtr="0">
             <a:normAutofit/>
           </a:bodyPr>
           <a:lstStyle/>
           <a:p>
-            <a:pPr indent="-355600" lvl="0" marL="457200" rtl="0" algn="l">
+            <a:pPr marL="457200" lvl="0" indent="-355600" algn="l" rtl="0">
               <a:spcBef>
                 <a:spcPts val="0"/>
               </a:spcBef>
@@ -8052,7 +8231,7 @@
             </a:endParaRPr>
           </a:p>
           <a:p>
-            <a:pPr indent="-355600" lvl="0" marL="457200" rtl="0" algn="l">
+            <a:pPr marL="457200" lvl="0" indent="-355600" algn="l" rtl="0">
               <a:spcBef>
                 <a:spcPts val="0"/>
               </a:spcBef>
@@ -8080,7 +8259,7 @@
             </a:endParaRPr>
           </a:p>
           <a:p>
-            <a:pPr indent="-355600" lvl="0" marL="457200" rtl="0" algn="l">
+            <a:pPr marL="457200" lvl="0" indent="-355600" algn="l" rtl="0">
               <a:spcBef>
                 <a:spcPts val="0"/>
               </a:spcBef>
@@ -8118,11 +8297,11 @@
 </file>
 
 <file path=ppt/slides/slide6.xml><?xml version="1.0" encoding="utf-8"?>
-<p:sld xmlns:a="http://schemas.openxmlformats.org/drawingml/2006/main" xmlns:r="http://schemas.openxmlformats.org/officeDocument/2006/relationships" xmlns:mc="http://schemas.openxmlformats.org/markup-compatibility/2006" xmlns:mv="urn:schemas-microsoft-com:mac:vml" xmlns:p="http://schemas.openxmlformats.org/presentationml/2006/main" xmlns:c="http://schemas.openxmlformats.org/drawingml/2006/chart" xmlns:dgm="http://schemas.openxmlformats.org/drawingml/2006/diagram" xmlns:o="urn:schemas-microsoft-com:office:office" xmlns:v="urn:schemas-microsoft-com:vml" xmlns:pvml="urn:schemas-microsoft-com:office:powerpoint" xmlns:com="http://schemas.openxmlformats.org/drawingml/2006/compatibility" xmlns:p14="http://schemas.microsoft.com/office/powerpoint/2010/main" xmlns:p15="http://schemas.microsoft.com/office/powerpoint/2012/main" xmlns:ahyp="http://schemas.microsoft.com/office/drawing/2018/hyperlinkcolor">
+<p:sld xmlns:a="http://schemas.openxmlformats.org/drawingml/2006/main" xmlns:r="http://schemas.openxmlformats.org/officeDocument/2006/relationships" xmlns:p="http://schemas.openxmlformats.org/presentationml/2006/main">
   <p:cSld>
     <p:spTree>
       <p:nvGrpSpPr>
-        <p:cNvPr id="93" name="Shape 93"/>
+        <p:cNvPr id="1" name="Shape 93"/>
         <p:cNvGrpSpPr/>
         <p:nvPr/>
       </p:nvGrpSpPr>
@@ -8137,7 +8316,9 @@
       <p:sp>
         <p:nvSpPr>
           <p:cNvPr id="94" name="Google Shape;94;p18"/>
-          <p:cNvSpPr txBox="1"/>
+          <p:cNvSpPr txBox="1">
+            <a:spLocks noGrp="1"/>
+          </p:cNvSpPr>
           <p:nvPr>
             <p:ph type="title"/>
           </p:nvPr>
@@ -8152,12 +8333,12 @@
           </a:prstGeom>
         </p:spPr>
         <p:txBody>
-          <a:bodyPr anchorCtr="0" anchor="b" bIns="91425" lIns="91425" spcFirstLastPara="1" rIns="91425" wrap="square" tIns="91425">
+          <a:bodyPr spcFirstLastPara="1" wrap="square" lIns="91425" tIns="91425" rIns="91425" bIns="91425" anchor="b" anchorCtr="0">
             <a:normAutofit/>
           </a:bodyPr>
           <a:lstStyle/>
           <a:p>
-            <a:pPr indent="0" lvl="0" marL="0" rtl="0" algn="l">
+            <a:pPr marL="0" lvl="0" indent="0" algn="l" rtl="0">
               <a:spcBef>
                 <a:spcPts val="0"/>
               </a:spcBef>
@@ -8187,9 +8368,11 @@
       <p:sp>
         <p:nvSpPr>
           <p:cNvPr id="95" name="Google Shape;95;p18"/>
-          <p:cNvSpPr txBox="1"/>
+          <p:cNvSpPr txBox="1">
+            <a:spLocks noGrp="1"/>
+          </p:cNvSpPr>
           <p:nvPr>
-            <p:ph idx="1" type="body"/>
+            <p:ph type="body" idx="1"/>
           </p:nvPr>
         </p:nvSpPr>
         <p:spPr>
@@ -8202,12 +8385,12 @@
           </a:prstGeom>
         </p:spPr>
         <p:txBody>
-          <a:bodyPr anchorCtr="0" anchor="t" bIns="91425" lIns="91425" spcFirstLastPara="1" rIns="91425" wrap="square" tIns="91425">
+          <a:bodyPr spcFirstLastPara="1" wrap="square" lIns="91425" tIns="91425" rIns="91425" bIns="91425" anchor="t" anchorCtr="0">
             <a:normAutofit/>
           </a:bodyPr>
           <a:lstStyle/>
           <a:p>
-            <a:pPr indent="0" lvl="0" marL="0" marR="647700" rtl="0" algn="just">
+            <a:pPr marL="0" marR="647700" lvl="0" indent="0" algn="just" rtl="0">
               <a:spcBef>
                 <a:spcPts val="0"/>
               </a:spcBef>
@@ -8216,10 +8399,7 @@
               </a:spcAft>
               <a:buNone/>
             </a:pPr>
-            <a:r>
-              <a:t/>
-            </a:r>
-            <a:endParaRPr sz="1600">
+            <a:endParaRPr sz="1600" dirty="0">
               <a:solidFill>
                 <a:srgbClr val="555759"/>
               </a:solidFill>
@@ -8230,7 +8410,7 @@
             </a:endParaRPr>
           </a:p>
           <a:p>
-            <a:pPr indent="-342900" lvl="0" marL="457200" marR="647700" rtl="0" algn="just">
+            <a:pPr marL="457200" marR="647700" lvl="0" indent="-342900" algn="just" rtl="0">
               <a:spcBef>
                 <a:spcPts val="0"/>
               </a:spcBef>
@@ -8242,7 +8422,7 @@
               <a:buChar char="●"/>
             </a:pPr>
             <a:r>
-              <a:rPr lang="en" sz="1600">
+              <a:rPr lang="en" sz="1600" dirty="0">
                 <a:solidFill>
                   <a:srgbClr val="555759"/>
                 </a:solidFill>
@@ -8253,7 +8433,7 @@
               </a:rPr>
               <a:t>Local play</a:t>
             </a:r>
-            <a:endParaRPr sz="1600">
+            <a:endParaRPr sz="1600" dirty="0">
               <a:solidFill>
                 <a:srgbClr val="555759"/>
               </a:solidFill>
@@ -8264,7 +8444,7 @@
             </a:endParaRPr>
           </a:p>
           <a:p>
-            <a:pPr indent="-342900" lvl="0" marL="457200" marR="647700" rtl="0" algn="just">
+            <a:pPr marL="457200" marR="647700" lvl="0" indent="-342900" algn="just" rtl="0">
               <a:spcBef>
                 <a:spcPts val="0"/>
               </a:spcBef>
@@ -8276,7 +8456,7 @@
               <a:buChar char="●"/>
             </a:pPr>
             <a:r>
-              <a:rPr lang="en" sz="1600">
+              <a:rPr lang="en" sz="1600" dirty="0">
                 <a:solidFill>
                   <a:srgbClr val="555759"/>
                 </a:solidFill>
@@ -8287,7 +8467,7 @@
               </a:rPr>
               <a:t>Unique passives for player to choose from</a:t>
             </a:r>
-            <a:endParaRPr sz="1600">
+            <a:endParaRPr sz="1600" dirty="0">
               <a:solidFill>
                 <a:srgbClr val="555759"/>
               </a:solidFill>
@@ -8298,7 +8478,7 @@
             </a:endParaRPr>
           </a:p>
           <a:p>
-            <a:pPr indent="-342900" lvl="0" marL="457200" marR="647700" rtl="0" algn="just">
+            <a:pPr marL="457200" marR="647700" lvl="0" indent="-342900" algn="just" rtl="0">
               <a:spcBef>
                 <a:spcPts val="0"/>
               </a:spcBef>
@@ -8310,7 +8490,7 @@
               <a:buChar char="●"/>
             </a:pPr>
             <a:r>
-              <a:rPr lang="en" sz="1600">
+              <a:rPr lang="en" sz="1600" dirty="0">
                 <a:solidFill>
                   <a:srgbClr val="555759"/>
                 </a:solidFill>
@@ -8321,7 +8501,7 @@
               </a:rPr>
               <a:t>Arcade-type style </a:t>
             </a:r>
-            <a:endParaRPr sz="1600">
+            <a:endParaRPr sz="1600" dirty="0">
               <a:solidFill>
                 <a:srgbClr val="555759"/>
               </a:solidFill>
@@ -8332,7 +8512,7 @@
             </a:endParaRPr>
           </a:p>
           <a:p>
-            <a:pPr indent="0" lvl="0" marL="0" marR="647700" rtl="0" algn="just">
+            <a:pPr marL="0" marR="647700" lvl="0" indent="0" algn="just" rtl="0">
               <a:spcBef>
                 <a:spcPts val="0"/>
               </a:spcBef>
@@ -8341,10 +8521,7 @@
               </a:spcAft>
               <a:buNone/>
             </a:pPr>
-            <a:r>
-              <a:t/>
-            </a:r>
-            <a:endParaRPr sz="1600">
+            <a:endParaRPr sz="1600" dirty="0">
               <a:solidFill>
                 <a:srgbClr val="555759"/>
               </a:solidFill>
@@ -8393,11 +8570,11 @@
 </file>
 
 <file path=ppt/slides/slide7.xml><?xml version="1.0" encoding="utf-8"?>
-<p:sld xmlns:a="http://schemas.openxmlformats.org/drawingml/2006/main" xmlns:r="http://schemas.openxmlformats.org/officeDocument/2006/relationships" xmlns:mc="http://schemas.openxmlformats.org/markup-compatibility/2006" xmlns:mv="urn:schemas-microsoft-com:mac:vml" xmlns:p="http://schemas.openxmlformats.org/presentationml/2006/main" xmlns:c="http://schemas.openxmlformats.org/drawingml/2006/chart" xmlns:dgm="http://schemas.openxmlformats.org/drawingml/2006/diagram" xmlns:o="urn:schemas-microsoft-com:office:office" xmlns:v="urn:schemas-microsoft-com:vml" xmlns:pvml="urn:schemas-microsoft-com:office:powerpoint" xmlns:com="http://schemas.openxmlformats.org/drawingml/2006/compatibility" xmlns:p14="http://schemas.microsoft.com/office/powerpoint/2010/main" xmlns:p15="http://schemas.microsoft.com/office/powerpoint/2012/main" xmlns:ahyp="http://schemas.microsoft.com/office/drawing/2018/hyperlinkcolor">
+<p:sld xmlns:a="http://schemas.openxmlformats.org/drawingml/2006/main" xmlns:r="http://schemas.openxmlformats.org/officeDocument/2006/relationships" xmlns:p="http://schemas.openxmlformats.org/presentationml/2006/main">
   <p:cSld>
     <p:spTree>
       <p:nvGrpSpPr>
-        <p:cNvPr id="100" name="Shape 100"/>
+        <p:cNvPr id="1" name="Shape 100"/>
         <p:cNvGrpSpPr/>
         <p:nvPr/>
       </p:nvGrpSpPr>
@@ -8412,7 +8589,9 @@
       <p:sp>
         <p:nvSpPr>
           <p:cNvPr id="101" name="Google Shape;101;p19"/>
-          <p:cNvSpPr txBox="1"/>
+          <p:cNvSpPr txBox="1">
+            <a:spLocks noGrp="1"/>
+          </p:cNvSpPr>
           <p:nvPr>
             <p:ph type="title"/>
           </p:nvPr>
@@ -8427,12 +8606,12 @@
           </a:prstGeom>
         </p:spPr>
         <p:txBody>
-          <a:bodyPr anchorCtr="0" anchor="b" bIns="91425" lIns="91425" spcFirstLastPara="1" rIns="91425" wrap="square" tIns="91425">
+          <a:bodyPr spcFirstLastPara="1" wrap="square" lIns="91425" tIns="91425" rIns="91425" bIns="91425" anchor="b" anchorCtr="0">
             <a:normAutofit/>
           </a:bodyPr>
           <a:lstStyle/>
           <a:p>
-            <a:pPr indent="0" lvl="0" marL="0" rtl="0" algn="l">
+            <a:pPr marL="0" lvl="0" indent="0" algn="l" rtl="0">
               <a:spcBef>
                 <a:spcPts val="0"/>
               </a:spcBef>
@@ -8462,9 +8641,11 @@
       <p:sp>
         <p:nvSpPr>
           <p:cNvPr id="102" name="Google Shape;102;p19"/>
-          <p:cNvSpPr txBox="1"/>
+          <p:cNvSpPr txBox="1">
+            <a:spLocks noGrp="1"/>
+          </p:cNvSpPr>
           <p:nvPr>
-            <p:ph idx="1" type="body"/>
+            <p:ph type="body" idx="1"/>
           </p:nvPr>
         </p:nvSpPr>
         <p:spPr>
@@ -8477,12 +8658,12 @@
           </a:prstGeom>
         </p:spPr>
         <p:txBody>
-          <a:bodyPr anchorCtr="0" anchor="t" bIns="91425" lIns="91425" spcFirstLastPara="1" rIns="91425" wrap="square" tIns="91425">
+          <a:bodyPr spcFirstLastPara="1" wrap="square" lIns="91425" tIns="91425" rIns="91425" bIns="91425" anchor="t" anchorCtr="0">
             <a:normAutofit/>
           </a:bodyPr>
           <a:lstStyle/>
           <a:p>
-            <a:pPr indent="0" lvl="0" marL="0" rtl="0" algn="l">
+            <a:pPr marL="0" lvl="0" indent="0" algn="l" rtl="0">
               <a:spcBef>
                 <a:spcPts val="0"/>
               </a:spcBef>
@@ -8492,40 +8673,51 @@
               <a:buNone/>
             </a:pPr>
             <a:r>
-              <a:t/>
+              <a:rPr lang="en-US" dirty="0">
+                <a:latin typeface="VT323" panose="020B0604020202020204" charset="0"/>
+              </a:rPr>
+              <a:t>Alpha Build – Basic gameplay</a:t>
             </a:r>
-            <a:endParaRPr/>
+          </a:p>
+          <a:p>
+            <a:pPr marL="0" lvl="0" indent="0" algn="l" rtl="0">
+              <a:spcBef>
+                <a:spcPts val="0"/>
+              </a:spcBef>
+              <a:spcAft>
+                <a:spcPts val="1200"/>
+              </a:spcAft>
+              <a:buNone/>
+            </a:pPr>
+            <a:r>
+              <a:rPr lang="en-US" dirty="0">
+                <a:latin typeface="VT323" panose="020B0604020202020204" charset="0"/>
+              </a:rPr>
+              <a:t>Beta Build – Enhanced gameplay</a:t>
+            </a:r>
+          </a:p>
+          <a:p>
+            <a:pPr marL="0" lvl="0" indent="0" algn="l" rtl="0">
+              <a:spcBef>
+                <a:spcPts val="0"/>
+              </a:spcBef>
+              <a:spcAft>
+                <a:spcPts val="1200"/>
+              </a:spcAft>
+              <a:buNone/>
+            </a:pPr>
+            <a:r>
+              <a:rPr lang="en-US">
+                <a:latin typeface="VT323" panose="020B0604020202020204" charset="0"/>
+              </a:rPr>
+              <a:t>Final Build – Full game </a:t>
+            </a:r>
+            <a:endParaRPr dirty="0">
+              <a:latin typeface="VT323" panose="020B0604020202020204" charset="0"/>
+            </a:endParaRPr>
           </a:p>
         </p:txBody>
       </p:sp>
-      <p:pic>
-        <p:nvPicPr>
-          <p:cNvPr id="103" name="Google Shape;103;p19"/>
-          <p:cNvPicPr preferRelativeResize="0"/>
-          <p:nvPr/>
-        </p:nvPicPr>
-        <p:blipFill>
-          <a:blip r:embed="rId3">
-            <a:alphaModFix/>
-          </a:blip>
-          <a:stretch>
-            <a:fillRect/>
-          </a:stretch>
-        </p:blipFill>
-        <p:spPr>
-          <a:xfrm>
-            <a:off x="311700" y="1225225"/>
-            <a:ext cx="8744023" cy="3413025"/>
-          </a:xfrm>
-          <a:prstGeom prst="rect">
-            <a:avLst/>
-          </a:prstGeom>
-          <a:noFill/>
-          <a:ln>
-            <a:noFill/>
-          </a:ln>
-        </p:spPr>
-      </p:pic>
     </p:spTree>
   </p:cSld>
   <p:clrMapOvr>
@@ -8535,11 +8727,11 @@
 </file>
 
 <file path=ppt/slides/slide8.xml><?xml version="1.0" encoding="utf-8"?>
-<p:sld xmlns:a="http://schemas.openxmlformats.org/drawingml/2006/main" xmlns:r="http://schemas.openxmlformats.org/officeDocument/2006/relationships" xmlns:mc="http://schemas.openxmlformats.org/markup-compatibility/2006" xmlns:mv="urn:schemas-microsoft-com:mac:vml" xmlns:p="http://schemas.openxmlformats.org/presentationml/2006/main" xmlns:c="http://schemas.openxmlformats.org/drawingml/2006/chart" xmlns:dgm="http://schemas.openxmlformats.org/drawingml/2006/diagram" xmlns:o="urn:schemas-microsoft-com:office:office" xmlns:v="urn:schemas-microsoft-com:vml" xmlns:pvml="urn:schemas-microsoft-com:office:powerpoint" xmlns:com="http://schemas.openxmlformats.org/drawingml/2006/compatibility" xmlns:p14="http://schemas.microsoft.com/office/powerpoint/2010/main" xmlns:p15="http://schemas.microsoft.com/office/powerpoint/2012/main" xmlns:ahyp="http://schemas.microsoft.com/office/drawing/2018/hyperlinkcolor">
+<p:sld xmlns:a="http://schemas.openxmlformats.org/drawingml/2006/main" xmlns:r="http://schemas.openxmlformats.org/officeDocument/2006/relationships" xmlns:p="http://schemas.openxmlformats.org/presentationml/2006/main">
   <p:cSld>
     <p:spTree>
       <p:nvGrpSpPr>
-        <p:cNvPr id="107" name="Shape 107"/>
+        <p:cNvPr id="1" name="Shape 107"/>
         <p:cNvGrpSpPr/>
         <p:nvPr/>
       </p:nvGrpSpPr>
@@ -8554,7 +8746,9 @@
       <p:sp>
         <p:nvSpPr>
           <p:cNvPr id="108" name="Google Shape;108;p20"/>
-          <p:cNvSpPr txBox="1"/>
+          <p:cNvSpPr txBox="1">
+            <a:spLocks noGrp="1"/>
+          </p:cNvSpPr>
           <p:nvPr>
             <p:ph type="title"/>
           </p:nvPr>
@@ -8569,12 +8763,12 @@
           </a:prstGeom>
         </p:spPr>
         <p:txBody>
-          <a:bodyPr anchorCtr="0" anchor="b" bIns="91425" lIns="91425" spcFirstLastPara="1" rIns="91425" wrap="square" tIns="91425">
+          <a:bodyPr spcFirstLastPara="1" wrap="square" lIns="91425" tIns="91425" rIns="91425" bIns="91425" anchor="b" anchorCtr="0">
             <a:normAutofit/>
           </a:bodyPr>
           <a:lstStyle/>
           <a:p>
-            <a:pPr indent="0" lvl="0" marL="0" rtl="0" algn="l">
+            <a:pPr marL="0" lvl="0" indent="0" algn="l" rtl="0">
               <a:spcBef>
                 <a:spcPts val="0"/>
               </a:spcBef>
@@ -8604,9 +8798,11 @@
       <p:sp>
         <p:nvSpPr>
           <p:cNvPr id="109" name="Google Shape;109;p20"/>
-          <p:cNvSpPr txBox="1"/>
+          <p:cNvSpPr txBox="1">
+            <a:spLocks noGrp="1"/>
+          </p:cNvSpPr>
           <p:nvPr>
-            <p:ph idx="1" type="body"/>
+            <p:ph type="body" idx="1"/>
           </p:nvPr>
         </p:nvSpPr>
         <p:spPr>
@@ -8619,12 +8815,12 @@
           </a:prstGeom>
         </p:spPr>
         <p:txBody>
-          <a:bodyPr anchorCtr="0" anchor="t" bIns="91425" lIns="91425" spcFirstLastPara="1" rIns="91425" wrap="square" tIns="91425">
+          <a:bodyPr spcFirstLastPara="1" wrap="square" lIns="91425" tIns="91425" rIns="91425" bIns="91425" anchor="t" anchorCtr="0">
             <a:normAutofit/>
           </a:bodyPr>
           <a:lstStyle/>
           <a:p>
-            <a:pPr indent="-342900" lvl="0" marL="457200" rtl="0" algn="l">
+            <a:pPr marL="457200" lvl="0" indent="-342900" algn="l" rtl="0">
               <a:spcBef>
                 <a:spcPts val="0"/>
               </a:spcBef>
@@ -8652,7 +8848,7 @@
             </a:endParaRPr>
           </a:p>
           <a:p>
-            <a:pPr indent="-342900" lvl="0" marL="457200" rtl="0" algn="l">
+            <a:pPr marL="457200" lvl="0" indent="-342900" algn="l" rtl="0">
               <a:spcBef>
                 <a:spcPts val="0"/>
               </a:spcBef>
@@ -8680,7 +8876,7 @@
             </a:endParaRPr>
           </a:p>
           <a:p>
-            <a:pPr indent="-342900" lvl="0" marL="457200" rtl="0" algn="l">
+            <a:pPr marL="457200" lvl="0" indent="-342900" algn="l" rtl="0">
               <a:spcBef>
                 <a:spcPts val="0"/>
               </a:spcBef>
@@ -8718,7 +8914,7 @@
 </file>
 
 <file path=ppt/theme/theme1.xml><?xml version="1.0" encoding="utf-8"?>
-<a:theme xmlns:a="http://schemas.openxmlformats.org/drawingml/2006/main" xmlns:r="http://schemas.openxmlformats.org/officeDocument/2006/relationships" name="Luxe">
+<a:theme xmlns:a="http://schemas.openxmlformats.org/drawingml/2006/main" name="Luxe">
   <a:themeElements>
     <a:clrScheme name="Luxe">
       <a:dk1>
@@ -8993,11 +9189,13 @@
       </a:bgFillStyleLst>
     </a:fmtScheme>
   </a:themeElements>
+  <a:objectDefaults/>
+  <a:extraClrSchemeLst/>
 </a:theme>
 </file>
 
 <file path=ppt/theme/theme2.xml><?xml version="1.0" encoding="utf-8"?>
-<a:theme xmlns:a="http://schemas.openxmlformats.org/drawingml/2006/main" xmlns:r="http://schemas.openxmlformats.org/officeDocument/2006/relationships">
+<a:theme xmlns:a="http://schemas.openxmlformats.org/drawingml/2006/main">
   <a:themeElements>
     <a:clrScheme name="Default">
       <a:dk1>
@@ -9272,5 +9470,7 @@
       </a:bgFillStyleLst>
     </a:fmtScheme>
   </a:themeElements>
+  <a:objectDefaults/>
+  <a:extraClrSchemeLst/>
 </a:theme>
 </file>
</xml_diff>